<commit_message>
remodelling and covid coloring
</commit_message>
<xml_diff>
--- a/Mobility_Levy.pptx
+++ b/Mobility_Levy.pptx
@@ -13,8 +13,17 @@
     <p:sldId id="294" r:id="rId7"/>
     <p:sldId id="291" r:id="rId8"/>
     <p:sldId id="292" r:id="rId9"/>
-    <p:sldId id="293" r:id="rId10"/>
-    <p:sldId id="289" r:id="rId11"/>
+    <p:sldId id="296" r:id="rId10"/>
+    <p:sldId id="298" r:id="rId11"/>
+    <p:sldId id="297" r:id="rId12"/>
+    <p:sldId id="293" r:id="rId13"/>
+    <p:sldId id="289" r:id="rId14"/>
+    <p:sldId id="299" r:id="rId15"/>
+    <p:sldId id="302" r:id="rId16"/>
+    <p:sldId id="303" r:id="rId17"/>
+    <p:sldId id="304" r:id="rId18"/>
+    <p:sldId id="307" r:id="rId19"/>
+    <p:sldId id="305" r:id="rId20"/>
   </p:sldIdLst>
   <p:sldSz cx="9144000" cy="6858000" type="screen4x3"/>
   <p:notesSz cx="6858000" cy="9144000"/>
@@ -2197,6 +2206,2099 @@
           <p:cNvPr id="2" name="Title 1">
             <a:extLst>
               <a:ext uri="{FF2B5EF4-FFF2-40B4-BE49-F238E27FC236}">
+                <a16:creationId xmlns:a16="http://schemas.microsoft.com/office/drawing/2014/main" id="{FD5F5B2C-D6F2-BF7E-E8D7-813995702D15}"/>
+              </a:ext>
+            </a:extLst>
+          </p:cNvPr>
+          <p:cNvSpPr>
+            <a:spLocks noGrp="1"/>
+          </p:cNvSpPr>
+          <p:nvPr>
+            <p:ph type="title"/>
+          </p:nvPr>
+        </p:nvSpPr>
+        <p:spPr/>
+        <p:txBody>
+          <a:bodyPr/>
+          <a:lstStyle/>
+          <a:p>
+            <a:r>
+              <a:rPr lang="en-DE" sz="2000" dirty="0"/>
+              <a:t>Modelling-Short Range in Nhts17-New Params Selected-New Error function</a:t>
+            </a:r>
+          </a:p>
+        </p:txBody>
+      </p:sp>
+      <p:sp>
+        <p:nvSpPr>
+          <p:cNvPr id="3" name="Content Placeholder 2">
+            <a:extLst>
+              <a:ext uri="{FF2B5EF4-FFF2-40B4-BE49-F238E27FC236}">
+                <a16:creationId xmlns:a16="http://schemas.microsoft.com/office/drawing/2014/main" id="{7E6EDD97-98F3-F2B7-2E47-B6E3553CF328}"/>
+              </a:ext>
+            </a:extLst>
+          </p:cNvPr>
+          <p:cNvSpPr>
+            <a:spLocks noGrp="1"/>
+          </p:cNvSpPr>
+          <p:nvPr>
+            <p:ph idx="1"/>
+          </p:nvPr>
+        </p:nvSpPr>
+        <p:spPr>
+          <a:xfrm>
+            <a:off x="533401" y="914399"/>
+            <a:ext cx="3719286" cy="5441953"/>
+          </a:xfrm>
+        </p:spPr>
+        <p:txBody>
+          <a:bodyPr>
+            <a:normAutofit fontScale="92500" lnSpcReduction="10000"/>
+          </a:bodyPr>
+          <a:lstStyle/>
+          <a:p>
+            <a:r>
+              <a:rPr lang="en-DE" dirty="0"/>
+              <a:t>Auto Driver in Nhts17</a:t>
+            </a:r>
+          </a:p>
+          <a:p>
+            <a:endParaRPr lang="en-DE" dirty="0"/>
+          </a:p>
+          <a:p>
+            <a:endParaRPr lang="en-DE" dirty="0"/>
+          </a:p>
+          <a:p>
+            <a:endParaRPr lang="en-DE" dirty="0"/>
+          </a:p>
+          <a:p>
+            <a:endParaRPr lang="en-DE" dirty="0"/>
+          </a:p>
+          <a:p>
+            <a:endParaRPr lang="en-DE" dirty="0"/>
+          </a:p>
+          <a:p>
+            <a:endParaRPr lang="en-DE" dirty="0"/>
+          </a:p>
+          <a:p>
+            <a:endParaRPr lang="en-DE" sz="1800" dirty="0"/>
+          </a:p>
+          <a:p>
+            <a:r>
+              <a:rPr lang="en-DE" sz="1800" dirty="0"/>
+              <a:t>Best fit error:</a:t>
+            </a:r>
+          </a:p>
+          <a:p>
+            <a:pPr lvl="1"/>
+            <a:r>
+              <a:rPr lang="en-DE" sz="1600" dirty="0"/>
+              <a:t>4.454465769303726</a:t>
+            </a:r>
+          </a:p>
+          <a:p>
+            <a:r>
+              <a:rPr lang="en-DE" sz="1800" dirty="0"/>
+              <a:t>Worst fit error</a:t>
+            </a:r>
+          </a:p>
+          <a:p>
+            <a:pPr lvl="1"/>
+            <a:r>
+              <a:rPr lang="en-DE" sz="1600" dirty="0"/>
+              <a:t>1698.783816378225</a:t>
+            </a:r>
+          </a:p>
+          <a:p>
+            <a:pPr lvl="1"/>
+            <a:endParaRPr lang="en-DE" sz="1600" dirty="0"/>
+          </a:p>
+          <a:p>
+            <a:r>
+              <a:rPr lang="en-GB" sz="1600" dirty="0" err="1"/>
+              <a:t>p_range</a:t>
+            </a:r>
+            <a:r>
+              <a:rPr lang="en-GB" sz="1600" dirty="0"/>
+              <a:t>=</a:t>
+            </a:r>
+            <a:r>
+              <a:rPr lang="en-GB" sz="1600" dirty="0" err="1"/>
+              <a:t>np.arange</a:t>
+            </a:r>
+            <a:r>
+              <a:rPr lang="en-GB" sz="1600" dirty="0"/>
+              <a:t>(0.01, 0.95, 0.03)</a:t>
+            </a:r>
+          </a:p>
+          <a:p>
+            <a:r>
+              <a:rPr lang="en-GB" sz="1600" dirty="0" err="1"/>
+              <a:t>eps_range</a:t>
+            </a:r>
+            <a:r>
+              <a:rPr lang="en-GB" sz="1600" dirty="0"/>
+              <a:t>=</a:t>
+            </a:r>
+            <a:r>
+              <a:rPr lang="en-GB" sz="1600" dirty="0" err="1"/>
+              <a:t>np.arange</a:t>
+            </a:r>
+            <a:r>
+              <a:rPr lang="en-GB" sz="1600" dirty="0"/>
+              <a:t>(0.1,2,0.03)</a:t>
+            </a:r>
+          </a:p>
+          <a:p>
+            <a:r>
+              <a:rPr lang="en-GB" sz="1600" dirty="0"/>
+              <a:t>Error: Wasserstein distance (the earth mover’s distance,)</a:t>
+            </a:r>
+          </a:p>
+          <a:p>
+            <a:r>
+              <a:rPr lang="en-GB" sz="1600" dirty="0"/>
+              <a:t>Largest distance=10000</a:t>
+            </a:r>
+            <a:endParaRPr lang="en-DE" sz="1600" dirty="0"/>
+          </a:p>
+          <a:p>
+            <a:pPr lvl="1"/>
+            <a:endParaRPr lang="en-DE" dirty="0"/>
+          </a:p>
+          <a:p>
+            <a:pPr marL="0" indent="0">
+              <a:buNone/>
+            </a:pPr>
+            <a:endParaRPr lang="en-DE" dirty="0"/>
+          </a:p>
+        </p:txBody>
+      </p:sp>
+      <p:sp>
+        <p:nvSpPr>
+          <p:cNvPr id="4" name="Slide Number Placeholder 3">
+            <a:extLst>
+              <a:ext uri="{FF2B5EF4-FFF2-40B4-BE49-F238E27FC236}">
+                <a16:creationId xmlns:a16="http://schemas.microsoft.com/office/drawing/2014/main" id="{A28BE308-F095-782F-B448-59B534A262BE}"/>
+              </a:ext>
+            </a:extLst>
+          </p:cNvPr>
+          <p:cNvSpPr>
+            <a:spLocks noGrp="1"/>
+          </p:cNvSpPr>
+          <p:nvPr>
+            <p:ph type="sldNum" sz="quarter" idx="10"/>
+          </p:nvPr>
+        </p:nvSpPr>
+        <p:spPr/>
+        <p:txBody>
+          <a:bodyPr/>
+          <a:lstStyle/>
+          <a:p>
+            <a:pPr>
+              <a:defRPr/>
+            </a:pPr>
+            <a:fld id="{13FD7AA2-DC10-7C40-BE93-1CFAEDE49800}" type="slidenum">
+              <a:rPr lang="en-US" altLang="de-DE" smtClean="0"/>
+              <a:pPr>
+                <a:defRPr/>
+              </a:pPr>
+              <a:t>10</a:t>
+            </a:fld>
+            <a:endParaRPr lang="en-US" altLang="de-DE"/>
+          </a:p>
+        </p:txBody>
+      </p:sp>
+      <p:graphicFrame>
+        <p:nvGraphicFramePr>
+          <p:cNvPr id="5" name="Table 5">
+            <a:extLst>
+              <a:ext uri="{FF2B5EF4-FFF2-40B4-BE49-F238E27FC236}">
+                <a16:creationId xmlns:a16="http://schemas.microsoft.com/office/drawing/2014/main" id="{DA0984B5-5203-3327-58A7-79289C37D231}"/>
+              </a:ext>
+            </a:extLst>
+          </p:cNvPr>
+          <p:cNvGraphicFramePr>
+            <a:graphicFrameLocks noGrp="1"/>
+          </p:cNvGraphicFramePr>
+          <p:nvPr/>
+        </p:nvGraphicFramePr>
+        <p:xfrm>
+          <a:off x="685800" y="1259214"/>
+          <a:ext cx="2760628" cy="2092776"/>
+        </p:xfrm>
+        <a:graphic>
+          <a:graphicData uri="http://schemas.openxmlformats.org/drawingml/2006/table">
+            <a:tbl>
+              <a:tblPr firstRow="1" bandRow="1">
+                <a:tableStyleId>{21E4AEA4-8DFA-4A89-87EB-49C32662AFE0}</a:tableStyleId>
+              </a:tblPr>
+              <a:tblGrid>
+                <a:gridCol w="690157">
+                  <a:extLst>
+                    <a:ext uri="{9D8B030D-6E8A-4147-A177-3AD203B41FA5}">
+                      <a16:colId xmlns:a16="http://schemas.microsoft.com/office/drawing/2014/main" val="2015579830"/>
+                    </a:ext>
+                  </a:extLst>
+                </a:gridCol>
+                <a:gridCol w="690157">
+                  <a:extLst>
+                    <a:ext uri="{9D8B030D-6E8A-4147-A177-3AD203B41FA5}">
+                      <a16:colId xmlns:a16="http://schemas.microsoft.com/office/drawing/2014/main" val="831545333"/>
+                    </a:ext>
+                  </a:extLst>
+                </a:gridCol>
+                <a:gridCol w="690157">
+                  <a:extLst>
+                    <a:ext uri="{9D8B030D-6E8A-4147-A177-3AD203B41FA5}">
+                      <a16:colId xmlns:a16="http://schemas.microsoft.com/office/drawing/2014/main" val="3982934071"/>
+                    </a:ext>
+                  </a:extLst>
+                </a:gridCol>
+                <a:gridCol w="690157">
+                  <a:extLst>
+                    <a:ext uri="{9D8B030D-6E8A-4147-A177-3AD203B41FA5}">
+                      <a16:colId xmlns:a16="http://schemas.microsoft.com/office/drawing/2014/main" val="2370268705"/>
+                    </a:ext>
+                  </a:extLst>
+                </a:gridCol>
+              </a:tblGrid>
+              <a:tr h="0">
+                <a:tc>
+                  <a:txBody>
+                    <a:bodyPr/>
+                    <a:lstStyle/>
+                    <a:p>
+                      <a:endParaRPr lang="en-DE" sz="1700" b="0" dirty="0">
+                        <a:solidFill>
+                          <a:schemeClr val="tx1"/>
+                        </a:solidFill>
+                        <a:latin typeface="Times New Roman" panose="02020603050405020304" pitchFamily="18" charset="0"/>
+                        <a:cs typeface="Times New Roman" panose="02020603050405020304" pitchFamily="18" charset="0"/>
+                      </a:endParaRPr>
+                    </a:p>
+                  </a:txBody>
+                  <a:tcPr marL="85045" marR="85045" marT="42522" marB="42522"/>
+                </a:tc>
+                <a:tc>
+                  <a:txBody>
+                    <a:bodyPr/>
+                    <a:lstStyle/>
+                    <a:p>
+                      <a:r>
+                        <a:rPr lang="en-DE" sz="1700" b="0" dirty="0">
+                          <a:solidFill>
+                            <a:schemeClr val="tx1"/>
+                          </a:solidFill>
+                          <a:latin typeface="Times New Roman" panose="02020603050405020304" pitchFamily="18" charset="0"/>
+                          <a:cs typeface="Times New Roman" panose="02020603050405020304" pitchFamily="18" charset="0"/>
+                        </a:rPr>
+                        <a:t>eps</a:t>
+                      </a:r>
+                    </a:p>
+                  </a:txBody>
+                  <a:tcPr marL="85045" marR="85045" marT="42522" marB="42522"/>
+                </a:tc>
+                <a:tc>
+                  <a:txBody>
+                    <a:bodyPr/>
+                    <a:lstStyle/>
+                    <a:p>
+                      <a:r>
+                        <a:rPr lang="en-DE" sz="1700" b="0" dirty="0">
+                          <a:solidFill>
+                            <a:schemeClr val="tx1"/>
+                          </a:solidFill>
+                          <a:latin typeface="Times New Roman" panose="02020603050405020304" pitchFamily="18" charset="0"/>
+                          <a:cs typeface="Times New Roman" panose="02020603050405020304" pitchFamily="18" charset="0"/>
+                        </a:rPr>
+                        <a:t>p</a:t>
+                      </a:r>
+                    </a:p>
+                  </a:txBody>
+                  <a:tcPr marL="85045" marR="85045" marT="42522" marB="42522"/>
+                </a:tc>
+                <a:tc>
+                  <a:txBody>
+                    <a:bodyPr/>
+                    <a:lstStyle/>
+                    <a:p>
+                      <a:r>
+                        <a:rPr lang="en-DE" sz="1700" b="0" dirty="0">
+                          <a:solidFill>
+                            <a:schemeClr val="tx1"/>
+                          </a:solidFill>
+                          <a:latin typeface="Times New Roman" panose="02020603050405020304" pitchFamily="18" charset="0"/>
+                          <a:cs typeface="Times New Roman" panose="02020603050405020304" pitchFamily="18" charset="0"/>
+                        </a:rPr>
+                        <a:t>alpha</a:t>
+                      </a:r>
+                    </a:p>
+                  </a:txBody>
+                  <a:tcPr marL="85045" marR="85045" marT="42522" marB="42522"/>
+                </a:tc>
+                <a:extLst>
+                  <a:ext uri="{0D108BD9-81ED-4DB2-BD59-A6C34878D82A}">
+                    <a16:rowId xmlns:a16="http://schemas.microsoft.com/office/drawing/2014/main" val="2603681906"/>
+                  </a:ext>
+                </a:extLst>
+              </a:tr>
+              <a:tr h="0">
+                <a:tc>
+                  <a:txBody>
+                    <a:bodyPr/>
+                    <a:lstStyle/>
+                    <a:p>
+                      <a:pPr marL="0" marR="0" lvl="0" indent="0" algn="l" defTabSz="685800" rtl="0" eaLnBrk="1" fontAlgn="auto" latinLnBrk="0" hangingPunct="1">
+                        <a:lnSpc>
+                          <a:spcPct val="100000"/>
+                        </a:lnSpc>
+                        <a:spcBef>
+                          <a:spcPts val="0"/>
+                        </a:spcBef>
+                        <a:spcAft>
+                          <a:spcPts val="0"/>
+                        </a:spcAft>
+                        <a:buClrTx/>
+                        <a:buSzTx/>
+                        <a:buFontTx/>
+                        <a:buNone/>
+                        <a:tabLst/>
+                        <a:defRPr/>
+                      </a:pPr>
+                      <a:r>
+                        <a:rPr lang="en-DE" sz="1500" dirty="0">
+                          <a:latin typeface="Times New Roman" panose="02020603050405020304" pitchFamily="18" charset="0"/>
+                          <a:cs typeface="Times New Roman" panose="02020603050405020304" pitchFamily="18" charset="0"/>
+                        </a:rPr>
+                        <a:t>Hand picked</a:t>
+                      </a:r>
+                      <a:endParaRPr lang="en-DE" sz="1700" dirty="0">
+                        <a:latin typeface="Times New Roman" panose="02020603050405020304" pitchFamily="18" charset="0"/>
+                        <a:cs typeface="Times New Roman" panose="02020603050405020304" pitchFamily="18" charset="0"/>
+                      </a:endParaRPr>
+                    </a:p>
+                  </a:txBody>
+                  <a:tcPr marL="85045" marR="85045" marT="42522" marB="42522"/>
+                </a:tc>
+                <a:tc>
+                  <a:txBody>
+                    <a:bodyPr/>
+                    <a:lstStyle/>
+                    <a:p>
+                      <a:r>
+                        <a:rPr lang="en-DE" sz="1700" b="0" dirty="0">
+                          <a:solidFill>
+                            <a:schemeClr val="tx1"/>
+                          </a:solidFill>
+                          <a:latin typeface="Times New Roman" panose="02020603050405020304" pitchFamily="18" charset="0"/>
+                          <a:cs typeface="Times New Roman" panose="02020603050405020304" pitchFamily="18" charset="0"/>
+                        </a:rPr>
+                        <a:t>2</a:t>
+                      </a:r>
+                    </a:p>
+                  </a:txBody>
+                  <a:tcPr marL="85045" marR="85045" marT="42522" marB="42522"/>
+                </a:tc>
+                <a:tc>
+                  <a:txBody>
+                    <a:bodyPr/>
+                    <a:lstStyle/>
+                    <a:p>
+                      <a:r>
+                        <a:rPr lang="en-DE" sz="1700" b="0" dirty="0">
+                          <a:solidFill>
+                            <a:schemeClr val="tx1"/>
+                          </a:solidFill>
+                          <a:latin typeface="Times New Roman" panose="02020603050405020304" pitchFamily="18" charset="0"/>
+                          <a:cs typeface="Times New Roman" panose="02020603050405020304" pitchFamily="18" charset="0"/>
+                        </a:rPr>
+                        <a:t>0.7</a:t>
+                      </a:r>
+                    </a:p>
+                  </a:txBody>
+                  <a:tcPr marL="85045" marR="85045" marT="42522" marB="42522"/>
+                </a:tc>
+                <a:tc>
+                  <a:txBody>
+                    <a:bodyPr/>
+                    <a:lstStyle/>
+                    <a:p>
+                      <a:r>
+                        <a:rPr lang="en-DE" sz="1700" b="0" dirty="0">
+                          <a:solidFill>
+                            <a:schemeClr val="tx1"/>
+                          </a:solidFill>
+                          <a:latin typeface="Times New Roman" panose="02020603050405020304" pitchFamily="18" charset="0"/>
+                          <a:cs typeface="Times New Roman" panose="02020603050405020304" pitchFamily="18" charset="0"/>
+                        </a:rPr>
+                        <a:t>1.1</a:t>
+                      </a:r>
+                    </a:p>
+                  </a:txBody>
+                  <a:tcPr marL="85045" marR="85045" marT="42522" marB="42522"/>
+                </a:tc>
+                <a:extLst>
+                  <a:ext uri="{0D108BD9-81ED-4DB2-BD59-A6C34878D82A}">
+                    <a16:rowId xmlns:a16="http://schemas.microsoft.com/office/drawing/2014/main" val="1143183472"/>
+                  </a:ext>
+                </a:extLst>
+              </a:tr>
+              <a:tr h="0">
+                <a:tc>
+                  <a:txBody>
+                    <a:bodyPr/>
+                    <a:lstStyle/>
+                    <a:p>
+                      <a:r>
+                        <a:rPr lang="en-GB" sz="1700" b="0" dirty="0">
+                          <a:solidFill>
+                            <a:schemeClr val="tx1"/>
+                          </a:solidFill>
+                          <a:latin typeface="Times New Roman" panose="02020603050405020304" pitchFamily="18" charset="0"/>
+                          <a:cs typeface="Times New Roman" panose="02020603050405020304" pitchFamily="18" charset="0"/>
+                        </a:rPr>
+                        <a:t>B</a:t>
+                      </a:r>
+                      <a:r>
+                        <a:rPr lang="en-DE" sz="1700" b="0" dirty="0">
+                          <a:solidFill>
+                            <a:schemeClr val="tx1"/>
+                          </a:solidFill>
+                          <a:latin typeface="Times New Roman" panose="02020603050405020304" pitchFamily="18" charset="0"/>
+                          <a:cs typeface="Times New Roman" panose="02020603050405020304" pitchFamily="18" charset="0"/>
+                        </a:rPr>
+                        <a:t>est fit</a:t>
+                      </a:r>
+                    </a:p>
+                  </a:txBody>
+                  <a:tcPr marL="85045" marR="85045" marT="42522" marB="42522"/>
+                </a:tc>
+                <a:tc>
+                  <a:txBody>
+                    <a:bodyPr/>
+                    <a:lstStyle/>
+                    <a:p>
+                      <a:r>
+                        <a:rPr lang="en-DE" sz="1700" b="0" dirty="0">
+                          <a:solidFill>
+                            <a:schemeClr val="tx1"/>
+                          </a:solidFill>
+                          <a:latin typeface="Times New Roman" panose="02020603050405020304" pitchFamily="18" charset="0"/>
+                          <a:cs typeface="Times New Roman" panose="02020603050405020304" pitchFamily="18" charset="0"/>
+                        </a:rPr>
+                        <a:t>0.4</a:t>
+                      </a:r>
+                    </a:p>
+                  </a:txBody>
+                  <a:tcPr marL="85045" marR="85045" marT="42522" marB="42522"/>
+                </a:tc>
+                <a:tc>
+                  <a:txBody>
+                    <a:bodyPr/>
+                    <a:lstStyle/>
+                    <a:p>
+                      <a:r>
+                        <a:rPr lang="en-DE" sz="1700" b="0" dirty="0">
+                          <a:solidFill>
+                            <a:schemeClr val="tx1"/>
+                          </a:solidFill>
+                          <a:latin typeface="Times New Roman" panose="02020603050405020304" pitchFamily="18" charset="0"/>
+                          <a:cs typeface="Times New Roman" panose="02020603050405020304" pitchFamily="18" charset="0"/>
+                        </a:rPr>
+                        <a:t>0.67</a:t>
+                      </a:r>
+                    </a:p>
+                  </a:txBody>
+                  <a:tcPr marL="85045" marR="85045" marT="42522" marB="42522"/>
+                </a:tc>
+                <a:tc>
+                  <a:txBody>
+                    <a:bodyPr/>
+                    <a:lstStyle/>
+                    <a:p>
+                      <a:r>
+                        <a:rPr lang="en-DE" sz="1700" b="0" dirty="0">
+                          <a:solidFill>
+                            <a:schemeClr val="tx1"/>
+                          </a:solidFill>
+                          <a:latin typeface="Times New Roman" panose="02020603050405020304" pitchFamily="18" charset="0"/>
+                          <a:cs typeface="Times New Roman" panose="02020603050405020304" pitchFamily="18" charset="0"/>
+                        </a:rPr>
+                        <a:t>2.15</a:t>
+                      </a:r>
+                    </a:p>
+                  </a:txBody>
+                  <a:tcPr marL="85045" marR="85045" marT="42522" marB="42522"/>
+                </a:tc>
+                <a:extLst>
+                  <a:ext uri="{0D108BD9-81ED-4DB2-BD59-A6C34878D82A}">
+                    <a16:rowId xmlns:a16="http://schemas.microsoft.com/office/drawing/2014/main" val="3031271706"/>
+                  </a:ext>
+                </a:extLst>
+              </a:tr>
+              <a:tr h="0">
+                <a:tc>
+                  <a:txBody>
+                    <a:bodyPr/>
+                    <a:lstStyle/>
+                    <a:p>
+                      <a:r>
+                        <a:rPr lang="en-DE" sz="1700" b="0" dirty="0">
+                          <a:solidFill>
+                            <a:schemeClr val="tx1"/>
+                          </a:solidFill>
+                          <a:latin typeface="Times New Roman" panose="02020603050405020304" pitchFamily="18" charset="0"/>
+                          <a:cs typeface="Times New Roman" panose="02020603050405020304" pitchFamily="18" charset="0"/>
+                        </a:rPr>
+                        <a:t>Worst fit</a:t>
+                      </a:r>
+                    </a:p>
+                  </a:txBody>
+                  <a:tcPr marL="85045" marR="85045" marT="42522" marB="42522"/>
+                </a:tc>
+                <a:tc>
+                  <a:txBody>
+                    <a:bodyPr/>
+                    <a:lstStyle/>
+                    <a:p>
+                      <a:r>
+                        <a:rPr lang="en-DE" sz="1700" b="0" dirty="0">
+                          <a:solidFill>
+                            <a:schemeClr val="tx1"/>
+                          </a:solidFill>
+                          <a:latin typeface="Times New Roman" panose="02020603050405020304" pitchFamily="18" charset="0"/>
+                          <a:cs typeface="Times New Roman" panose="02020603050405020304" pitchFamily="18" charset="0"/>
+                        </a:rPr>
+                        <a:t>0.79</a:t>
+                      </a:r>
+                    </a:p>
+                  </a:txBody>
+                  <a:tcPr marL="85045" marR="85045" marT="42522" marB="42522"/>
+                </a:tc>
+                <a:tc>
+                  <a:txBody>
+                    <a:bodyPr/>
+                    <a:lstStyle/>
+                    <a:p>
+                      <a:r>
+                        <a:rPr lang="en-DE" sz="1700" b="0" dirty="0">
+                          <a:solidFill>
+                            <a:schemeClr val="tx1"/>
+                          </a:solidFill>
+                          <a:latin typeface="Times New Roman" panose="02020603050405020304" pitchFamily="18" charset="0"/>
+                          <a:cs typeface="Times New Roman" panose="02020603050405020304" pitchFamily="18" charset="0"/>
+                        </a:rPr>
+                        <a:t>0.94</a:t>
+                      </a:r>
+                    </a:p>
+                  </a:txBody>
+                  <a:tcPr marL="85045" marR="85045" marT="42522" marB="42522"/>
+                </a:tc>
+                <a:tc>
+                  <a:txBody>
+                    <a:bodyPr/>
+                    <a:lstStyle/>
+                    <a:p>
+                      <a:r>
+                        <a:rPr lang="en-DE" sz="1700" b="0" dirty="0">
+                          <a:solidFill>
+                            <a:schemeClr val="tx1"/>
+                          </a:solidFill>
+                          <a:latin typeface="Times New Roman" panose="02020603050405020304" pitchFamily="18" charset="0"/>
+                          <a:cs typeface="Times New Roman" panose="02020603050405020304" pitchFamily="18" charset="0"/>
+                        </a:rPr>
+                        <a:t>1.1</a:t>
+                      </a:r>
+                    </a:p>
+                  </a:txBody>
+                  <a:tcPr marL="85045" marR="85045" marT="42522" marB="42522"/>
+                </a:tc>
+                <a:extLst>
+                  <a:ext uri="{0D108BD9-81ED-4DB2-BD59-A6C34878D82A}">
+                    <a16:rowId xmlns:a16="http://schemas.microsoft.com/office/drawing/2014/main" val="612192117"/>
+                  </a:ext>
+                </a:extLst>
+              </a:tr>
+            </a:tbl>
+          </a:graphicData>
+        </a:graphic>
+      </p:graphicFrame>
+      <p:pic>
+        <p:nvPicPr>
+          <p:cNvPr id="6" name="Picture 2">
+            <a:extLst>
+              <a:ext uri="{FF2B5EF4-FFF2-40B4-BE49-F238E27FC236}">
+                <a16:creationId xmlns:a16="http://schemas.microsoft.com/office/drawing/2014/main" id="{112BDAEE-C155-C4A2-3095-E0C404B2CB40}"/>
+              </a:ext>
+            </a:extLst>
+          </p:cNvPr>
+          <p:cNvPicPr>
+            <a:picLocks noChangeAspect="1" noChangeArrowheads="1"/>
+          </p:cNvPicPr>
+          <p:nvPr/>
+        </p:nvPicPr>
+        <p:blipFill>
+          <a:blip r:embed="rId2">
+            <a:extLst>
+              <a:ext uri="{28A0092B-C50C-407E-A947-70E740481C1C}">
+                <a14:useLocalDpi xmlns:a14="http://schemas.microsoft.com/office/drawing/2010/main" val="0"/>
+              </a:ext>
+            </a:extLst>
+          </a:blip>
+          <a:srcRect/>
+          <a:stretch/>
+        </p:blipFill>
+        <p:spPr bwMode="auto">
+          <a:xfrm>
+            <a:off x="3446428" y="1259214"/>
+            <a:ext cx="5637815" cy="4461228"/>
+          </a:xfrm>
+          <a:prstGeom prst="rect">
+            <a:avLst/>
+          </a:prstGeom>
+          <a:noFill/>
+          <a:extLst>
+            <a:ext uri="{909E8E84-426E-40DD-AFC4-6F175D3DCCD1}">
+              <a14:hiddenFill xmlns:a14="http://schemas.microsoft.com/office/drawing/2010/main">
+                <a:solidFill>
+                  <a:srgbClr val="FFFFFF"/>
+                </a:solidFill>
+              </a14:hiddenFill>
+            </a:ext>
+          </a:extLst>
+        </p:spPr>
+      </p:pic>
+    </p:spTree>
+    <p:extLst>
+      <p:ext uri="{BB962C8B-B14F-4D97-AF65-F5344CB8AC3E}">
+        <p14:creationId xmlns:p14="http://schemas.microsoft.com/office/powerpoint/2010/main" val="2030127713"/>
+      </p:ext>
+    </p:extLst>
+  </p:cSld>
+  <p:clrMapOvr>
+    <a:masterClrMapping/>
+  </p:clrMapOvr>
+</p:sld>
+</file>
+
+<file path=ppt/slides/slide11.xml><?xml version="1.0" encoding="utf-8"?>
+<p:sld xmlns:a="http://schemas.openxmlformats.org/drawingml/2006/main" xmlns:r="http://schemas.openxmlformats.org/officeDocument/2006/relationships" xmlns:p="http://schemas.openxmlformats.org/presentationml/2006/main">
+  <p:cSld>
+    <p:spTree>
+      <p:nvGrpSpPr>
+        <p:cNvPr id="1" name=""/>
+        <p:cNvGrpSpPr/>
+        <p:nvPr/>
+      </p:nvGrpSpPr>
+      <p:grpSpPr>
+        <a:xfrm>
+          <a:off x="0" y="0"/>
+          <a:ext cx="0" cy="0"/>
+          <a:chOff x="0" y="0"/>
+          <a:chExt cx="0" cy="0"/>
+        </a:xfrm>
+      </p:grpSpPr>
+      <p:sp>
+        <p:nvSpPr>
+          <p:cNvPr id="2" name="Title 1">
+            <a:extLst>
+              <a:ext uri="{FF2B5EF4-FFF2-40B4-BE49-F238E27FC236}">
+                <a16:creationId xmlns:a16="http://schemas.microsoft.com/office/drawing/2014/main" id="{FD5F5B2C-D6F2-BF7E-E8D7-813995702D15}"/>
+              </a:ext>
+            </a:extLst>
+          </p:cNvPr>
+          <p:cNvSpPr>
+            <a:spLocks noGrp="1"/>
+          </p:cNvSpPr>
+          <p:nvPr>
+            <p:ph type="title"/>
+          </p:nvPr>
+        </p:nvSpPr>
+        <p:spPr/>
+        <p:txBody>
+          <a:bodyPr/>
+          <a:lstStyle/>
+          <a:p>
+            <a:r>
+              <a:rPr lang="en-DE" sz="2000" dirty="0"/>
+              <a:t>Modelling-Short Range in Nhts17-New Params Selected-New Error function- p can be 0</a:t>
+            </a:r>
+          </a:p>
+        </p:txBody>
+      </p:sp>
+      <p:sp>
+        <p:nvSpPr>
+          <p:cNvPr id="3" name="Content Placeholder 2">
+            <a:extLst>
+              <a:ext uri="{FF2B5EF4-FFF2-40B4-BE49-F238E27FC236}">
+                <a16:creationId xmlns:a16="http://schemas.microsoft.com/office/drawing/2014/main" id="{7E6EDD97-98F3-F2B7-2E47-B6E3553CF328}"/>
+              </a:ext>
+            </a:extLst>
+          </p:cNvPr>
+          <p:cNvSpPr>
+            <a:spLocks noGrp="1"/>
+          </p:cNvSpPr>
+          <p:nvPr>
+            <p:ph idx="1"/>
+          </p:nvPr>
+        </p:nvSpPr>
+        <p:spPr>
+          <a:xfrm>
+            <a:off x="533401" y="914399"/>
+            <a:ext cx="3719286" cy="5441953"/>
+          </a:xfrm>
+        </p:spPr>
+        <p:txBody>
+          <a:bodyPr>
+            <a:normAutofit fontScale="92500" lnSpcReduction="20000"/>
+          </a:bodyPr>
+          <a:lstStyle/>
+          <a:p>
+            <a:r>
+              <a:rPr lang="en-DE" sz="1900" dirty="0"/>
+              <a:t>Auto Driver in Nhts17 </a:t>
+            </a:r>
+          </a:p>
+          <a:p>
+            <a:pPr lvl="1"/>
+            <a:r>
+              <a:rPr lang="en-GB" sz="1700" dirty="0"/>
+              <a:t>D</a:t>
+            </a:r>
+            <a:r>
+              <a:rPr lang="en-DE" sz="1700" dirty="0"/>
+              <a:t>atasize=</a:t>
+            </a:r>
+            <a:r>
+              <a:rPr lang="en-DE" sz="1600" dirty="0"/>
+              <a:t>27421</a:t>
+            </a:r>
+            <a:endParaRPr lang="en-DE" sz="1700" dirty="0"/>
+          </a:p>
+          <a:p>
+            <a:endParaRPr lang="en-DE" dirty="0"/>
+          </a:p>
+          <a:p>
+            <a:endParaRPr lang="en-DE" dirty="0"/>
+          </a:p>
+          <a:p>
+            <a:endParaRPr lang="en-DE" dirty="0"/>
+          </a:p>
+          <a:p>
+            <a:endParaRPr lang="en-DE" dirty="0"/>
+          </a:p>
+          <a:p>
+            <a:endParaRPr lang="en-DE" dirty="0"/>
+          </a:p>
+          <a:p>
+            <a:endParaRPr lang="en-DE" dirty="0"/>
+          </a:p>
+          <a:p>
+            <a:endParaRPr lang="en-DE" sz="1800" dirty="0"/>
+          </a:p>
+          <a:p>
+            <a:endParaRPr lang="en-DE" sz="1800" dirty="0"/>
+          </a:p>
+          <a:p>
+            <a:r>
+              <a:rPr lang="en-DE" sz="1800" dirty="0"/>
+              <a:t>Best fit error:</a:t>
+            </a:r>
+          </a:p>
+          <a:p>
+            <a:pPr lvl="1"/>
+            <a:r>
+              <a:rPr lang="en-DE" sz="1600" dirty="0"/>
+              <a:t>4.7520321181153875</a:t>
+            </a:r>
+          </a:p>
+          <a:p>
+            <a:r>
+              <a:rPr lang="en-DE" sz="1800" dirty="0"/>
+              <a:t>Worst fit error</a:t>
+            </a:r>
+          </a:p>
+          <a:p>
+            <a:pPr lvl="1"/>
+            <a:r>
+              <a:rPr lang="en-DE" sz="1600" dirty="0"/>
+              <a:t>1662.7523100247206</a:t>
+            </a:r>
+          </a:p>
+          <a:p>
+            <a:pPr lvl="1"/>
+            <a:endParaRPr lang="en-DE" sz="1600" dirty="0"/>
+          </a:p>
+          <a:p>
+            <a:r>
+              <a:rPr lang="en-GB" sz="1600" dirty="0" err="1"/>
+              <a:t>p_range</a:t>
+            </a:r>
+            <a:r>
+              <a:rPr lang="en-GB" sz="1600" dirty="0"/>
+              <a:t>=</a:t>
+            </a:r>
+            <a:r>
+              <a:rPr lang="en-GB" sz="1600" dirty="0" err="1"/>
+              <a:t>np.arange</a:t>
+            </a:r>
+            <a:r>
+              <a:rPr lang="en-GB" sz="1600" dirty="0"/>
+              <a:t>(0, 0.95, 0.03)</a:t>
+            </a:r>
+          </a:p>
+          <a:p>
+            <a:r>
+              <a:rPr lang="en-GB" sz="1600" dirty="0" err="1"/>
+              <a:t>eps_range</a:t>
+            </a:r>
+            <a:r>
+              <a:rPr lang="en-GB" sz="1600" dirty="0"/>
+              <a:t>=</a:t>
+            </a:r>
+            <a:r>
+              <a:rPr lang="en-GB" sz="1600" dirty="0" err="1"/>
+              <a:t>np.arange</a:t>
+            </a:r>
+            <a:r>
+              <a:rPr lang="en-GB" sz="1600" dirty="0"/>
+              <a:t>(0.1,2,0.03)</a:t>
+            </a:r>
+          </a:p>
+          <a:p>
+            <a:r>
+              <a:rPr lang="en-GB" sz="1600" dirty="0"/>
+              <a:t>Error: Wasserstein distance (the earth mover’s distance,)</a:t>
+            </a:r>
+          </a:p>
+          <a:p>
+            <a:r>
+              <a:rPr lang="en-GB" sz="1600" dirty="0"/>
+              <a:t>Largest distance=10000</a:t>
+            </a:r>
+            <a:endParaRPr lang="en-DE" sz="1600" dirty="0"/>
+          </a:p>
+          <a:p>
+            <a:pPr lvl="1"/>
+            <a:endParaRPr lang="en-DE" dirty="0"/>
+          </a:p>
+          <a:p>
+            <a:pPr marL="0" indent="0">
+              <a:buNone/>
+            </a:pPr>
+            <a:endParaRPr lang="en-DE" dirty="0"/>
+          </a:p>
+        </p:txBody>
+      </p:sp>
+      <p:sp>
+        <p:nvSpPr>
+          <p:cNvPr id="4" name="Slide Number Placeholder 3">
+            <a:extLst>
+              <a:ext uri="{FF2B5EF4-FFF2-40B4-BE49-F238E27FC236}">
+                <a16:creationId xmlns:a16="http://schemas.microsoft.com/office/drawing/2014/main" id="{A28BE308-F095-782F-B448-59B534A262BE}"/>
+              </a:ext>
+            </a:extLst>
+          </p:cNvPr>
+          <p:cNvSpPr>
+            <a:spLocks noGrp="1"/>
+          </p:cNvSpPr>
+          <p:nvPr>
+            <p:ph type="sldNum" sz="quarter" idx="10"/>
+          </p:nvPr>
+        </p:nvSpPr>
+        <p:spPr/>
+        <p:txBody>
+          <a:bodyPr/>
+          <a:lstStyle/>
+          <a:p>
+            <a:pPr>
+              <a:defRPr/>
+            </a:pPr>
+            <a:fld id="{13FD7AA2-DC10-7C40-BE93-1CFAEDE49800}" type="slidenum">
+              <a:rPr lang="en-US" altLang="de-DE" smtClean="0"/>
+              <a:pPr>
+                <a:defRPr/>
+              </a:pPr>
+              <a:t>11</a:t>
+            </a:fld>
+            <a:endParaRPr lang="en-US" altLang="de-DE"/>
+          </a:p>
+        </p:txBody>
+      </p:sp>
+      <p:graphicFrame>
+        <p:nvGraphicFramePr>
+          <p:cNvPr id="5" name="Table 5">
+            <a:extLst>
+              <a:ext uri="{FF2B5EF4-FFF2-40B4-BE49-F238E27FC236}">
+                <a16:creationId xmlns:a16="http://schemas.microsoft.com/office/drawing/2014/main" id="{DA0984B5-5203-3327-58A7-79289C37D231}"/>
+              </a:ext>
+            </a:extLst>
+          </p:cNvPr>
+          <p:cNvGraphicFramePr>
+            <a:graphicFrameLocks noGrp="1"/>
+          </p:cNvGraphicFramePr>
+          <p:nvPr>
+            <p:extLst>
+              <p:ext uri="{D42A27DB-BD31-4B8C-83A1-F6EECF244321}">
+                <p14:modId xmlns:p14="http://schemas.microsoft.com/office/powerpoint/2010/main" val="3990518081"/>
+              </p:ext>
+            </p:extLst>
+          </p:nvPr>
+        </p:nvGraphicFramePr>
+        <p:xfrm>
+          <a:off x="685800" y="1542599"/>
+          <a:ext cx="2760628" cy="2092776"/>
+        </p:xfrm>
+        <a:graphic>
+          <a:graphicData uri="http://schemas.openxmlformats.org/drawingml/2006/table">
+            <a:tbl>
+              <a:tblPr firstRow="1" bandRow="1">
+                <a:tableStyleId>{21E4AEA4-8DFA-4A89-87EB-49C32662AFE0}</a:tableStyleId>
+              </a:tblPr>
+              <a:tblGrid>
+                <a:gridCol w="690157">
+                  <a:extLst>
+                    <a:ext uri="{9D8B030D-6E8A-4147-A177-3AD203B41FA5}">
+                      <a16:colId xmlns:a16="http://schemas.microsoft.com/office/drawing/2014/main" val="2015579830"/>
+                    </a:ext>
+                  </a:extLst>
+                </a:gridCol>
+                <a:gridCol w="690157">
+                  <a:extLst>
+                    <a:ext uri="{9D8B030D-6E8A-4147-A177-3AD203B41FA5}">
+                      <a16:colId xmlns:a16="http://schemas.microsoft.com/office/drawing/2014/main" val="831545333"/>
+                    </a:ext>
+                  </a:extLst>
+                </a:gridCol>
+                <a:gridCol w="690157">
+                  <a:extLst>
+                    <a:ext uri="{9D8B030D-6E8A-4147-A177-3AD203B41FA5}">
+                      <a16:colId xmlns:a16="http://schemas.microsoft.com/office/drawing/2014/main" val="3982934071"/>
+                    </a:ext>
+                  </a:extLst>
+                </a:gridCol>
+                <a:gridCol w="690157">
+                  <a:extLst>
+                    <a:ext uri="{9D8B030D-6E8A-4147-A177-3AD203B41FA5}">
+                      <a16:colId xmlns:a16="http://schemas.microsoft.com/office/drawing/2014/main" val="2370268705"/>
+                    </a:ext>
+                  </a:extLst>
+                </a:gridCol>
+              </a:tblGrid>
+              <a:tr h="0">
+                <a:tc>
+                  <a:txBody>
+                    <a:bodyPr/>
+                    <a:lstStyle/>
+                    <a:p>
+                      <a:endParaRPr lang="en-DE" sz="1700" b="0" dirty="0">
+                        <a:solidFill>
+                          <a:schemeClr val="tx1"/>
+                        </a:solidFill>
+                        <a:latin typeface="Times New Roman" panose="02020603050405020304" pitchFamily="18" charset="0"/>
+                        <a:cs typeface="Times New Roman" panose="02020603050405020304" pitchFamily="18" charset="0"/>
+                      </a:endParaRPr>
+                    </a:p>
+                  </a:txBody>
+                  <a:tcPr marL="85045" marR="85045" marT="42522" marB="42522"/>
+                </a:tc>
+                <a:tc>
+                  <a:txBody>
+                    <a:bodyPr/>
+                    <a:lstStyle/>
+                    <a:p>
+                      <a:r>
+                        <a:rPr lang="en-DE" sz="1700" b="0" dirty="0">
+                          <a:solidFill>
+                            <a:schemeClr val="tx1"/>
+                          </a:solidFill>
+                          <a:latin typeface="Times New Roman" panose="02020603050405020304" pitchFamily="18" charset="0"/>
+                          <a:cs typeface="Times New Roman" panose="02020603050405020304" pitchFamily="18" charset="0"/>
+                        </a:rPr>
+                        <a:t>eps</a:t>
+                      </a:r>
+                    </a:p>
+                  </a:txBody>
+                  <a:tcPr marL="85045" marR="85045" marT="42522" marB="42522"/>
+                </a:tc>
+                <a:tc>
+                  <a:txBody>
+                    <a:bodyPr/>
+                    <a:lstStyle/>
+                    <a:p>
+                      <a:r>
+                        <a:rPr lang="en-DE" sz="1700" b="0" dirty="0">
+                          <a:solidFill>
+                            <a:schemeClr val="tx1"/>
+                          </a:solidFill>
+                          <a:latin typeface="Times New Roman" panose="02020603050405020304" pitchFamily="18" charset="0"/>
+                          <a:cs typeface="Times New Roman" panose="02020603050405020304" pitchFamily="18" charset="0"/>
+                        </a:rPr>
+                        <a:t>p</a:t>
+                      </a:r>
+                    </a:p>
+                  </a:txBody>
+                  <a:tcPr marL="85045" marR="85045" marT="42522" marB="42522"/>
+                </a:tc>
+                <a:tc>
+                  <a:txBody>
+                    <a:bodyPr/>
+                    <a:lstStyle/>
+                    <a:p>
+                      <a:r>
+                        <a:rPr lang="en-DE" sz="1700" b="0" dirty="0">
+                          <a:solidFill>
+                            <a:schemeClr val="tx1"/>
+                          </a:solidFill>
+                          <a:latin typeface="Times New Roman" panose="02020603050405020304" pitchFamily="18" charset="0"/>
+                          <a:cs typeface="Times New Roman" panose="02020603050405020304" pitchFamily="18" charset="0"/>
+                        </a:rPr>
+                        <a:t>alpha</a:t>
+                      </a:r>
+                    </a:p>
+                  </a:txBody>
+                  <a:tcPr marL="85045" marR="85045" marT="42522" marB="42522"/>
+                </a:tc>
+                <a:extLst>
+                  <a:ext uri="{0D108BD9-81ED-4DB2-BD59-A6C34878D82A}">
+                    <a16:rowId xmlns:a16="http://schemas.microsoft.com/office/drawing/2014/main" val="2603681906"/>
+                  </a:ext>
+                </a:extLst>
+              </a:tr>
+              <a:tr h="0">
+                <a:tc>
+                  <a:txBody>
+                    <a:bodyPr/>
+                    <a:lstStyle/>
+                    <a:p>
+                      <a:pPr marL="0" marR="0" lvl="0" indent="0" algn="l" defTabSz="685800" rtl="0" eaLnBrk="1" fontAlgn="auto" latinLnBrk="0" hangingPunct="1">
+                        <a:lnSpc>
+                          <a:spcPct val="100000"/>
+                        </a:lnSpc>
+                        <a:spcBef>
+                          <a:spcPts val="0"/>
+                        </a:spcBef>
+                        <a:spcAft>
+                          <a:spcPts val="0"/>
+                        </a:spcAft>
+                        <a:buClrTx/>
+                        <a:buSzTx/>
+                        <a:buFontTx/>
+                        <a:buNone/>
+                        <a:tabLst/>
+                        <a:defRPr/>
+                      </a:pPr>
+                      <a:r>
+                        <a:rPr lang="en-DE" sz="1500" dirty="0">
+                          <a:latin typeface="Times New Roman" panose="02020603050405020304" pitchFamily="18" charset="0"/>
+                          <a:cs typeface="Times New Roman" panose="02020603050405020304" pitchFamily="18" charset="0"/>
+                        </a:rPr>
+                        <a:t>Hand picked</a:t>
+                      </a:r>
+                      <a:endParaRPr lang="en-DE" sz="1700" dirty="0">
+                        <a:latin typeface="Times New Roman" panose="02020603050405020304" pitchFamily="18" charset="0"/>
+                        <a:cs typeface="Times New Roman" panose="02020603050405020304" pitchFamily="18" charset="0"/>
+                      </a:endParaRPr>
+                    </a:p>
+                  </a:txBody>
+                  <a:tcPr marL="85045" marR="85045" marT="42522" marB="42522"/>
+                </a:tc>
+                <a:tc>
+                  <a:txBody>
+                    <a:bodyPr/>
+                    <a:lstStyle/>
+                    <a:p>
+                      <a:r>
+                        <a:rPr lang="en-DE" sz="1700" b="0" dirty="0">
+                          <a:solidFill>
+                            <a:schemeClr val="tx1"/>
+                          </a:solidFill>
+                          <a:latin typeface="Times New Roman" panose="02020603050405020304" pitchFamily="18" charset="0"/>
+                          <a:cs typeface="Times New Roman" panose="02020603050405020304" pitchFamily="18" charset="0"/>
+                        </a:rPr>
+                        <a:t>2</a:t>
+                      </a:r>
+                    </a:p>
+                  </a:txBody>
+                  <a:tcPr marL="85045" marR="85045" marT="42522" marB="42522"/>
+                </a:tc>
+                <a:tc>
+                  <a:txBody>
+                    <a:bodyPr/>
+                    <a:lstStyle/>
+                    <a:p>
+                      <a:r>
+                        <a:rPr lang="en-DE" sz="1700" b="0" dirty="0">
+                          <a:solidFill>
+                            <a:schemeClr val="tx1"/>
+                          </a:solidFill>
+                          <a:latin typeface="Times New Roman" panose="02020603050405020304" pitchFamily="18" charset="0"/>
+                          <a:cs typeface="Times New Roman" panose="02020603050405020304" pitchFamily="18" charset="0"/>
+                        </a:rPr>
+                        <a:t>0.7</a:t>
+                      </a:r>
+                    </a:p>
+                  </a:txBody>
+                  <a:tcPr marL="85045" marR="85045" marT="42522" marB="42522"/>
+                </a:tc>
+                <a:tc>
+                  <a:txBody>
+                    <a:bodyPr/>
+                    <a:lstStyle/>
+                    <a:p>
+                      <a:r>
+                        <a:rPr lang="en-DE" sz="1700" b="0" dirty="0">
+                          <a:solidFill>
+                            <a:schemeClr val="tx1"/>
+                          </a:solidFill>
+                          <a:latin typeface="Times New Roman" panose="02020603050405020304" pitchFamily="18" charset="0"/>
+                          <a:cs typeface="Times New Roman" panose="02020603050405020304" pitchFamily="18" charset="0"/>
+                        </a:rPr>
+                        <a:t>1.1</a:t>
+                      </a:r>
+                    </a:p>
+                  </a:txBody>
+                  <a:tcPr marL="85045" marR="85045" marT="42522" marB="42522"/>
+                </a:tc>
+                <a:extLst>
+                  <a:ext uri="{0D108BD9-81ED-4DB2-BD59-A6C34878D82A}">
+                    <a16:rowId xmlns:a16="http://schemas.microsoft.com/office/drawing/2014/main" val="1143183472"/>
+                  </a:ext>
+                </a:extLst>
+              </a:tr>
+              <a:tr h="0">
+                <a:tc>
+                  <a:txBody>
+                    <a:bodyPr/>
+                    <a:lstStyle/>
+                    <a:p>
+                      <a:r>
+                        <a:rPr lang="en-GB" sz="1700" b="0" dirty="0">
+                          <a:solidFill>
+                            <a:schemeClr val="tx1"/>
+                          </a:solidFill>
+                          <a:latin typeface="Times New Roman" panose="02020603050405020304" pitchFamily="18" charset="0"/>
+                          <a:cs typeface="Times New Roman" panose="02020603050405020304" pitchFamily="18" charset="0"/>
+                        </a:rPr>
+                        <a:t>B</a:t>
+                      </a:r>
+                      <a:r>
+                        <a:rPr lang="en-DE" sz="1700" b="0" dirty="0">
+                          <a:solidFill>
+                            <a:schemeClr val="tx1"/>
+                          </a:solidFill>
+                          <a:latin typeface="Times New Roman" panose="02020603050405020304" pitchFamily="18" charset="0"/>
+                          <a:cs typeface="Times New Roman" panose="02020603050405020304" pitchFamily="18" charset="0"/>
+                        </a:rPr>
+                        <a:t>est fit</a:t>
+                      </a:r>
+                    </a:p>
+                  </a:txBody>
+                  <a:tcPr marL="85045" marR="85045" marT="42522" marB="42522"/>
+                </a:tc>
+                <a:tc>
+                  <a:txBody>
+                    <a:bodyPr/>
+                    <a:lstStyle/>
+                    <a:p>
+                      <a:r>
+                        <a:rPr lang="en-DE" sz="1700" b="0" dirty="0">
+                          <a:solidFill>
+                            <a:schemeClr val="tx1"/>
+                          </a:solidFill>
+                          <a:latin typeface="Times New Roman" panose="02020603050405020304" pitchFamily="18" charset="0"/>
+                          <a:cs typeface="Times New Roman" panose="02020603050405020304" pitchFamily="18" charset="0"/>
+                        </a:rPr>
+                        <a:t>0.25</a:t>
+                      </a:r>
+                    </a:p>
+                  </a:txBody>
+                  <a:tcPr marL="85045" marR="85045" marT="42522" marB="42522"/>
+                </a:tc>
+                <a:tc>
+                  <a:txBody>
+                    <a:bodyPr/>
+                    <a:lstStyle/>
+                    <a:p>
+                      <a:r>
+                        <a:rPr lang="en-DE" sz="1700" b="0" dirty="0">
+                          <a:solidFill>
+                            <a:schemeClr val="tx1"/>
+                          </a:solidFill>
+                          <a:latin typeface="Times New Roman" panose="02020603050405020304" pitchFamily="18" charset="0"/>
+                          <a:cs typeface="Times New Roman" panose="02020603050405020304" pitchFamily="18" charset="0"/>
+                        </a:rPr>
+                        <a:t>0.81</a:t>
+                      </a:r>
+                    </a:p>
+                  </a:txBody>
+                  <a:tcPr marL="85045" marR="85045" marT="42522" marB="42522"/>
+                </a:tc>
+                <a:tc>
+                  <a:txBody>
+                    <a:bodyPr/>
+                    <a:lstStyle/>
+                    <a:p>
+                      <a:r>
+                        <a:rPr lang="en-DE" sz="1700" b="0" dirty="0">
+                          <a:solidFill>
+                            <a:schemeClr val="tx1"/>
+                          </a:solidFill>
+                          <a:latin typeface="Times New Roman" panose="02020603050405020304" pitchFamily="18" charset="0"/>
+                          <a:cs typeface="Times New Roman" panose="02020603050405020304" pitchFamily="18" charset="0"/>
+                        </a:rPr>
+                        <a:t>2.2</a:t>
+                      </a:r>
+                    </a:p>
+                  </a:txBody>
+                  <a:tcPr marL="85045" marR="85045" marT="42522" marB="42522"/>
+                </a:tc>
+                <a:extLst>
+                  <a:ext uri="{0D108BD9-81ED-4DB2-BD59-A6C34878D82A}">
+                    <a16:rowId xmlns:a16="http://schemas.microsoft.com/office/drawing/2014/main" val="3031271706"/>
+                  </a:ext>
+                </a:extLst>
+              </a:tr>
+              <a:tr h="0">
+                <a:tc>
+                  <a:txBody>
+                    <a:bodyPr/>
+                    <a:lstStyle/>
+                    <a:p>
+                      <a:r>
+                        <a:rPr lang="en-DE" sz="1700" b="0" dirty="0">
+                          <a:solidFill>
+                            <a:schemeClr val="tx1"/>
+                          </a:solidFill>
+                          <a:latin typeface="Times New Roman" panose="02020603050405020304" pitchFamily="18" charset="0"/>
+                          <a:cs typeface="Times New Roman" panose="02020603050405020304" pitchFamily="18" charset="0"/>
+                        </a:rPr>
+                        <a:t>Worst fit</a:t>
+                      </a:r>
+                    </a:p>
+                  </a:txBody>
+                  <a:tcPr marL="85045" marR="85045" marT="42522" marB="42522"/>
+                </a:tc>
+                <a:tc>
+                  <a:txBody>
+                    <a:bodyPr/>
+                    <a:lstStyle/>
+                    <a:p>
+                      <a:r>
+                        <a:rPr lang="en-DE" sz="1700" b="0" dirty="0">
+                          <a:solidFill>
+                            <a:schemeClr val="tx1"/>
+                          </a:solidFill>
+                          <a:latin typeface="Times New Roman" panose="02020603050405020304" pitchFamily="18" charset="0"/>
+                          <a:cs typeface="Times New Roman" panose="02020603050405020304" pitchFamily="18" charset="0"/>
+                        </a:rPr>
+                        <a:t>1.81</a:t>
+                      </a:r>
+                    </a:p>
+                  </a:txBody>
+                  <a:tcPr marL="85045" marR="85045" marT="42522" marB="42522"/>
+                </a:tc>
+                <a:tc>
+                  <a:txBody>
+                    <a:bodyPr/>
+                    <a:lstStyle/>
+                    <a:p>
+                      <a:r>
+                        <a:rPr lang="en-DE" sz="1700" b="0" dirty="0">
+                          <a:solidFill>
+                            <a:schemeClr val="tx1"/>
+                          </a:solidFill>
+                          <a:latin typeface="Times New Roman" panose="02020603050405020304" pitchFamily="18" charset="0"/>
+                          <a:cs typeface="Times New Roman" panose="02020603050405020304" pitchFamily="18" charset="0"/>
+                        </a:rPr>
+                        <a:t>0.9</a:t>
+                      </a:r>
+                    </a:p>
+                  </a:txBody>
+                  <a:tcPr marL="85045" marR="85045" marT="42522" marB="42522"/>
+                </a:tc>
+                <a:tc>
+                  <a:txBody>
+                    <a:bodyPr/>
+                    <a:lstStyle/>
+                    <a:p>
+                      <a:r>
+                        <a:rPr lang="en-DE" sz="1700" b="0" dirty="0">
+                          <a:solidFill>
+                            <a:schemeClr val="tx1"/>
+                          </a:solidFill>
+                          <a:latin typeface="Times New Roman" panose="02020603050405020304" pitchFamily="18" charset="0"/>
+                          <a:cs typeface="Times New Roman" panose="02020603050405020304" pitchFamily="18" charset="0"/>
+                        </a:rPr>
+                        <a:t>1.1</a:t>
+                      </a:r>
+                    </a:p>
+                  </a:txBody>
+                  <a:tcPr marL="85045" marR="85045" marT="42522" marB="42522"/>
+                </a:tc>
+                <a:extLst>
+                  <a:ext uri="{0D108BD9-81ED-4DB2-BD59-A6C34878D82A}">
+                    <a16:rowId xmlns:a16="http://schemas.microsoft.com/office/drawing/2014/main" val="612192117"/>
+                  </a:ext>
+                </a:extLst>
+              </a:tr>
+            </a:tbl>
+          </a:graphicData>
+        </a:graphic>
+      </p:graphicFrame>
+      <p:pic>
+        <p:nvPicPr>
+          <p:cNvPr id="6" name="Picture 2">
+            <a:extLst>
+              <a:ext uri="{FF2B5EF4-FFF2-40B4-BE49-F238E27FC236}">
+                <a16:creationId xmlns:a16="http://schemas.microsoft.com/office/drawing/2014/main" id="{112BDAEE-C155-C4A2-3095-E0C404B2CB40}"/>
+              </a:ext>
+            </a:extLst>
+          </p:cNvPr>
+          <p:cNvPicPr>
+            <a:picLocks noChangeAspect="1" noChangeArrowheads="1"/>
+          </p:cNvPicPr>
+          <p:nvPr/>
+        </p:nvPicPr>
+        <p:blipFill>
+          <a:blip r:embed="rId2">
+            <a:extLst>
+              <a:ext uri="{28A0092B-C50C-407E-A947-70E740481C1C}">
+                <a14:useLocalDpi xmlns:a14="http://schemas.microsoft.com/office/drawing/2010/main" val="0"/>
+              </a:ext>
+            </a:extLst>
+          </a:blip>
+          <a:srcRect/>
+          <a:stretch/>
+        </p:blipFill>
+        <p:spPr bwMode="auto">
+          <a:xfrm>
+            <a:off x="3446428" y="1259214"/>
+            <a:ext cx="5637815" cy="4461227"/>
+          </a:xfrm>
+          <a:prstGeom prst="rect">
+            <a:avLst/>
+          </a:prstGeom>
+          <a:noFill/>
+          <a:extLst>
+            <a:ext uri="{909E8E84-426E-40DD-AFC4-6F175D3DCCD1}">
+              <a14:hiddenFill xmlns:a14="http://schemas.microsoft.com/office/drawing/2010/main">
+                <a:solidFill>
+                  <a:srgbClr val="FFFFFF"/>
+                </a:solidFill>
+              </a14:hiddenFill>
+            </a:ext>
+          </a:extLst>
+        </p:spPr>
+      </p:pic>
+    </p:spTree>
+    <p:extLst>
+      <p:ext uri="{BB962C8B-B14F-4D97-AF65-F5344CB8AC3E}">
+        <p14:creationId xmlns:p14="http://schemas.microsoft.com/office/powerpoint/2010/main" val="557147313"/>
+      </p:ext>
+    </p:extLst>
+  </p:cSld>
+  <p:clrMapOvr>
+    <a:masterClrMapping/>
+  </p:clrMapOvr>
+</p:sld>
+</file>
+
+<file path=ppt/slides/slide12.xml><?xml version="1.0" encoding="utf-8"?>
+<p:sld xmlns:a="http://schemas.openxmlformats.org/drawingml/2006/main" xmlns:r="http://schemas.openxmlformats.org/officeDocument/2006/relationships" xmlns:p="http://schemas.openxmlformats.org/presentationml/2006/main">
+  <p:cSld>
+    <p:spTree>
+      <p:nvGrpSpPr>
+        <p:cNvPr id="1" name=""/>
+        <p:cNvGrpSpPr/>
+        <p:nvPr/>
+      </p:nvGrpSpPr>
+      <p:grpSpPr>
+        <a:xfrm>
+          <a:off x="0" y="0"/>
+          <a:ext cx="0" cy="0"/>
+          <a:chOff x="0" y="0"/>
+          <a:chExt cx="0" cy="0"/>
+        </a:xfrm>
+      </p:grpSpPr>
+      <p:sp>
+        <p:nvSpPr>
+          <p:cNvPr id="2" name="Title 1">
+            <a:extLst>
+              <a:ext uri="{FF2B5EF4-FFF2-40B4-BE49-F238E27FC236}">
+                <a16:creationId xmlns:a16="http://schemas.microsoft.com/office/drawing/2014/main" id="{FD5F5B2C-D6F2-BF7E-E8D7-813995702D15}"/>
+              </a:ext>
+            </a:extLst>
+          </p:cNvPr>
+          <p:cNvSpPr>
+            <a:spLocks noGrp="1"/>
+          </p:cNvSpPr>
+          <p:nvPr>
+            <p:ph type="title"/>
+          </p:nvPr>
+        </p:nvSpPr>
+        <p:spPr/>
+        <p:txBody>
+          <a:bodyPr/>
+          <a:lstStyle/>
+          <a:p>
+            <a:r>
+              <a:rPr lang="en-DE" dirty="0"/>
+              <a:t>Modelling-Bike in Nhts17</a:t>
+            </a:r>
+          </a:p>
+        </p:txBody>
+      </p:sp>
+      <p:sp>
+        <p:nvSpPr>
+          <p:cNvPr id="3" name="Content Placeholder 2">
+            <a:extLst>
+              <a:ext uri="{FF2B5EF4-FFF2-40B4-BE49-F238E27FC236}">
+                <a16:creationId xmlns:a16="http://schemas.microsoft.com/office/drawing/2014/main" id="{7E6EDD97-98F3-F2B7-2E47-B6E3553CF328}"/>
+              </a:ext>
+            </a:extLst>
+          </p:cNvPr>
+          <p:cNvSpPr>
+            <a:spLocks noGrp="1"/>
+          </p:cNvSpPr>
+          <p:nvPr>
+            <p:ph idx="1"/>
+          </p:nvPr>
+        </p:nvSpPr>
+        <p:spPr>
+          <a:xfrm>
+            <a:off x="533400" y="914400"/>
+            <a:ext cx="4198257" cy="5105400"/>
+          </a:xfrm>
+        </p:spPr>
+        <p:txBody>
+          <a:bodyPr>
+            <a:normAutofit fontScale="92500" lnSpcReduction="10000"/>
+          </a:bodyPr>
+          <a:lstStyle/>
+          <a:p>
+            <a:r>
+              <a:rPr lang="en-DE" dirty="0"/>
+              <a:t>Short Range Public in Nhts17</a:t>
+            </a:r>
+          </a:p>
+          <a:p>
+            <a:endParaRPr lang="en-DE" dirty="0"/>
+          </a:p>
+          <a:p>
+            <a:endParaRPr lang="en-DE" dirty="0"/>
+          </a:p>
+          <a:p>
+            <a:endParaRPr lang="en-DE" dirty="0"/>
+          </a:p>
+          <a:p>
+            <a:endParaRPr lang="en-DE" dirty="0"/>
+          </a:p>
+          <a:p>
+            <a:endParaRPr lang="en-DE" dirty="0"/>
+          </a:p>
+          <a:p>
+            <a:endParaRPr lang="en-DE" dirty="0"/>
+          </a:p>
+          <a:p>
+            <a:endParaRPr lang="en-DE" dirty="0"/>
+          </a:p>
+          <a:p>
+            <a:r>
+              <a:rPr lang="en-DE" dirty="0"/>
+              <a:t>Best fit error:</a:t>
+            </a:r>
+          </a:p>
+          <a:p>
+            <a:pPr lvl="1"/>
+            <a:r>
+              <a:rPr lang="en-DE" dirty="0"/>
+              <a:t>3.08572583406345</a:t>
+            </a:r>
+          </a:p>
+          <a:p>
+            <a:r>
+              <a:rPr lang="en-DE" dirty="0"/>
+              <a:t>Worst fit error</a:t>
+            </a:r>
+          </a:p>
+          <a:p>
+            <a:pPr lvl="1"/>
+            <a:r>
+              <a:rPr lang="en-DE" dirty="0"/>
+              <a:t>547.2482490075568</a:t>
+            </a:r>
+          </a:p>
+          <a:p>
+            <a:pPr lvl="1"/>
+            <a:endParaRPr lang="en-DE" dirty="0"/>
+          </a:p>
+          <a:p>
+            <a:r>
+              <a:rPr lang="en-GB" dirty="0" err="1"/>
+              <a:t>messpt</a:t>
+            </a:r>
+            <a:r>
+              <a:rPr lang="en-GB" dirty="0"/>
+              <a:t>[ 1,3,5,7,10,30,55,70,100,200]</a:t>
+            </a:r>
+          </a:p>
+          <a:p>
+            <a:r>
+              <a:rPr lang="en-GB" dirty="0"/>
+              <a:t>Largest distance=200</a:t>
+            </a:r>
+            <a:endParaRPr lang="en-DE" dirty="0"/>
+          </a:p>
+          <a:p>
+            <a:pPr lvl="1"/>
+            <a:endParaRPr lang="en-DE" dirty="0"/>
+          </a:p>
+          <a:p>
+            <a:pPr marL="0" indent="0">
+              <a:buNone/>
+            </a:pPr>
+            <a:endParaRPr lang="en-DE" dirty="0"/>
+          </a:p>
+        </p:txBody>
+      </p:sp>
+      <p:sp>
+        <p:nvSpPr>
+          <p:cNvPr id="4" name="Slide Number Placeholder 3">
+            <a:extLst>
+              <a:ext uri="{FF2B5EF4-FFF2-40B4-BE49-F238E27FC236}">
+                <a16:creationId xmlns:a16="http://schemas.microsoft.com/office/drawing/2014/main" id="{A28BE308-F095-782F-B448-59B534A262BE}"/>
+              </a:ext>
+            </a:extLst>
+          </p:cNvPr>
+          <p:cNvSpPr>
+            <a:spLocks noGrp="1"/>
+          </p:cNvSpPr>
+          <p:nvPr>
+            <p:ph type="sldNum" sz="quarter" idx="10"/>
+          </p:nvPr>
+        </p:nvSpPr>
+        <p:spPr/>
+        <p:txBody>
+          <a:bodyPr/>
+          <a:lstStyle/>
+          <a:p>
+            <a:pPr>
+              <a:defRPr/>
+            </a:pPr>
+            <a:fld id="{13FD7AA2-DC10-7C40-BE93-1CFAEDE49800}" type="slidenum">
+              <a:rPr lang="en-US" altLang="de-DE" smtClean="0"/>
+              <a:pPr>
+                <a:defRPr/>
+              </a:pPr>
+              <a:t>12</a:t>
+            </a:fld>
+            <a:endParaRPr lang="en-US" altLang="de-DE"/>
+          </a:p>
+        </p:txBody>
+      </p:sp>
+      <p:graphicFrame>
+        <p:nvGraphicFramePr>
+          <p:cNvPr id="5" name="Table 5">
+            <a:extLst>
+              <a:ext uri="{FF2B5EF4-FFF2-40B4-BE49-F238E27FC236}">
+                <a16:creationId xmlns:a16="http://schemas.microsoft.com/office/drawing/2014/main" id="{DA0984B5-5203-3327-58A7-79289C37D231}"/>
+              </a:ext>
+            </a:extLst>
+          </p:cNvPr>
+          <p:cNvGraphicFramePr>
+            <a:graphicFrameLocks noGrp="1"/>
+          </p:cNvGraphicFramePr>
+          <p:nvPr>
+            <p:extLst>
+              <p:ext uri="{D42A27DB-BD31-4B8C-83A1-F6EECF244321}">
+                <p14:modId xmlns:p14="http://schemas.microsoft.com/office/powerpoint/2010/main" val="3757154474"/>
+              </p:ext>
+            </p:extLst>
+          </p:nvPr>
+        </p:nvGraphicFramePr>
+        <p:xfrm>
+          <a:off x="609600" y="1353457"/>
+          <a:ext cx="2760628" cy="2092776"/>
+        </p:xfrm>
+        <a:graphic>
+          <a:graphicData uri="http://schemas.openxmlformats.org/drawingml/2006/table">
+            <a:tbl>
+              <a:tblPr firstRow="1" bandRow="1">
+                <a:tableStyleId>{21E4AEA4-8DFA-4A89-87EB-49C32662AFE0}</a:tableStyleId>
+              </a:tblPr>
+              <a:tblGrid>
+                <a:gridCol w="690157">
+                  <a:extLst>
+                    <a:ext uri="{9D8B030D-6E8A-4147-A177-3AD203B41FA5}">
+                      <a16:colId xmlns:a16="http://schemas.microsoft.com/office/drawing/2014/main" val="2015579830"/>
+                    </a:ext>
+                  </a:extLst>
+                </a:gridCol>
+                <a:gridCol w="690157">
+                  <a:extLst>
+                    <a:ext uri="{9D8B030D-6E8A-4147-A177-3AD203B41FA5}">
+                      <a16:colId xmlns:a16="http://schemas.microsoft.com/office/drawing/2014/main" val="831545333"/>
+                    </a:ext>
+                  </a:extLst>
+                </a:gridCol>
+                <a:gridCol w="690157">
+                  <a:extLst>
+                    <a:ext uri="{9D8B030D-6E8A-4147-A177-3AD203B41FA5}">
+                      <a16:colId xmlns:a16="http://schemas.microsoft.com/office/drawing/2014/main" val="3982934071"/>
+                    </a:ext>
+                  </a:extLst>
+                </a:gridCol>
+                <a:gridCol w="690157">
+                  <a:extLst>
+                    <a:ext uri="{9D8B030D-6E8A-4147-A177-3AD203B41FA5}">
+                      <a16:colId xmlns:a16="http://schemas.microsoft.com/office/drawing/2014/main" val="2370268705"/>
+                    </a:ext>
+                  </a:extLst>
+                </a:gridCol>
+              </a:tblGrid>
+              <a:tr h="0">
+                <a:tc>
+                  <a:txBody>
+                    <a:bodyPr/>
+                    <a:lstStyle/>
+                    <a:p>
+                      <a:endParaRPr lang="en-DE" sz="1700" b="0" dirty="0">
+                        <a:solidFill>
+                          <a:schemeClr val="tx1"/>
+                        </a:solidFill>
+                        <a:latin typeface="Times New Roman" panose="02020603050405020304" pitchFamily="18" charset="0"/>
+                        <a:cs typeface="Times New Roman" panose="02020603050405020304" pitchFamily="18" charset="0"/>
+                      </a:endParaRPr>
+                    </a:p>
+                  </a:txBody>
+                  <a:tcPr marL="85045" marR="85045" marT="42522" marB="42522"/>
+                </a:tc>
+                <a:tc>
+                  <a:txBody>
+                    <a:bodyPr/>
+                    <a:lstStyle/>
+                    <a:p>
+                      <a:r>
+                        <a:rPr lang="en-DE" sz="1700" b="0" dirty="0">
+                          <a:solidFill>
+                            <a:schemeClr val="tx1"/>
+                          </a:solidFill>
+                          <a:latin typeface="Times New Roman" panose="02020603050405020304" pitchFamily="18" charset="0"/>
+                          <a:cs typeface="Times New Roman" panose="02020603050405020304" pitchFamily="18" charset="0"/>
+                        </a:rPr>
+                        <a:t>eps</a:t>
+                      </a:r>
+                    </a:p>
+                  </a:txBody>
+                  <a:tcPr marL="85045" marR="85045" marT="42522" marB="42522"/>
+                </a:tc>
+                <a:tc>
+                  <a:txBody>
+                    <a:bodyPr/>
+                    <a:lstStyle/>
+                    <a:p>
+                      <a:r>
+                        <a:rPr lang="en-DE" sz="1700" b="0" dirty="0">
+                          <a:solidFill>
+                            <a:schemeClr val="tx1"/>
+                          </a:solidFill>
+                          <a:latin typeface="Times New Roman" panose="02020603050405020304" pitchFamily="18" charset="0"/>
+                          <a:cs typeface="Times New Roman" panose="02020603050405020304" pitchFamily="18" charset="0"/>
+                        </a:rPr>
+                        <a:t>p</a:t>
+                      </a:r>
+                    </a:p>
+                  </a:txBody>
+                  <a:tcPr marL="85045" marR="85045" marT="42522" marB="42522"/>
+                </a:tc>
+                <a:tc>
+                  <a:txBody>
+                    <a:bodyPr/>
+                    <a:lstStyle/>
+                    <a:p>
+                      <a:r>
+                        <a:rPr lang="en-DE" sz="1700" b="0" dirty="0">
+                          <a:solidFill>
+                            <a:schemeClr val="tx1"/>
+                          </a:solidFill>
+                          <a:latin typeface="Times New Roman" panose="02020603050405020304" pitchFamily="18" charset="0"/>
+                          <a:cs typeface="Times New Roman" panose="02020603050405020304" pitchFamily="18" charset="0"/>
+                        </a:rPr>
+                        <a:t>alpha</a:t>
+                      </a:r>
+                    </a:p>
+                  </a:txBody>
+                  <a:tcPr marL="85045" marR="85045" marT="42522" marB="42522"/>
+                </a:tc>
+                <a:extLst>
+                  <a:ext uri="{0D108BD9-81ED-4DB2-BD59-A6C34878D82A}">
+                    <a16:rowId xmlns:a16="http://schemas.microsoft.com/office/drawing/2014/main" val="2603681906"/>
+                  </a:ext>
+                </a:extLst>
+              </a:tr>
+              <a:tr h="0">
+                <a:tc>
+                  <a:txBody>
+                    <a:bodyPr/>
+                    <a:lstStyle/>
+                    <a:p>
+                      <a:pPr marL="0" marR="0" lvl="0" indent="0" algn="l" defTabSz="685800" rtl="0" eaLnBrk="1" fontAlgn="auto" latinLnBrk="0" hangingPunct="1">
+                        <a:lnSpc>
+                          <a:spcPct val="100000"/>
+                        </a:lnSpc>
+                        <a:spcBef>
+                          <a:spcPts val="0"/>
+                        </a:spcBef>
+                        <a:spcAft>
+                          <a:spcPts val="0"/>
+                        </a:spcAft>
+                        <a:buClrTx/>
+                        <a:buSzTx/>
+                        <a:buFontTx/>
+                        <a:buNone/>
+                        <a:tabLst/>
+                        <a:defRPr/>
+                      </a:pPr>
+                      <a:r>
+                        <a:rPr lang="en-DE" sz="1500" dirty="0">
+                          <a:latin typeface="Times New Roman" panose="02020603050405020304" pitchFamily="18" charset="0"/>
+                          <a:cs typeface="Times New Roman" panose="02020603050405020304" pitchFamily="18" charset="0"/>
+                        </a:rPr>
+                        <a:t>Hand picked</a:t>
+                      </a:r>
+                      <a:endParaRPr lang="en-DE" sz="1700" dirty="0">
+                        <a:latin typeface="Times New Roman" panose="02020603050405020304" pitchFamily="18" charset="0"/>
+                        <a:cs typeface="Times New Roman" panose="02020603050405020304" pitchFamily="18" charset="0"/>
+                      </a:endParaRPr>
+                    </a:p>
+                  </a:txBody>
+                  <a:tcPr marL="85045" marR="85045" marT="42522" marB="42522"/>
+                </a:tc>
+                <a:tc>
+                  <a:txBody>
+                    <a:bodyPr/>
+                    <a:lstStyle/>
+                    <a:p>
+                      <a:r>
+                        <a:rPr lang="en-DE" sz="1700" b="0" dirty="0">
+                          <a:solidFill>
+                            <a:schemeClr val="tx1"/>
+                          </a:solidFill>
+                          <a:latin typeface="Times New Roman" panose="02020603050405020304" pitchFamily="18" charset="0"/>
+                          <a:cs typeface="Times New Roman" panose="02020603050405020304" pitchFamily="18" charset="0"/>
+                        </a:rPr>
+                        <a:t>2</a:t>
+                      </a:r>
+                    </a:p>
+                  </a:txBody>
+                  <a:tcPr marL="85045" marR="85045" marT="42522" marB="42522"/>
+                </a:tc>
+                <a:tc>
+                  <a:txBody>
+                    <a:bodyPr/>
+                    <a:lstStyle/>
+                    <a:p>
+                      <a:r>
+                        <a:rPr lang="en-DE" sz="1700" b="0" dirty="0">
+                          <a:solidFill>
+                            <a:schemeClr val="tx1"/>
+                          </a:solidFill>
+                          <a:latin typeface="Times New Roman" panose="02020603050405020304" pitchFamily="18" charset="0"/>
+                          <a:cs typeface="Times New Roman" panose="02020603050405020304" pitchFamily="18" charset="0"/>
+                        </a:rPr>
+                        <a:t>0.7</a:t>
+                      </a:r>
+                    </a:p>
+                  </a:txBody>
+                  <a:tcPr marL="85045" marR="85045" marT="42522" marB="42522"/>
+                </a:tc>
+                <a:tc>
+                  <a:txBody>
+                    <a:bodyPr/>
+                    <a:lstStyle/>
+                    <a:p>
+                      <a:r>
+                        <a:rPr lang="en-DE" sz="1700" b="0" dirty="0">
+                          <a:solidFill>
+                            <a:schemeClr val="tx1"/>
+                          </a:solidFill>
+                          <a:latin typeface="Times New Roman" panose="02020603050405020304" pitchFamily="18" charset="0"/>
+                          <a:cs typeface="Times New Roman" panose="02020603050405020304" pitchFamily="18" charset="0"/>
+                        </a:rPr>
+                        <a:t>1.1</a:t>
+                      </a:r>
+                    </a:p>
+                  </a:txBody>
+                  <a:tcPr marL="85045" marR="85045" marT="42522" marB="42522"/>
+                </a:tc>
+                <a:extLst>
+                  <a:ext uri="{0D108BD9-81ED-4DB2-BD59-A6C34878D82A}">
+                    <a16:rowId xmlns:a16="http://schemas.microsoft.com/office/drawing/2014/main" val="1143183472"/>
+                  </a:ext>
+                </a:extLst>
+              </a:tr>
+              <a:tr h="0">
+                <a:tc>
+                  <a:txBody>
+                    <a:bodyPr/>
+                    <a:lstStyle/>
+                    <a:p>
+                      <a:r>
+                        <a:rPr lang="en-GB" sz="1700" b="0" dirty="0">
+                          <a:solidFill>
+                            <a:schemeClr val="tx1"/>
+                          </a:solidFill>
+                          <a:latin typeface="Times New Roman" panose="02020603050405020304" pitchFamily="18" charset="0"/>
+                          <a:cs typeface="Times New Roman" panose="02020603050405020304" pitchFamily="18" charset="0"/>
+                        </a:rPr>
+                        <a:t>B</a:t>
+                      </a:r>
+                      <a:r>
+                        <a:rPr lang="en-DE" sz="1700" b="0" dirty="0">
+                          <a:solidFill>
+                            <a:schemeClr val="tx1"/>
+                          </a:solidFill>
+                          <a:latin typeface="Times New Roman" panose="02020603050405020304" pitchFamily="18" charset="0"/>
+                          <a:cs typeface="Times New Roman" panose="02020603050405020304" pitchFamily="18" charset="0"/>
+                        </a:rPr>
+                        <a:t>est fit</a:t>
+                      </a:r>
+                    </a:p>
+                  </a:txBody>
+                  <a:tcPr marL="85045" marR="85045" marT="42522" marB="42522"/>
+                </a:tc>
+                <a:tc>
+                  <a:txBody>
+                    <a:bodyPr/>
+                    <a:lstStyle/>
+                    <a:p>
+                      <a:r>
+                        <a:rPr lang="en-DE" sz="1700" b="0" dirty="0">
+                          <a:solidFill>
+                            <a:schemeClr val="tx1"/>
+                          </a:solidFill>
+                          <a:latin typeface="Times New Roman" panose="02020603050405020304" pitchFamily="18" charset="0"/>
+                          <a:cs typeface="Times New Roman" panose="02020603050405020304" pitchFamily="18" charset="0"/>
+                        </a:rPr>
+                        <a:t>0.65</a:t>
+                      </a:r>
+                    </a:p>
+                  </a:txBody>
+                  <a:tcPr marL="85045" marR="85045" marT="42522" marB="42522"/>
+                </a:tc>
+                <a:tc>
+                  <a:txBody>
+                    <a:bodyPr/>
+                    <a:lstStyle/>
+                    <a:p>
+                      <a:r>
+                        <a:rPr lang="en-DE" sz="1700" b="0" dirty="0">
+                          <a:solidFill>
+                            <a:schemeClr val="tx1"/>
+                          </a:solidFill>
+                          <a:latin typeface="Times New Roman" panose="02020603050405020304" pitchFamily="18" charset="0"/>
+                          <a:cs typeface="Times New Roman" panose="02020603050405020304" pitchFamily="18" charset="0"/>
+                        </a:rPr>
+                        <a:t>0.25</a:t>
+                      </a:r>
+                    </a:p>
+                  </a:txBody>
+                  <a:tcPr marL="85045" marR="85045" marT="42522" marB="42522"/>
+                </a:tc>
+                <a:tc>
+                  <a:txBody>
+                    <a:bodyPr/>
+                    <a:lstStyle/>
+                    <a:p>
+                      <a:r>
+                        <a:rPr lang="en-DE" sz="1700" b="0" dirty="0">
+                          <a:solidFill>
+                            <a:schemeClr val="tx1"/>
+                          </a:solidFill>
+                          <a:latin typeface="Times New Roman" panose="02020603050405020304" pitchFamily="18" charset="0"/>
+                          <a:cs typeface="Times New Roman" panose="02020603050405020304" pitchFamily="18" charset="0"/>
+                        </a:rPr>
+                        <a:t>2.1</a:t>
+                      </a:r>
+                    </a:p>
+                  </a:txBody>
+                  <a:tcPr marL="85045" marR="85045" marT="42522" marB="42522"/>
+                </a:tc>
+                <a:extLst>
+                  <a:ext uri="{0D108BD9-81ED-4DB2-BD59-A6C34878D82A}">
+                    <a16:rowId xmlns:a16="http://schemas.microsoft.com/office/drawing/2014/main" val="3031271706"/>
+                  </a:ext>
+                </a:extLst>
+              </a:tr>
+              <a:tr h="0">
+                <a:tc>
+                  <a:txBody>
+                    <a:bodyPr/>
+                    <a:lstStyle/>
+                    <a:p>
+                      <a:r>
+                        <a:rPr lang="en-DE" sz="1700" b="0" dirty="0">
+                          <a:solidFill>
+                            <a:schemeClr val="tx1"/>
+                          </a:solidFill>
+                          <a:latin typeface="Times New Roman" panose="02020603050405020304" pitchFamily="18" charset="0"/>
+                          <a:cs typeface="Times New Roman" panose="02020603050405020304" pitchFamily="18" charset="0"/>
+                        </a:rPr>
+                        <a:t>Worst fit</a:t>
+                      </a:r>
+                    </a:p>
+                  </a:txBody>
+                  <a:tcPr marL="85045" marR="85045" marT="42522" marB="42522"/>
+                </a:tc>
+                <a:tc>
+                  <a:txBody>
+                    <a:bodyPr/>
+                    <a:lstStyle/>
+                    <a:p>
+                      <a:r>
+                        <a:rPr lang="en-DE" sz="1700" b="0" dirty="0">
+                          <a:solidFill>
+                            <a:schemeClr val="tx1"/>
+                          </a:solidFill>
+                          <a:latin typeface="Times New Roman" panose="02020603050405020304" pitchFamily="18" charset="0"/>
+                          <a:cs typeface="Times New Roman" panose="02020603050405020304" pitchFamily="18" charset="0"/>
+                        </a:rPr>
+                        <a:t>1.9</a:t>
+                      </a:r>
+                    </a:p>
+                  </a:txBody>
+                  <a:tcPr marL="85045" marR="85045" marT="42522" marB="42522"/>
+                </a:tc>
+                <a:tc>
+                  <a:txBody>
+                    <a:bodyPr/>
+                    <a:lstStyle/>
+                    <a:p>
+                      <a:r>
+                        <a:rPr lang="en-DE" sz="1700" b="0" dirty="0">
+                          <a:solidFill>
+                            <a:schemeClr val="tx1"/>
+                          </a:solidFill>
+                          <a:latin typeface="Times New Roman" panose="02020603050405020304" pitchFamily="18" charset="0"/>
+                          <a:cs typeface="Times New Roman" panose="02020603050405020304" pitchFamily="18" charset="0"/>
+                        </a:rPr>
+                        <a:t>0.9</a:t>
+                      </a:r>
+                    </a:p>
+                  </a:txBody>
+                  <a:tcPr marL="85045" marR="85045" marT="42522" marB="42522"/>
+                </a:tc>
+                <a:tc>
+                  <a:txBody>
+                    <a:bodyPr/>
+                    <a:lstStyle/>
+                    <a:p>
+                      <a:r>
+                        <a:rPr lang="en-DE" sz="1700" b="0" dirty="0">
+                          <a:solidFill>
+                            <a:schemeClr val="tx1"/>
+                          </a:solidFill>
+                          <a:latin typeface="Times New Roman" panose="02020603050405020304" pitchFamily="18" charset="0"/>
+                          <a:cs typeface="Times New Roman" panose="02020603050405020304" pitchFamily="18" charset="0"/>
+                        </a:rPr>
+                        <a:t>1.1</a:t>
+                      </a:r>
+                    </a:p>
+                  </a:txBody>
+                  <a:tcPr marL="85045" marR="85045" marT="42522" marB="42522"/>
+                </a:tc>
+                <a:extLst>
+                  <a:ext uri="{0D108BD9-81ED-4DB2-BD59-A6C34878D82A}">
+                    <a16:rowId xmlns:a16="http://schemas.microsoft.com/office/drawing/2014/main" val="612192117"/>
+                  </a:ext>
+                </a:extLst>
+              </a:tr>
+            </a:tbl>
+          </a:graphicData>
+        </a:graphic>
+      </p:graphicFrame>
+      <p:pic>
+        <p:nvPicPr>
+          <p:cNvPr id="3074" name="Picture 2">
+            <a:extLst>
+              <a:ext uri="{FF2B5EF4-FFF2-40B4-BE49-F238E27FC236}">
+                <a16:creationId xmlns:a16="http://schemas.microsoft.com/office/drawing/2014/main" id="{162A4276-EBFE-6543-65E9-8813747CA589}"/>
+              </a:ext>
+            </a:extLst>
+          </p:cNvPr>
+          <p:cNvPicPr>
+            <a:picLocks noChangeAspect="1" noChangeArrowheads="1"/>
+          </p:cNvPicPr>
+          <p:nvPr/>
+        </p:nvPicPr>
+        <p:blipFill>
+          <a:blip r:embed="rId2">
+            <a:extLst>
+              <a:ext uri="{28A0092B-C50C-407E-A947-70E740481C1C}">
+                <a14:useLocalDpi xmlns:a14="http://schemas.microsoft.com/office/drawing/2010/main" val="0"/>
+              </a:ext>
+            </a:extLst>
+          </a:blip>
+          <a:srcRect/>
+          <a:stretch/>
+        </p:blipFill>
+        <p:spPr bwMode="auto">
+          <a:xfrm>
+            <a:off x="3370228" y="1453743"/>
+            <a:ext cx="5637816" cy="4461229"/>
+          </a:xfrm>
+          <a:prstGeom prst="rect">
+            <a:avLst/>
+          </a:prstGeom>
+          <a:noFill/>
+          <a:extLst>
+            <a:ext uri="{909E8E84-426E-40DD-AFC4-6F175D3DCCD1}">
+              <a14:hiddenFill xmlns:a14="http://schemas.microsoft.com/office/drawing/2010/main">
+                <a:solidFill>
+                  <a:srgbClr val="FFFFFF"/>
+                </a:solidFill>
+              </a14:hiddenFill>
+            </a:ext>
+          </a:extLst>
+        </p:spPr>
+      </p:pic>
+    </p:spTree>
+    <p:extLst>
+      <p:ext uri="{BB962C8B-B14F-4D97-AF65-F5344CB8AC3E}">
+        <p14:creationId xmlns:p14="http://schemas.microsoft.com/office/powerpoint/2010/main" val="1075039795"/>
+      </p:ext>
+    </p:extLst>
+  </p:cSld>
+  <p:clrMapOvr>
+    <a:masterClrMapping/>
+  </p:clrMapOvr>
+</p:sld>
+</file>
+
+<file path=ppt/slides/slide13.xml><?xml version="1.0" encoding="utf-8"?>
+<p:sld xmlns:a="http://schemas.openxmlformats.org/drawingml/2006/main" xmlns:r="http://schemas.openxmlformats.org/officeDocument/2006/relationships" xmlns:p="http://schemas.openxmlformats.org/presentationml/2006/main">
+  <p:cSld>
+    <p:spTree>
+      <p:nvGrpSpPr>
+        <p:cNvPr id="1" name=""/>
+        <p:cNvGrpSpPr/>
+        <p:nvPr/>
+      </p:nvGrpSpPr>
+      <p:grpSpPr>
+        <a:xfrm>
+          <a:off x="0" y="0"/>
+          <a:ext cx="0" cy="0"/>
+          <a:chOff x="0" y="0"/>
+          <a:chExt cx="0" cy="0"/>
+        </a:xfrm>
+      </p:grpSpPr>
+      <p:sp>
+        <p:nvSpPr>
+          <p:cNvPr id="2" name="Title 1">
+            <a:extLst>
+              <a:ext uri="{FF2B5EF4-FFF2-40B4-BE49-F238E27FC236}">
                 <a16:creationId xmlns:a16="http://schemas.microsoft.com/office/drawing/2014/main" id="{F05AE0EA-9D89-F882-4D38-C49C0F8E0019}"/>
               </a:ext>
             </a:extLst>
@@ -2538,7 +4640,7 @@
               <a:pPr>
                 <a:defRPr/>
               </a:pPr>
-              <a:t>10</a:t>
+              <a:t>13</a:t>
             </a:fld>
             <a:endParaRPr lang="en-US" altLang="de-DE"/>
           </a:p>
@@ -2548,6 +4650,1975 @@
     <p:extLst>
       <p:ext uri="{BB962C8B-B14F-4D97-AF65-F5344CB8AC3E}">
         <p14:creationId xmlns:p14="http://schemas.microsoft.com/office/powerpoint/2010/main" val="2236608182"/>
+      </p:ext>
+    </p:extLst>
+  </p:cSld>
+  <p:clrMapOvr>
+    <a:masterClrMapping/>
+  </p:clrMapOvr>
+</p:sld>
+</file>
+
+<file path=ppt/slides/slide14.xml><?xml version="1.0" encoding="utf-8"?>
+<p:sld xmlns:a="http://schemas.openxmlformats.org/drawingml/2006/main" xmlns:r="http://schemas.openxmlformats.org/officeDocument/2006/relationships" xmlns:p="http://schemas.openxmlformats.org/presentationml/2006/main">
+  <p:cSld>
+    <p:spTree>
+      <p:nvGrpSpPr>
+        <p:cNvPr id="1" name=""/>
+        <p:cNvGrpSpPr/>
+        <p:nvPr/>
+      </p:nvGrpSpPr>
+      <p:grpSpPr>
+        <a:xfrm>
+          <a:off x="0" y="0"/>
+          <a:ext cx="0" cy="0"/>
+          <a:chOff x="0" y="0"/>
+          <a:chExt cx="0" cy="0"/>
+        </a:xfrm>
+      </p:grpSpPr>
+      <p:sp>
+        <p:nvSpPr>
+          <p:cNvPr id="2" name="Title 1">
+            <a:extLst>
+              <a:ext uri="{FF2B5EF4-FFF2-40B4-BE49-F238E27FC236}">
+                <a16:creationId xmlns:a16="http://schemas.microsoft.com/office/drawing/2014/main" id="{F0AF2F40-74DF-8225-2203-7B418F73536B}"/>
+              </a:ext>
+            </a:extLst>
+          </p:cNvPr>
+          <p:cNvSpPr>
+            <a:spLocks noGrp="1"/>
+          </p:cNvSpPr>
+          <p:nvPr>
+            <p:ph type="title"/>
+          </p:nvPr>
+        </p:nvSpPr>
+        <p:spPr>
+          <a:xfrm>
+            <a:off x="537368" y="3001963"/>
+            <a:ext cx="7993063" cy="646112"/>
+          </a:xfrm>
+        </p:spPr>
+        <p:txBody>
+          <a:bodyPr/>
+          <a:lstStyle/>
+          <a:p>
+            <a:r>
+              <a:rPr lang="en-GB" sz="3600" dirty="0">
+                <a:effectLst/>
+                <a:latin typeface="Helvetica Neue" panose="02000503000000020004" pitchFamily="2" charset="0"/>
+              </a:rPr>
+              <a:t>Re-modelling of data over 10km</a:t>
+            </a:r>
+            <a:br>
+              <a:rPr lang="en-GB" sz="3600" dirty="0">
+                <a:effectLst/>
+                <a:latin typeface="Helvetica Neue" panose="02000503000000020004" pitchFamily="2" charset="0"/>
+              </a:rPr>
+            </a:br>
+            <a:br>
+              <a:rPr lang="en-GB" sz="3600" dirty="0">
+                <a:effectLst/>
+                <a:latin typeface="Helvetica Neue" panose="02000503000000020004" pitchFamily="2" charset="0"/>
+              </a:rPr>
+            </a:br>
+            <a:r>
+              <a:rPr lang="en-GB" sz="3200" dirty="0">
+                <a:solidFill>
+                  <a:schemeClr val="tx1"/>
+                </a:solidFill>
+                <a:latin typeface="Helvetica Neue" panose="02000503000000020004" pitchFamily="2" charset="0"/>
+              </a:rPr>
+              <a:t>E</a:t>
+            </a:r>
+            <a:r>
+              <a:rPr lang="en-GB" sz="3200" dirty="0">
+                <a:solidFill>
+                  <a:schemeClr val="tx1"/>
+                </a:solidFill>
+                <a:effectLst/>
+                <a:latin typeface="Helvetica Neue" panose="02000503000000020004" pitchFamily="2" charset="0"/>
+              </a:rPr>
+              <a:t>specially for the long distance transport modes</a:t>
+            </a:r>
+            <a:endParaRPr lang="en-DE" sz="3200" dirty="0">
+              <a:solidFill>
+                <a:schemeClr val="tx1"/>
+              </a:solidFill>
+            </a:endParaRPr>
+          </a:p>
+        </p:txBody>
+      </p:sp>
+      <p:sp>
+        <p:nvSpPr>
+          <p:cNvPr id="4" name="Slide Number Placeholder 3">
+            <a:extLst>
+              <a:ext uri="{FF2B5EF4-FFF2-40B4-BE49-F238E27FC236}">
+                <a16:creationId xmlns:a16="http://schemas.microsoft.com/office/drawing/2014/main" id="{8C6FCBB5-7890-72A3-866E-9E65AC5BBF69}"/>
+              </a:ext>
+            </a:extLst>
+          </p:cNvPr>
+          <p:cNvSpPr>
+            <a:spLocks noGrp="1"/>
+          </p:cNvSpPr>
+          <p:nvPr>
+            <p:ph type="sldNum" sz="quarter" idx="10"/>
+          </p:nvPr>
+        </p:nvSpPr>
+        <p:spPr/>
+        <p:txBody>
+          <a:bodyPr/>
+          <a:lstStyle/>
+          <a:p>
+            <a:pPr>
+              <a:defRPr/>
+            </a:pPr>
+            <a:fld id="{13FD7AA2-DC10-7C40-BE93-1CFAEDE49800}" type="slidenum">
+              <a:rPr lang="en-US" altLang="de-DE" smtClean="0"/>
+              <a:pPr>
+                <a:defRPr/>
+              </a:pPr>
+              <a:t>14</a:t>
+            </a:fld>
+            <a:endParaRPr lang="en-US" altLang="de-DE"/>
+          </a:p>
+        </p:txBody>
+      </p:sp>
+    </p:spTree>
+    <p:extLst>
+      <p:ext uri="{BB962C8B-B14F-4D97-AF65-F5344CB8AC3E}">
+        <p14:creationId xmlns:p14="http://schemas.microsoft.com/office/powerpoint/2010/main" val="3214455739"/>
+      </p:ext>
+    </p:extLst>
+  </p:cSld>
+  <p:clrMapOvr>
+    <a:masterClrMapping/>
+  </p:clrMapOvr>
+</p:sld>
+</file>
+
+<file path=ppt/slides/slide15.xml><?xml version="1.0" encoding="utf-8"?>
+<p:sld xmlns:a="http://schemas.openxmlformats.org/drawingml/2006/main" xmlns:r="http://schemas.openxmlformats.org/officeDocument/2006/relationships" xmlns:p="http://schemas.openxmlformats.org/presentationml/2006/main">
+  <p:cSld>
+    <p:spTree>
+      <p:nvGrpSpPr>
+        <p:cNvPr id="1" name=""/>
+        <p:cNvGrpSpPr/>
+        <p:nvPr/>
+      </p:nvGrpSpPr>
+      <p:grpSpPr>
+        <a:xfrm>
+          <a:off x="0" y="0"/>
+          <a:ext cx="0" cy="0"/>
+          <a:chOff x="0" y="0"/>
+          <a:chExt cx="0" cy="0"/>
+        </a:xfrm>
+      </p:grpSpPr>
+      <p:sp>
+        <p:nvSpPr>
+          <p:cNvPr id="2" name="Title 1">
+            <a:extLst>
+              <a:ext uri="{FF2B5EF4-FFF2-40B4-BE49-F238E27FC236}">
+                <a16:creationId xmlns:a16="http://schemas.microsoft.com/office/drawing/2014/main" id="{FD5F5B2C-D6F2-BF7E-E8D7-813995702D15}"/>
+              </a:ext>
+            </a:extLst>
+          </p:cNvPr>
+          <p:cNvSpPr>
+            <a:spLocks noGrp="1"/>
+          </p:cNvSpPr>
+          <p:nvPr>
+            <p:ph type="title"/>
+          </p:nvPr>
+        </p:nvSpPr>
+        <p:spPr/>
+        <p:txBody>
+          <a:bodyPr/>
+          <a:lstStyle/>
+          <a:p>
+            <a:r>
+              <a:rPr lang="en-DE" sz="2000" dirty="0"/>
+              <a:t>Modelling-Short Range in Nhts17-New Params Selected-New Error function- p can be 0-modelling over 10km</a:t>
+            </a:r>
+          </a:p>
+        </p:txBody>
+      </p:sp>
+      <p:sp>
+        <p:nvSpPr>
+          <p:cNvPr id="3" name="Content Placeholder 2">
+            <a:extLst>
+              <a:ext uri="{FF2B5EF4-FFF2-40B4-BE49-F238E27FC236}">
+                <a16:creationId xmlns:a16="http://schemas.microsoft.com/office/drawing/2014/main" id="{7E6EDD97-98F3-F2B7-2E47-B6E3553CF328}"/>
+              </a:ext>
+            </a:extLst>
+          </p:cNvPr>
+          <p:cNvSpPr>
+            <a:spLocks noGrp="1"/>
+          </p:cNvSpPr>
+          <p:nvPr>
+            <p:ph idx="1"/>
+          </p:nvPr>
+        </p:nvSpPr>
+        <p:spPr>
+          <a:xfrm>
+            <a:off x="533401" y="914399"/>
+            <a:ext cx="3719286" cy="5441953"/>
+          </a:xfrm>
+        </p:spPr>
+        <p:txBody>
+          <a:bodyPr>
+            <a:normAutofit fontScale="92500" lnSpcReduction="20000"/>
+          </a:bodyPr>
+          <a:lstStyle/>
+          <a:p>
+            <a:r>
+              <a:rPr lang="en-DE" sz="1900" dirty="0"/>
+              <a:t>Auto Driver in Nhts17 </a:t>
+            </a:r>
+          </a:p>
+          <a:p>
+            <a:pPr lvl="1"/>
+            <a:r>
+              <a:rPr lang="en-GB" sz="1700" dirty="0"/>
+              <a:t>D</a:t>
+            </a:r>
+            <a:r>
+              <a:rPr lang="en-DE" sz="1700" dirty="0"/>
+              <a:t>atasize=</a:t>
+            </a:r>
+            <a:r>
+              <a:rPr lang="en-DE" sz="1600" dirty="0"/>
+              <a:t>10240</a:t>
+            </a:r>
+            <a:endParaRPr lang="en-DE" sz="1700" dirty="0"/>
+          </a:p>
+          <a:p>
+            <a:endParaRPr lang="en-DE" dirty="0"/>
+          </a:p>
+          <a:p>
+            <a:endParaRPr lang="en-DE" dirty="0"/>
+          </a:p>
+          <a:p>
+            <a:endParaRPr lang="en-DE" dirty="0"/>
+          </a:p>
+          <a:p>
+            <a:endParaRPr lang="en-DE" dirty="0"/>
+          </a:p>
+          <a:p>
+            <a:endParaRPr lang="en-DE" dirty="0"/>
+          </a:p>
+          <a:p>
+            <a:endParaRPr lang="en-DE" dirty="0"/>
+          </a:p>
+          <a:p>
+            <a:endParaRPr lang="en-DE" sz="1800" dirty="0"/>
+          </a:p>
+          <a:p>
+            <a:endParaRPr lang="en-DE" sz="1800" dirty="0"/>
+          </a:p>
+          <a:p>
+            <a:r>
+              <a:rPr lang="en-DE" sz="1800" dirty="0"/>
+              <a:t>Best fit error:</a:t>
+            </a:r>
+          </a:p>
+          <a:p>
+            <a:pPr lvl="1"/>
+            <a:r>
+              <a:rPr lang="en-DE" sz="1600" dirty="0"/>
+              <a:t>18.507777898700443</a:t>
+            </a:r>
+          </a:p>
+          <a:p>
+            <a:r>
+              <a:rPr lang="en-DE" sz="1800" dirty="0"/>
+              <a:t>Worst fit error</a:t>
+            </a:r>
+          </a:p>
+          <a:p>
+            <a:pPr lvl="1"/>
+            <a:r>
+              <a:rPr lang="en-DE" sz="1600" dirty="0"/>
+              <a:t>1659.0998960077702</a:t>
+            </a:r>
+          </a:p>
+          <a:p>
+            <a:pPr lvl="1"/>
+            <a:endParaRPr lang="en-DE" sz="1600" dirty="0"/>
+          </a:p>
+          <a:p>
+            <a:r>
+              <a:rPr lang="en-GB" sz="1600" dirty="0" err="1"/>
+              <a:t>p_range</a:t>
+            </a:r>
+            <a:r>
+              <a:rPr lang="en-GB" sz="1600" dirty="0"/>
+              <a:t>=</a:t>
+            </a:r>
+            <a:r>
+              <a:rPr lang="en-GB" sz="1600" dirty="0" err="1"/>
+              <a:t>np.arange</a:t>
+            </a:r>
+            <a:r>
+              <a:rPr lang="en-GB" sz="1600" dirty="0"/>
+              <a:t>(0, 0.95, 0.03)</a:t>
+            </a:r>
+          </a:p>
+          <a:p>
+            <a:r>
+              <a:rPr lang="en-GB" sz="1600" dirty="0" err="1"/>
+              <a:t>eps_range</a:t>
+            </a:r>
+            <a:r>
+              <a:rPr lang="en-GB" sz="1600" dirty="0"/>
+              <a:t>=</a:t>
+            </a:r>
+            <a:r>
+              <a:rPr lang="en-GB" sz="1600" dirty="0" err="1"/>
+              <a:t>np.arange</a:t>
+            </a:r>
+            <a:r>
+              <a:rPr lang="en-GB" sz="1600" dirty="0"/>
+              <a:t>(0.1,2,0.03)</a:t>
+            </a:r>
+          </a:p>
+          <a:p>
+            <a:r>
+              <a:rPr lang="en-GB" sz="1600" dirty="0"/>
+              <a:t>Error: Wasserstein distance (the earth mover’s distance,)</a:t>
+            </a:r>
+          </a:p>
+          <a:p>
+            <a:r>
+              <a:rPr lang="en-GB" sz="1600" dirty="0"/>
+              <a:t>Largest distance=10000</a:t>
+            </a:r>
+            <a:endParaRPr lang="en-DE" sz="1600" dirty="0"/>
+          </a:p>
+          <a:p>
+            <a:pPr lvl="1"/>
+            <a:endParaRPr lang="en-DE" dirty="0"/>
+          </a:p>
+          <a:p>
+            <a:pPr marL="0" indent="0">
+              <a:buNone/>
+            </a:pPr>
+            <a:endParaRPr lang="en-DE" dirty="0"/>
+          </a:p>
+        </p:txBody>
+      </p:sp>
+      <p:sp>
+        <p:nvSpPr>
+          <p:cNvPr id="4" name="Slide Number Placeholder 3">
+            <a:extLst>
+              <a:ext uri="{FF2B5EF4-FFF2-40B4-BE49-F238E27FC236}">
+                <a16:creationId xmlns:a16="http://schemas.microsoft.com/office/drawing/2014/main" id="{A28BE308-F095-782F-B448-59B534A262BE}"/>
+              </a:ext>
+            </a:extLst>
+          </p:cNvPr>
+          <p:cNvSpPr>
+            <a:spLocks noGrp="1"/>
+          </p:cNvSpPr>
+          <p:nvPr>
+            <p:ph type="sldNum" sz="quarter" idx="10"/>
+          </p:nvPr>
+        </p:nvSpPr>
+        <p:spPr/>
+        <p:txBody>
+          <a:bodyPr/>
+          <a:lstStyle/>
+          <a:p>
+            <a:pPr>
+              <a:defRPr/>
+            </a:pPr>
+            <a:fld id="{13FD7AA2-DC10-7C40-BE93-1CFAEDE49800}" type="slidenum">
+              <a:rPr lang="en-US" altLang="de-DE" smtClean="0"/>
+              <a:pPr>
+                <a:defRPr/>
+              </a:pPr>
+              <a:t>15</a:t>
+            </a:fld>
+            <a:endParaRPr lang="en-US" altLang="de-DE"/>
+          </a:p>
+        </p:txBody>
+      </p:sp>
+      <p:graphicFrame>
+        <p:nvGraphicFramePr>
+          <p:cNvPr id="5" name="Table 5">
+            <a:extLst>
+              <a:ext uri="{FF2B5EF4-FFF2-40B4-BE49-F238E27FC236}">
+                <a16:creationId xmlns:a16="http://schemas.microsoft.com/office/drawing/2014/main" id="{DA0984B5-5203-3327-58A7-79289C37D231}"/>
+              </a:ext>
+            </a:extLst>
+          </p:cNvPr>
+          <p:cNvGraphicFramePr>
+            <a:graphicFrameLocks noGrp="1"/>
+          </p:cNvGraphicFramePr>
+          <p:nvPr>
+            <p:extLst>
+              <p:ext uri="{D42A27DB-BD31-4B8C-83A1-F6EECF244321}">
+                <p14:modId xmlns:p14="http://schemas.microsoft.com/office/powerpoint/2010/main" val="3034857062"/>
+              </p:ext>
+            </p:extLst>
+          </p:nvPr>
+        </p:nvGraphicFramePr>
+        <p:xfrm>
+          <a:off x="685800" y="1542599"/>
+          <a:ext cx="2760628" cy="2092776"/>
+        </p:xfrm>
+        <a:graphic>
+          <a:graphicData uri="http://schemas.openxmlformats.org/drawingml/2006/table">
+            <a:tbl>
+              <a:tblPr firstRow="1" bandRow="1">
+                <a:tableStyleId>{21E4AEA4-8DFA-4A89-87EB-49C32662AFE0}</a:tableStyleId>
+              </a:tblPr>
+              <a:tblGrid>
+                <a:gridCol w="690157">
+                  <a:extLst>
+                    <a:ext uri="{9D8B030D-6E8A-4147-A177-3AD203B41FA5}">
+                      <a16:colId xmlns:a16="http://schemas.microsoft.com/office/drawing/2014/main" val="2015579830"/>
+                    </a:ext>
+                  </a:extLst>
+                </a:gridCol>
+                <a:gridCol w="690157">
+                  <a:extLst>
+                    <a:ext uri="{9D8B030D-6E8A-4147-A177-3AD203B41FA5}">
+                      <a16:colId xmlns:a16="http://schemas.microsoft.com/office/drawing/2014/main" val="831545333"/>
+                    </a:ext>
+                  </a:extLst>
+                </a:gridCol>
+                <a:gridCol w="690157">
+                  <a:extLst>
+                    <a:ext uri="{9D8B030D-6E8A-4147-A177-3AD203B41FA5}">
+                      <a16:colId xmlns:a16="http://schemas.microsoft.com/office/drawing/2014/main" val="3982934071"/>
+                    </a:ext>
+                  </a:extLst>
+                </a:gridCol>
+                <a:gridCol w="690157">
+                  <a:extLst>
+                    <a:ext uri="{9D8B030D-6E8A-4147-A177-3AD203B41FA5}">
+                      <a16:colId xmlns:a16="http://schemas.microsoft.com/office/drawing/2014/main" val="2370268705"/>
+                    </a:ext>
+                  </a:extLst>
+                </a:gridCol>
+              </a:tblGrid>
+              <a:tr h="0">
+                <a:tc>
+                  <a:txBody>
+                    <a:bodyPr/>
+                    <a:lstStyle/>
+                    <a:p>
+                      <a:endParaRPr lang="en-DE" sz="1700" b="0" dirty="0">
+                        <a:solidFill>
+                          <a:schemeClr val="tx1"/>
+                        </a:solidFill>
+                        <a:latin typeface="Times New Roman" panose="02020603050405020304" pitchFamily="18" charset="0"/>
+                        <a:cs typeface="Times New Roman" panose="02020603050405020304" pitchFamily="18" charset="0"/>
+                      </a:endParaRPr>
+                    </a:p>
+                  </a:txBody>
+                  <a:tcPr marL="85045" marR="85045" marT="42522" marB="42522"/>
+                </a:tc>
+                <a:tc>
+                  <a:txBody>
+                    <a:bodyPr/>
+                    <a:lstStyle/>
+                    <a:p>
+                      <a:r>
+                        <a:rPr lang="en-DE" sz="1700" b="0" dirty="0">
+                          <a:solidFill>
+                            <a:schemeClr val="tx1"/>
+                          </a:solidFill>
+                          <a:latin typeface="Times New Roman" panose="02020603050405020304" pitchFamily="18" charset="0"/>
+                          <a:cs typeface="Times New Roman" panose="02020603050405020304" pitchFamily="18" charset="0"/>
+                        </a:rPr>
+                        <a:t>eps</a:t>
+                      </a:r>
+                    </a:p>
+                  </a:txBody>
+                  <a:tcPr marL="85045" marR="85045" marT="42522" marB="42522"/>
+                </a:tc>
+                <a:tc>
+                  <a:txBody>
+                    <a:bodyPr/>
+                    <a:lstStyle/>
+                    <a:p>
+                      <a:r>
+                        <a:rPr lang="en-DE" sz="1700" b="0" dirty="0">
+                          <a:solidFill>
+                            <a:schemeClr val="tx1"/>
+                          </a:solidFill>
+                          <a:latin typeface="Times New Roman" panose="02020603050405020304" pitchFamily="18" charset="0"/>
+                          <a:cs typeface="Times New Roman" panose="02020603050405020304" pitchFamily="18" charset="0"/>
+                        </a:rPr>
+                        <a:t>p</a:t>
+                      </a:r>
+                    </a:p>
+                  </a:txBody>
+                  <a:tcPr marL="85045" marR="85045" marT="42522" marB="42522"/>
+                </a:tc>
+                <a:tc>
+                  <a:txBody>
+                    <a:bodyPr/>
+                    <a:lstStyle/>
+                    <a:p>
+                      <a:r>
+                        <a:rPr lang="en-DE" sz="1700" b="0" dirty="0">
+                          <a:solidFill>
+                            <a:schemeClr val="tx1"/>
+                          </a:solidFill>
+                          <a:latin typeface="Times New Roman" panose="02020603050405020304" pitchFamily="18" charset="0"/>
+                          <a:cs typeface="Times New Roman" panose="02020603050405020304" pitchFamily="18" charset="0"/>
+                        </a:rPr>
+                        <a:t>alpha</a:t>
+                      </a:r>
+                    </a:p>
+                  </a:txBody>
+                  <a:tcPr marL="85045" marR="85045" marT="42522" marB="42522"/>
+                </a:tc>
+                <a:extLst>
+                  <a:ext uri="{0D108BD9-81ED-4DB2-BD59-A6C34878D82A}">
+                    <a16:rowId xmlns:a16="http://schemas.microsoft.com/office/drawing/2014/main" val="2603681906"/>
+                  </a:ext>
+                </a:extLst>
+              </a:tr>
+              <a:tr h="0">
+                <a:tc>
+                  <a:txBody>
+                    <a:bodyPr/>
+                    <a:lstStyle/>
+                    <a:p>
+                      <a:pPr marL="0" marR="0" lvl="0" indent="0" algn="l" defTabSz="685800" rtl="0" eaLnBrk="1" fontAlgn="auto" latinLnBrk="0" hangingPunct="1">
+                        <a:lnSpc>
+                          <a:spcPct val="100000"/>
+                        </a:lnSpc>
+                        <a:spcBef>
+                          <a:spcPts val="0"/>
+                        </a:spcBef>
+                        <a:spcAft>
+                          <a:spcPts val="0"/>
+                        </a:spcAft>
+                        <a:buClrTx/>
+                        <a:buSzTx/>
+                        <a:buFontTx/>
+                        <a:buNone/>
+                        <a:tabLst/>
+                        <a:defRPr/>
+                      </a:pPr>
+                      <a:r>
+                        <a:rPr lang="en-DE" sz="1500" dirty="0">
+                          <a:latin typeface="Times New Roman" panose="02020603050405020304" pitchFamily="18" charset="0"/>
+                          <a:cs typeface="Times New Roman" panose="02020603050405020304" pitchFamily="18" charset="0"/>
+                        </a:rPr>
+                        <a:t>Hand picked</a:t>
+                      </a:r>
+                      <a:endParaRPr lang="en-DE" sz="1700" dirty="0">
+                        <a:latin typeface="Times New Roman" panose="02020603050405020304" pitchFamily="18" charset="0"/>
+                        <a:cs typeface="Times New Roman" panose="02020603050405020304" pitchFamily="18" charset="0"/>
+                      </a:endParaRPr>
+                    </a:p>
+                  </a:txBody>
+                  <a:tcPr marL="85045" marR="85045" marT="42522" marB="42522"/>
+                </a:tc>
+                <a:tc>
+                  <a:txBody>
+                    <a:bodyPr/>
+                    <a:lstStyle/>
+                    <a:p>
+                      <a:r>
+                        <a:rPr lang="en-DE" sz="1700" b="0" dirty="0">
+                          <a:solidFill>
+                            <a:schemeClr val="tx1"/>
+                          </a:solidFill>
+                          <a:latin typeface="Times New Roman" panose="02020603050405020304" pitchFamily="18" charset="0"/>
+                          <a:cs typeface="Times New Roman" panose="02020603050405020304" pitchFamily="18" charset="0"/>
+                        </a:rPr>
+                        <a:t>2</a:t>
+                      </a:r>
+                    </a:p>
+                  </a:txBody>
+                  <a:tcPr marL="85045" marR="85045" marT="42522" marB="42522"/>
+                </a:tc>
+                <a:tc>
+                  <a:txBody>
+                    <a:bodyPr/>
+                    <a:lstStyle/>
+                    <a:p>
+                      <a:r>
+                        <a:rPr lang="en-DE" sz="1700" b="0" dirty="0">
+                          <a:solidFill>
+                            <a:schemeClr val="tx1"/>
+                          </a:solidFill>
+                          <a:latin typeface="Times New Roman" panose="02020603050405020304" pitchFamily="18" charset="0"/>
+                          <a:cs typeface="Times New Roman" panose="02020603050405020304" pitchFamily="18" charset="0"/>
+                        </a:rPr>
+                        <a:t>0.7</a:t>
+                      </a:r>
+                    </a:p>
+                  </a:txBody>
+                  <a:tcPr marL="85045" marR="85045" marT="42522" marB="42522"/>
+                </a:tc>
+                <a:tc>
+                  <a:txBody>
+                    <a:bodyPr/>
+                    <a:lstStyle/>
+                    <a:p>
+                      <a:r>
+                        <a:rPr lang="en-DE" sz="1700" b="0" dirty="0">
+                          <a:solidFill>
+                            <a:schemeClr val="tx1"/>
+                          </a:solidFill>
+                          <a:latin typeface="Times New Roman" panose="02020603050405020304" pitchFamily="18" charset="0"/>
+                          <a:cs typeface="Times New Roman" panose="02020603050405020304" pitchFamily="18" charset="0"/>
+                        </a:rPr>
+                        <a:t>1.1</a:t>
+                      </a:r>
+                    </a:p>
+                  </a:txBody>
+                  <a:tcPr marL="85045" marR="85045" marT="42522" marB="42522"/>
+                </a:tc>
+                <a:extLst>
+                  <a:ext uri="{0D108BD9-81ED-4DB2-BD59-A6C34878D82A}">
+                    <a16:rowId xmlns:a16="http://schemas.microsoft.com/office/drawing/2014/main" val="1143183472"/>
+                  </a:ext>
+                </a:extLst>
+              </a:tr>
+              <a:tr h="0">
+                <a:tc>
+                  <a:txBody>
+                    <a:bodyPr/>
+                    <a:lstStyle/>
+                    <a:p>
+                      <a:r>
+                        <a:rPr lang="en-GB" sz="1700" b="0" dirty="0">
+                          <a:solidFill>
+                            <a:schemeClr val="tx1"/>
+                          </a:solidFill>
+                          <a:latin typeface="Times New Roman" panose="02020603050405020304" pitchFamily="18" charset="0"/>
+                          <a:cs typeface="Times New Roman" panose="02020603050405020304" pitchFamily="18" charset="0"/>
+                        </a:rPr>
+                        <a:t>B</a:t>
+                      </a:r>
+                      <a:r>
+                        <a:rPr lang="en-DE" sz="1700" b="0" dirty="0">
+                          <a:solidFill>
+                            <a:schemeClr val="tx1"/>
+                          </a:solidFill>
+                          <a:latin typeface="Times New Roman" panose="02020603050405020304" pitchFamily="18" charset="0"/>
+                          <a:cs typeface="Times New Roman" panose="02020603050405020304" pitchFamily="18" charset="0"/>
+                        </a:rPr>
+                        <a:t>est fit</a:t>
+                      </a:r>
+                    </a:p>
+                  </a:txBody>
+                  <a:tcPr marL="85045" marR="85045" marT="42522" marB="42522"/>
+                </a:tc>
+                <a:tc>
+                  <a:txBody>
+                    <a:bodyPr/>
+                    <a:lstStyle/>
+                    <a:p>
+                      <a:r>
+                        <a:rPr lang="en-DE" sz="1700" b="0" dirty="0">
+                          <a:solidFill>
+                            <a:schemeClr val="tx1"/>
+                          </a:solidFill>
+                          <a:latin typeface="Times New Roman" panose="02020603050405020304" pitchFamily="18" charset="0"/>
+                          <a:cs typeface="Times New Roman" panose="02020603050405020304" pitchFamily="18" charset="0"/>
+                        </a:rPr>
+                        <a:t>0.95</a:t>
+                      </a:r>
+                    </a:p>
+                  </a:txBody>
+                  <a:tcPr marL="85045" marR="85045" marT="42522" marB="42522"/>
+                </a:tc>
+                <a:tc>
+                  <a:txBody>
+                    <a:bodyPr/>
+                    <a:lstStyle/>
+                    <a:p>
+                      <a:r>
+                        <a:rPr lang="en-DE" sz="1700" b="0" dirty="0">
+                          <a:solidFill>
+                            <a:schemeClr val="tx1"/>
+                          </a:solidFill>
+                          <a:latin typeface="Times New Roman" panose="02020603050405020304" pitchFamily="18" charset="0"/>
+                          <a:cs typeface="Times New Roman" panose="02020603050405020304" pitchFamily="18" charset="0"/>
+                        </a:rPr>
+                        <a:t>0.6</a:t>
+                      </a:r>
+                    </a:p>
+                  </a:txBody>
+                  <a:tcPr marL="85045" marR="85045" marT="42522" marB="42522"/>
+                </a:tc>
+                <a:tc>
+                  <a:txBody>
+                    <a:bodyPr/>
+                    <a:lstStyle/>
+                    <a:p>
+                      <a:r>
+                        <a:rPr lang="en-DE" sz="1700" b="0" dirty="0">
+                          <a:solidFill>
+                            <a:schemeClr val="tx1"/>
+                          </a:solidFill>
+                          <a:latin typeface="Times New Roman" panose="02020603050405020304" pitchFamily="18" charset="0"/>
+                          <a:cs typeface="Times New Roman" panose="02020603050405020304" pitchFamily="18" charset="0"/>
+                        </a:rPr>
+                        <a:t>2.2</a:t>
+                      </a:r>
+                    </a:p>
+                  </a:txBody>
+                  <a:tcPr marL="85045" marR="85045" marT="42522" marB="42522"/>
+                </a:tc>
+                <a:extLst>
+                  <a:ext uri="{0D108BD9-81ED-4DB2-BD59-A6C34878D82A}">
+                    <a16:rowId xmlns:a16="http://schemas.microsoft.com/office/drawing/2014/main" val="3031271706"/>
+                  </a:ext>
+                </a:extLst>
+              </a:tr>
+              <a:tr h="0">
+                <a:tc>
+                  <a:txBody>
+                    <a:bodyPr/>
+                    <a:lstStyle/>
+                    <a:p>
+                      <a:r>
+                        <a:rPr lang="en-DE" sz="1700" b="0" dirty="0">
+                          <a:solidFill>
+                            <a:schemeClr val="tx1"/>
+                          </a:solidFill>
+                          <a:latin typeface="Times New Roman" panose="02020603050405020304" pitchFamily="18" charset="0"/>
+                          <a:cs typeface="Times New Roman" panose="02020603050405020304" pitchFamily="18" charset="0"/>
+                        </a:rPr>
+                        <a:t>Worst fit</a:t>
+                      </a:r>
+                    </a:p>
+                  </a:txBody>
+                  <a:tcPr marL="85045" marR="85045" marT="42522" marB="42522"/>
+                </a:tc>
+                <a:tc>
+                  <a:txBody>
+                    <a:bodyPr/>
+                    <a:lstStyle/>
+                    <a:p>
+                      <a:r>
+                        <a:rPr lang="en-DE" sz="1700" b="0" dirty="0">
+                          <a:solidFill>
+                            <a:schemeClr val="tx1"/>
+                          </a:solidFill>
+                          <a:latin typeface="Times New Roman" panose="02020603050405020304" pitchFamily="18" charset="0"/>
+                          <a:cs typeface="Times New Roman" panose="02020603050405020304" pitchFamily="18" charset="0"/>
+                        </a:rPr>
+                        <a:t>1.99</a:t>
+                      </a:r>
+                    </a:p>
+                  </a:txBody>
+                  <a:tcPr marL="85045" marR="85045" marT="42522" marB="42522"/>
+                </a:tc>
+                <a:tc>
+                  <a:txBody>
+                    <a:bodyPr/>
+                    <a:lstStyle/>
+                    <a:p>
+                      <a:r>
+                        <a:rPr lang="en-DE" sz="1700" b="0" dirty="0">
+                          <a:solidFill>
+                            <a:schemeClr val="tx1"/>
+                          </a:solidFill>
+                          <a:latin typeface="Times New Roman" panose="02020603050405020304" pitchFamily="18" charset="0"/>
+                          <a:cs typeface="Times New Roman" panose="02020603050405020304" pitchFamily="18" charset="0"/>
+                        </a:rPr>
+                        <a:t>0.93</a:t>
+                      </a:r>
+                    </a:p>
+                  </a:txBody>
+                  <a:tcPr marL="85045" marR="85045" marT="42522" marB="42522"/>
+                </a:tc>
+                <a:tc>
+                  <a:txBody>
+                    <a:bodyPr/>
+                    <a:lstStyle/>
+                    <a:p>
+                      <a:r>
+                        <a:rPr lang="en-DE" sz="1700" b="0" dirty="0">
+                          <a:solidFill>
+                            <a:schemeClr val="tx1"/>
+                          </a:solidFill>
+                          <a:latin typeface="Times New Roman" panose="02020603050405020304" pitchFamily="18" charset="0"/>
+                          <a:cs typeface="Times New Roman" panose="02020603050405020304" pitchFamily="18" charset="0"/>
+                        </a:rPr>
+                        <a:t>1.1</a:t>
+                      </a:r>
+                    </a:p>
+                  </a:txBody>
+                  <a:tcPr marL="85045" marR="85045" marT="42522" marB="42522"/>
+                </a:tc>
+                <a:extLst>
+                  <a:ext uri="{0D108BD9-81ED-4DB2-BD59-A6C34878D82A}">
+                    <a16:rowId xmlns:a16="http://schemas.microsoft.com/office/drawing/2014/main" val="612192117"/>
+                  </a:ext>
+                </a:extLst>
+              </a:tr>
+            </a:tbl>
+          </a:graphicData>
+        </a:graphic>
+      </p:graphicFrame>
+      <p:pic>
+        <p:nvPicPr>
+          <p:cNvPr id="6" name="Picture 2">
+            <a:extLst>
+              <a:ext uri="{FF2B5EF4-FFF2-40B4-BE49-F238E27FC236}">
+                <a16:creationId xmlns:a16="http://schemas.microsoft.com/office/drawing/2014/main" id="{112BDAEE-C155-C4A2-3095-E0C404B2CB40}"/>
+              </a:ext>
+            </a:extLst>
+          </p:cNvPr>
+          <p:cNvPicPr>
+            <a:picLocks noChangeAspect="1" noChangeArrowheads="1"/>
+          </p:cNvPicPr>
+          <p:nvPr/>
+        </p:nvPicPr>
+        <p:blipFill>
+          <a:blip r:embed="rId2">
+            <a:extLst>
+              <a:ext uri="{28A0092B-C50C-407E-A947-70E740481C1C}">
+                <a14:useLocalDpi xmlns:a14="http://schemas.microsoft.com/office/drawing/2010/main" val="0"/>
+              </a:ext>
+            </a:extLst>
+          </a:blip>
+          <a:srcRect/>
+          <a:stretch/>
+        </p:blipFill>
+        <p:spPr bwMode="auto">
+          <a:xfrm>
+            <a:off x="3446428" y="1259214"/>
+            <a:ext cx="5637814" cy="4461227"/>
+          </a:xfrm>
+          <a:prstGeom prst="rect">
+            <a:avLst/>
+          </a:prstGeom>
+          <a:noFill/>
+          <a:extLst>
+            <a:ext uri="{909E8E84-426E-40DD-AFC4-6F175D3DCCD1}">
+              <a14:hiddenFill xmlns:a14="http://schemas.microsoft.com/office/drawing/2010/main">
+                <a:solidFill>
+                  <a:srgbClr val="FFFFFF"/>
+                </a:solidFill>
+              </a14:hiddenFill>
+            </a:ext>
+          </a:extLst>
+        </p:spPr>
+      </p:pic>
+    </p:spTree>
+    <p:extLst>
+      <p:ext uri="{BB962C8B-B14F-4D97-AF65-F5344CB8AC3E}">
+        <p14:creationId xmlns:p14="http://schemas.microsoft.com/office/powerpoint/2010/main" val="2750527943"/>
+      </p:ext>
+    </p:extLst>
+  </p:cSld>
+  <p:clrMapOvr>
+    <a:masterClrMapping/>
+  </p:clrMapOvr>
+</p:sld>
+</file>
+
+<file path=ppt/slides/slide16.xml><?xml version="1.0" encoding="utf-8"?>
+<p:sld xmlns:a="http://schemas.openxmlformats.org/drawingml/2006/main" xmlns:r="http://schemas.openxmlformats.org/officeDocument/2006/relationships" xmlns:p="http://schemas.openxmlformats.org/presentationml/2006/main">
+  <p:cSld>
+    <p:spTree>
+      <p:nvGrpSpPr>
+        <p:cNvPr id="1" name=""/>
+        <p:cNvGrpSpPr/>
+        <p:nvPr/>
+      </p:nvGrpSpPr>
+      <p:grpSpPr>
+        <a:xfrm>
+          <a:off x="0" y="0"/>
+          <a:ext cx="0" cy="0"/>
+          <a:chOff x="0" y="0"/>
+          <a:chExt cx="0" cy="0"/>
+        </a:xfrm>
+      </p:grpSpPr>
+      <p:sp>
+        <p:nvSpPr>
+          <p:cNvPr id="2" name="Title 1">
+            <a:extLst>
+              <a:ext uri="{FF2B5EF4-FFF2-40B4-BE49-F238E27FC236}">
+                <a16:creationId xmlns:a16="http://schemas.microsoft.com/office/drawing/2014/main" id="{FD5F5B2C-D6F2-BF7E-E8D7-813995702D15}"/>
+              </a:ext>
+            </a:extLst>
+          </p:cNvPr>
+          <p:cNvSpPr>
+            <a:spLocks noGrp="1"/>
+          </p:cNvSpPr>
+          <p:nvPr>
+            <p:ph type="title"/>
+          </p:nvPr>
+        </p:nvSpPr>
+        <p:spPr/>
+        <p:txBody>
+          <a:bodyPr/>
+          <a:lstStyle/>
+          <a:p>
+            <a:r>
+              <a:rPr lang="en-DE" sz="2000" dirty="0"/>
+              <a:t>Modelling-Short Range in Nhts17-New Params Selected-New Error function- p can be 0-modelling over 10km</a:t>
+            </a:r>
+          </a:p>
+        </p:txBody>
+      </p:sp>
+      <p:sp>
+        <p:nvSpPr>
+          <p:cNvPr id="3" name="Content Placeholder 2">
+            <a:extLst>
+              <a:ext uri="{FF2B5EF4-FFF2-40B4-BE49-F238E27FC236}">
+                <a16:creationId xmlns:a16="http://schemas.microsoft.com/office/drawing/2014/main" id="{7E6EDD97-98F3-F2B7-2E47-B6E3553CF328}"/>
+              </a:ext>
+            </a:extLst>
+          </p:cNvPr>
+          <p:cNvSpPr>
+            <a:spLocks noGrp="1"/>
+          </p:cNvSpPr>
+          <p:nvPr>
+            <p:ph idx="1"/>
+          </p:nvPr>
+        </p:nvSpPr>
+        <p:spPr>
+          <a:xfrm>
+            <a:off x="533401" y="914399"/>
+            <a:ext cx="3719286" cy="5441953"/>
+          </a:xfrm>
+        </p:spPr>
+        <p:txBody>
+          <a:bodyPr>
+            <a:normAutofit fontScale="92500" lnSpcReduction="20000"/>
+          </a:bodyPr>
+          <a:lstStyle/>
+          <a:p>
+            <a:r>
+              <a:rPr lang="en-DE" sz="1900" dirty="0"/>
+              <a:t>Auto Driver in Nhts17 </a:t>
+            </a:r>
+          </a:p>
+          <a:p>
+            <a:pPr lvl="1"/>
+            <a:r>
+              <a:rPr lang="en-GB" sz="1700" dirty="0"/>
+              <a:t>D</a:t>
+            </a:r>
+            <a:r>
+              <a:rPr lang="en-DE" sz="1700" dirty="0"/>
+              <a:t>atasize=</a:t>
+            </a:r>
+            <a:r>
+              <a:rPr lang="en-DE" sz="1600" dirty="0"/>
+              <a:t>10240</a:t>
+            </a:r>
+            <a:endParaRPr lang="en-DE" sz="1700" dirty="0"/>
+          </a:p>
+          <a:p>
+            <a:endParaRPr lang="en-DE" dirty="0"/>
+          </a:p>
+          <a:p>
+            <a:endParaRPr lang="en-DE" dirty="0"/>
+          </a:p>
+          <a:p>
+            <a:endParaRPr lang="en-DE" dirty="0"/>
+          </a:p>
+          <a:p>
+            <a:endParaRPr lang="en-DE" dirty="0"/>
+          </a:p>
+          <a:p>
+            <a:endParaRPr lang="en-DE" dirty="0"/>
+          </a:p>
+          <a:p>
+            <a:endParaRPr lang="en-DE" dirty="0"/>
+          </a:p>
+          <a:p>
+            <a:endParaRPr lang="en-DE" sz="1800" dirty="0"/>
+          </a:p>
+          <a:p>
+            <a:endParaRPr lang="en-DE" sz="1800" dirty="0"/>
+          </a:p>
+          <a:p>
+            <a:r>
+              <a:rPr lang="en-DE" sz="1800" dirty="0"/>
+              <a:t>Best fit error:</a:t>
+            </a:r>
+          </a:p>
+          <a:p>
+            <a:pPr lvl="1"/>
+            <a:r>
+              <a:rPr lang="en-DE" sz="1600" dirty="0"/>
+              <a:t>4.688603224779429</a:t>
+            </a:r>
+          </a:p>
+          <a:p>
+            <a:r>
+              <a:rPr lang="en-DE" sz="1800" dirty="0"/>
+              <a:t>Worst fit error</a:t>
+            </a:r>
+          </a:p>
+          <a:p>
+            <a:pPr lvl="1"/>
+            <a:r>
+              <a:rPr lang="en-DE" sz="1600" dirty="0"/>
+              <a:t>1923.568854148891</a:t>
+            </a:r>
+          </a:p>
+          <a:p>
+            <a:pPr lvl="1"/>
+            <a:endParaRPr lang="en-DE" sz="1600" dirty="0"/>
+          </a:p>
+          <a:p>
+            <a:r>
+              <a:rPr lang="en-GB" sz="1600" dirty="0" err="1"/>
+              <a:t>p_range</a:t>
+            </a:r>
+            <a:r>
+              <a:rPr lang="en-GB" sz="1600" dirty="0"/>
+              <a:t>=</a:t>
+            </a:r>
+            <a:r>
+              <a:rPr lang="en-GB" sz="1600" dirty="0" err="1"/>
+              <a:t>np.arange</a:t>
+            </a:r>
+            <a:r>
+              <a:rPr lang="en-GB" sz="1600" dirty="0"/>
+              <a:t>(0, 0.95, 0.03)</a:t>
+            </a:r>
+          </a:p>
+          <a:p>
+            <a:r>
+              <a:rPr lang="en-GB" sz="1600" dirty="0" err="1"/>
+              <a:t>eps_range</a:t>
+            </a:r>
+            <a:r>
+              <a:rPr lang="en-GB" sz="1600" dirty="0"/>
+              <a:t>=</a:t>
+            </a:r>
+            <a:r>
+              <a:rPr lang="en-GB" sz="1600" dirty="0" err="1"/>
+              <a:t>np.arange</a:t>
+            </a:r>
+            <a:r>
+              <a:rPr lang="en-GB" sz="1600" dirty="0"/>
+              <a:t>(0.1,2,0.03)</a:t>
+            </a:r>
+          </a:p>
+          <a:p>
+            <a:r>
+              <a:rPr lang="en-GB" sz="1600" dirty="0"/>
+              <a:t>Error: Wasserstein distance (the earth mover’s distance,)</a:t>
+            </a:r>
+          </a:p>
+          <a:p>
+            <a:r>
+              <a:rPr lang="en-GB" sz="1600" dirty="0"/>
+              <a:t>Largest distance=10000 and shortest&gt;10</a:t>
+            </a:r>
+            <a:endParaRPr lang="en-DE" sz="1600" dirty="0"/>
+          </a:p>
+          <a:p>
+            <a:pPr lvl="1"/>
+            <a:endParaRPr lang="en-DE" dirty="0"/>
+          </a:p>
+          <a:p>
+            <a:pPr marL="0" indent="0">
+              <a:buNone/>
+            </a:pPr>
+            <a:endParaRPr lang="en-DE" dirty="0"/>
+          </a:p>
+        </p:txBody>
+      </p:sp>
+      <p:sp>
+        <p:nvSpPr>
+          <p:cNvPr id="4" name="Slide Number Placeholder 3">
+            <a:extLst>
+              <a:ext uri="{FF2B5EF4-FFF2-40B4-BE49-F238E27FC236}">
+                <a16:creationId xmlns:a16="http://schemas.microsoft.com/office/drawing/2014/main" id="{A28BE308-F095-782F-B448-59B534A262BE}"/>
+              </a:ext>
+            </a:extLst>
+          </p:cNvPr>
+          <p:cNvSpPr>
+            <a:spLocks noGrp="1"/>
+          </p:cNvSpPr>
+          <p:nvPr>
+            <p:ph type="sldNum" sz="quarter" idx="10"/>
+          </p:nvPr>
+        </p:nvSpPr>
+        <p:spPr/>
+        <p:txBody>
+          <a:bodyPr/>
+          <a:lstStyle/>
+          <a:p>
+            <a:pPr>
+              <a:defRPr/>
+            </a:pPr>
+            <a:fld id="{13FD7AA2-DC10-7C40-BE93-1CFAEDE49800}" type="slidenum">
+              <a:rPr lang="en-US" altLang="de-DE" smtClean="0"/>
+              <a:pPr>
+                <a:defRPr/>
+              </a:pPr>
+              <a:t>16</a:t>
+            </a:fld>
+            <a:endParaRPr lang="en-US" altLang="de-DE"/>
+          </a:p>
+        </p:txBody>
+      </p:sp>
+      <p:graphicFrame>
+        <p:nvGraphicFramePr>
+          <p:cNvPr id="5" name="Table 5">
+            <a:extLst>
+              <a:ext uri="{FF2B5EF4-FFF2-40B4-BE49-F238E27FC236}">
+                <a16:creationId xmlns:a16="http://schemas.microsoft.com/office/drawing/2014/main" id="{DA0984B5-5203-3327-58A7-79289C37D231}"/>
+              </a:ext>
+            </a:extLst>
+          </p:cNvPr>
+          <p:cNvGraphicFramePr>
+            <a:graphicFrameLocks noGrp="1"/>
+          </p:cNvGraphicFramePr>
+          <p:nvPr>
+            <p:extLst>
+              <p:ext uri="{D42A27DB-BD31-4B8C-83A1-F6EECF244321}">
+                <p14:modId xmlns:p14="http://schemas.microsoft.com/office/powerpoint/2010/main" val="62582663"/>
+              </p:ext>
+            </p:extLst>
+          </p:nvPr>
+        </p:nvGraphicFramePr>
+        <p:xfrm>
+          <a:off x="685800" y="1542599"/>
+          <a:ext cx="2760628" cy="2092776"/>
+        </p:xfrm>
+        <a:graphic>
+          <a:graphicData uri="http://schemas.openxmlformats.org/drawingml/2006/table">
+            <a:tbl>
+              <a:tblPr firstRow="1" bandRow="1">
+                <a:tableStyleId>{21E4AEA4-8DFA-4A89-87EB-49C32662AFE0}</a:tableStyleId>
+              </a:tblPr>
+              <a:tblGrid>
+                <a:gridCol w="690157">
+                  <a:extLst>
+                    <a:ext uri="{9D8B030D-6E8A-4147-A177-3AD203B41FA5}">
+                      <a16:colId xmlns:a16="http://schemas.microsoft.com/office/drawing/2014/main" val="2015579830"/>
+                    </a:ext>
+                  </a:extLst>
+                </a:gridCol>
+                <a:gridCol w="690157">
+                  <a:extLst>
+                    <a:ext uri="{9D8B030D-6E8A-4147-A177-3AD203B41FA5}">
+                      <a16:colId xmlns:a16="http://schemas.microsoft.com/office/drawing/2014/main" val="831545333"/>
+                    </a:ext>
+                  </a:extLst>
+                </a:gridCol>
+                <a:gridCol w="690157">
+                  <a:extLst>
+                    <a:ext uri="{9D8B030D-6E8A-4147-A177-3AD203B41FA5}">
+                      <a16:colId xmlns:a16="http://schemas.microsoft.com/office/drawing/2014/main" val="3982934071"/>
+                    </a:ext>
+                  </a:extLst>
+                </a:gridCol>
+                <a:gridCol w="690157">
+                  <a:extLst>
+                    <a:ext uri="{9D8B030D-6E8A-4147-A177-3AD203B41FA5}">
+                      <a16:colId xmlns:a16="http://schemas.microsoft.com/office/drawing/2014/main" val="2370268705"/>
+                    </a:ext>
+                  </a:extLst>
+                </a:gridCol>
+              </a:tblGrid>
+              <a:tr h="0">
+                <a:tc>
+                  <a:txBody>
+                    <a:bodyPr/>
+                    <a:lstStyle/>
+                    <a:p>
+                      <a:endParaRPr lang="en-DE" sz="1700" b="0" dirty="0">
+                        <a:solidFill>
+                          <a:schemeClr val="tx1"/>
+                        </a:solidFill>
+                        <a:latin typeface="Times New Roman" panose="02020603050405020304" pitchFamily="18" charset="0"/>
+                        <a:cs typeface="Times New Roman" panose="02020603050405020304" pitchFamily="18" charset="0"/>
+                      </a:endParaRPr>
+                    </a:p>
+                  </a:txBody>
+                  <a:tcPr marL="85045" marR="85045" marT="42522" marB="42522"/>
+                </a:tc>
+                <a:tc>
+                  <a:txBody>
+                    <a:bodyPr/>
+                    <a:lstStyle/>
+                    <a:p>
+                      <a:r>
+                        <a:rPr lang="en-DE" sz="1700" b="0" dirty="0">
+                          <a:solidFill>
+                            <a:schemeClr val="tx1"/>
+                          </a:solidFill>
+                          <a:latin typeface="Times New Roman" panose="02020603050405020304" pitchFamily="18" charset="0"/>
+                          <a:cs typeface="Times New Roman" panose="02020603050405020304" pitchFamily="18" charset="0"/>
+                        </a:rPr>
+                        <a:t>eps</a:t>
+                      </a:r>
+                    </a:p>
+                  </a:txBody>
+                  <a:tcPr marL="85045" marR="85045" marT="42522" marB="42522"/>
+                </a:tc>
+                <a:tc>
+                  <a:txBody>
+                    <a:bodyPr/>
+                    <a:lstStyle/>
+                    <a:p>
+                      <a:r>
+                        <a:rPr lang="en-DE" sz="1700" b="0" dirty="0">
+                          <a:solidFill>
+                            <a:schemeClr val="tx1"/>
+                          </a:solidFill>
+                          <a:latin typeface="Times New Roman" panose="02020603050405020304" pitchFamily="18" charset="0"/>
+                          <a:cs typeface="Times New Roman" panose="02020603050405020304" pitchFamily="18" charset="0"/>
+                        </a:rPr>
+                        <a:t>p</a:t>
+                      </a:r>
+                    </a:p>
+                  </a:txBody>
+                  <a:tcPr marL="85045" marR="85045" marT="42522" marB="42522"/>
+                </a:tc>
+                <a:tc>
+                  <a:txBody>
+                    <a:bodyPr/>
+                    <a:lstStyle/>
+                    <a:p>
+                      <a:r>
+                        <a:rPr lang="en-DE" sz="1700" b="0" dirty="0">
+                          <a:solidFill>
+                            <a:schemeClr val="tx1"/>
+                          </a:solidFill>
+                          <a:latin typeface="Times New Roman" panose="02020603050405020304" pitchFamily="18" charset="0"/>
+                          <a:cs typeface="Times New Roman" panose="02020603050405020304" pitchFamily="18" charset="0"/>
+                        </a:rPr>
+                        <a:t>alpha</a:t>
+                      </a:r>
+                    </a:p>
+                  </a:txBody>
+                  <a:tcPr marL="85045" marR="85045" marT="42522" marB="42522"/>
+                </a:tc>
+                <a:extLst>
+                  <a:ext uri="{0D108BD9-81ED-4DB2-BD59-A6C34878D82A}">
+                    <a16:rowId xmlns:a16="http://schemas.microsoft.com/office/drawing/2014/main" val="2603681906"/>
+                  </a:ext>
+                </a:extLst>
+              </a:tr>
+              <a:tr h="0">
+                <a:tc>
+                  <a:txBody>
+                    <a:bodyPr/>
+                    <a:lstStyle/>
+                    <a:p>
+                      <a:pPr marL="0" marR="0" lvl="0" indent="0" algn="l" defTabSz="685800" rtl="0" eaLnBrk="1" fontAlgn="auto" latinLnBrk="0" hangingPunct="1">
+                        <a:lnSpc>
+                          <a:spcPct val="100000"/>
+                        </a:lnSpc>
+                        <a:spcBef>
+                          <a:spcPts val="0"/>
+                        </a:spcBef>
+                        <a:spcAft>
+                          <a:spcPts val="0"/>
+                        </a:spcAft>
+                        <a:buClrTx/>
+                        <a:buSzTx/>
+                        <a:buFontTx/>
+                        <a:buNone/>
+                        <a:tabLst/>
+                        <a:defRPr/>
+                      </a:pPr>
+                      <a:r>
+                        <a:rPr lang="en-DE" sz="1500" dirty="0">
+                          <a:latin typeface="Times New Roman" panose="02020603050405020304" pitchFamily="18" charset="0"/>
+                          <a:cs typeface="Times New Roman" panose="02020603050405020304" pitchFamily="18" charset="0"/>
+                        </a:rPr>
+                        <a:t>Hand picked</a:t>
+                      </a:r>
+                      <a:endParaRPr lang="en-DE" sz="1700" dirty="0">
+                        <a:latin typeface="Times New Roman" panose="02020603050405020304" pitchFamily="18" charset="0"/>
+                        <a:cs typeface="Times New Roman" panose="02020603050405020304" pitchFamily="18" charset="0"/>
+                      </a:endParaRPr>
+                    </a:p>
+                  </a:txBody>
+                  <a:tcPr marL="85045" marR="85045" marT="42522" marB="42522"/>
+                </a:tc>
+                <a:tc>
+                  <a:txBody>
+                    <a:bodyPr/>
+                    <a:lstStyle/>
+                    <a:p>
+                      <a:r>
+                        <a:rPr lang="en-DE" sz="1700" b="0" dirty="0">
+                          <a:solidFill>
+                            <a:schemeClr val="tx1"/>
+                          </a:solidFill>
+                          <a:latin typeface="Times New Roman" panose="02020603050405020304" pitchFamily="18" charset="0"/>
+                          <a:cs typeface="Times New Roman" panose="02020603050405020304" pitchFamily="18" charset="0"/>
+                        </a:rPr>
+                        <a:t>2</a:t>
+                      </a:r>
+                    </a:p>
+                  </a:txBody>
+                  <a:tcPr marL="85045" marR="85045" marT="42522" marB="42522"/>
+                </a:tc>
+                <a:tc>
+                  <a:txBody>
+                    <a:bodyPr/>
+                    <a:lstStyle/>
+                    <a:p>
+                      <a:r>
+                        <a:rPr lang="en-DE" sz="1700" b="0" dirty="0">
+                          <a:solidFill>
+                            <a:schemeClr val="tx1"/>
+                          </a:solidFill>
+                          <a:latin typeface="Times New Roman" panose="02020603050405020304" pitchFamily="18" charset="0"/>
+                          <a:cs typeface="Times New Roman" panose="02020603050405020304" pitchFamily="18" charset="0"/>
+                        </a:rPr>
+                        <a:t>0.7</a:t>
+                      </a:r>
+                    </a:p>
+                  </a:txBody>
+                  <a:tcPr marL="85045" marR="85045" marT="42522" marB="42522"/>
+                </a:tc>
+                <a:tc>
+                  <a:txBody>
+                    <a:bodyPr/>
+                    <a:lstStyle/>
+                    <a:p>
+                      <a:r>
+                        <a:rPr lang="en-DE" sz="1700" b="0" dirty="0">
+                          <a:solidFill>
+                            <a:schemeClr val="tx1"/>
+                          </a:solidFill>
+                          <a:latin typeface="Times New Roman" panose="02020603050405020304" pitchFamily="18" charset="0"/>
+                          <a:cs typeface="Times New Roman" panose="02020603050405020304" pitchFamily="18" charset="0"/>
+                        </a:rPr>
+                        <a:t>1.1</a:t>
+                      </a:r>
+                    </a:p>
+                  </a:txBody>
+                  <a:tcPr marL="85045" marR="85045" marT="42522" marB="42522"/>
+                </a:tc>
+                <a:extLst>
+                  <a:ext uri="{0D108BD9-81ED-4DB2-BD59-A6C34878D82A}">
+                    <a16:rowId xmlns:a16="http://schemas.microsoft.com/office/drawing/2014/main" val="1143183472"/>
+                  </a:ext>
+                </a:extLst>
+              </a:tr>
+              <a:tr h="0">
+                <a:tc>
+                  <a:txBody>
+                    <a:bodyPr/>
+                    <a:lstStyle/>
+                    <a:p>
+                      <a:r>
+                        <a:rPr lang="en-GB" sz="1700" b="0" dirty="0">
+                          <a:solidFill>
+                            <a:schemeClr val="tx1"/>
+                          </a:solidFill>
+                          <a:latin typeface="Times New Roman" panose="02020603050405020304" pitchFamily="18" charset="0"/>
+                          <a:cs typeface="Times New Roman" panose="02020603050405020304" pitchFamily="18" charset="0"/>
+                        </a:rPr>
+                        <a:t>B</a:t>
+                      </a:r>
+                      <a:r>
+                        <a:rPr lang="en-DE" sz="1700" b="0" dirty="0">
+                          <a:solidFill>
+                            <a:schemeClr val="tx1"/>
+                          </a:solidFill>
+                          <a:latin typeface="Times New Roman" panose="02020603050405020304" pitchFamily="18" charset="0"/>
+                          <a:cs typeface="Times New Roman" panose="02020603050405020304" pitchFamily="18" charset="0"/>
+                        </a:rPr>
+                        <a:t>est fit</a:t>
+                      </a:r>
+                    </a:p>
+                  </a:txBody>
+                  <a:tcPr marL="85045" marR="85045" marT="42522" marB="42522"/>
+                </a:tc>
+                <a:tc>
+                  <a:txBody>
+                    <a:bodyPr/>
+                    <a:lstStyle/>
+                    <a:p>
+                      <a:r>
+                        <a:rPr lang="en-DE" sz="1700" b="0" dirty="0">
+                          <a:solidFill>
+                            <a:schemeClr val="tx1"/>
+                          </a:solidFill>
+                          <a:latin typeface="Times New Roman" panose="02020603050405020304" pitchFamily="18" charset="0"/>
+                          <a:cs typeface="Times New Roman" panose="02020603050405020304" pitchFamily="18" charset="0"/>
+                        </a:rPr>
+                        <a:t>0.91</a:t>
+                      </a:r>
+                    </a:p>
+                  </a:txBody>
+                  <a:tcPr marL="85045" marR="85045" marT="42522" marB="42522"/>
+                </a:tc>
+                <a:tc>
+                  <a:txBody>
+                    <a:bodyPr/>
+                    <a:lstStyle/>
+                    <a:p>
+                      <a:r>
+                        <a:rPr lang="en-DE" sz="1700" b="0" dirty="0">
+                          <a:solidFill>
+                            <a:schemeClr val="tx1"/>
+                          </a:solidFill>
+                          <a:latin typeface="Times New Roman" panose="02020603050405020304" pitchFamily="18" charset="0"/>
+                          <a:cs typeface="Times New Roman" panose="02020603050405020304" pitchFamily="18" charset="0"/>
+                        </a:rPr>
+                        <a:t>0.42</a:t>
+                      </a:r>
+                    </a:p>
+                  </a:txBody>
+                  <a:tcPr marL="85045" marR="85045" marT="42522" marB="42522"/>
+                </a:tc>
+                <a:tc>
+                  <a:txBody>
+                    <a:bodyPr/>
+                    <a:lstStyle/>
+                    <a:p>
+                      <a:r>
+                        <a:rPr lang="en-DE" sz="1700" b="0" dirty="0">
+                          <a:solidFill>
+                            <a:schemeClr val="tx1"/>
+                          </a:solidFill>
+                          <a:latin typeface="Times New Roman" panose="02020603050405020304" pitchFamily="18" charset="0"/>
+                          <a:cs typeface="Times New Roman" panose="02020603050405020304" pitchFamily="18" charset="0"/>
+                        </a:rPr>
+                        <a:t>2.4</a:t>
+                      </a:r>
+                    </a:p>
+                  </a:txBody>
+                  <a:tcPr marL="85045" marR="85045" marT="42522" marB="42522"/>
+                </a:tc>
+                <a:extLst>
+                  <a:ext uri="{0D108BD9-81ED-4DB2-BD59-A6C34878D82A}">
+                    <a16:rowId xmlns:a16="http://schemas.microsoft.com/office/drawing/2014/main" val="3031271706"/>
+                  </a:ext>
+                </a:extLst>
+              </a:tr>
+              <a:tr h="0">
+                <a:tc>
+                  <a:txBody>
+                    <a:bodyPr/>
+                    <a:lstStyle/>
+                    <a:p>
+                      <a:r>
+                        <a:rPr lang="en-DE" sz="1700" b="0" dirty="0">
+                          <a:solidFill>
+                            <a:schemeClr val="tx1"/>
+                          </a:solidFill>
+                          <a:latin typeface="Times New Roman" panose="02020603050405020304" pitchFamily="18" charset="0"/>
+                          <a:cs typeface="Times New Roman" panose="02020603050405020304" pitchFamily="18" charset="0"/>
+                        </a:rPr>
+                        <a:t>Worst fit</a:t>
+                      </a:r>
+                    </a:p>
+                  </a:txBody>
+                  <a:tcPr marL="85045" marR="85045" marT="42522" marB="42522"/>
+                </a:tc>
+                <a:tc>
+                  <a:txBody>
+                    <a:bodyPr/>
+                    <a:lstStyle/>
+                    <a:p>
+                      <a:r>
+                        <a:rPr lang="en-DE" sz="1700" b="0" dirty="0">
+                          <a:solidFill>
+                            <a:schemeClr val="tx1"/>
+                          </a:solidFill>
+                          <a:latin typeface="Times New Roman" panose="02020603050405020304" pitchFamily="18" charset="0"/>
+                          <a:cs typeface="Times New Roman" panose="02020603050405020304" pitchFamily="18" charset="0"/>
+                        </a:rPr>
+                        <a:t>1.93</a:t>
+                      </a:r>
+                    </a:p>
+                  </a:txBody>
+                  <a:tcPr marL="85045" marR="85045" marT="42522" marB="42522"/>
+                </a:tc>
+                <a:tc>
+                  <a:txBody>
+                    <a:bodyPr/>
+                    <a:lstStyle/>
+                    <a:p>
+                      <a:r>
+                        <a:rPr lang="en-DE" sz="1700" b="0" dirty="0">
+                          <a:solidFill>
+                            <a:schemeClr val="tx1"/>
+                          </a:solidFill>
+                          <a:latin typeface="Times New Roman" panose="02020603050405020304" pitchFamily="18" charset="0"/>
+                          <a:cs typeface="Times New Roman" panose="02020603050405020304" pitchFamily="18" charset="0"/>
+                        </a:rPr>
+                        <a:t>0.93</a:t>
+                      </a:r>
+                    </a:p>
+                  </a:txBody>
+                  <a:tcPr marL="85045" marR="85045" marT="42522" marB="42522"/>
+                </a:tc>
+                <a:tc>
+                  <a:txBody>
+                    <a:bodyPr/>
+                    <a:lstStyle/>
+                    <a:p>
+                      <a:r>
+                        <a:rPr lang="en-DE" sz="1700" b="0" dirty="0">
+                          <a:solidFill>
+                            <a:schemeClr val="tx1"/>
+                          </a:solidFill>
+                          <a:latin typeface="Times New Roman" panose="02020603050405020304" pitchFamily="18" charset="0"/>
+                          <a:cs typeface="Times New Roman" panose="02020603050405020304" pitchFamily="18" charset="0"/>
+                        </a:rPr>
+                        <a:t>1.1</a:t>
+                      </a:r>
+                    </a:p>
+                  </a:txBody>
+                  <a:tcPr marL="85045" marR="85045" marT="42522" marB="42522"/>
+                </a:tc>
+                <a:extLst>
+                  <a:ext uri="{0D108BD9-81ED-4DB2-BD59-A6C34878D82A}">
+                    <a16:rowId xmlns:a16="http://schemas.microsoft.com/office/drawing/2014/main" val="612192117"/>
+                  </a:ext>
+                </a:extLst>
+              </a:tr>
+            </a:tbl>
+          </a:graphicData>
+        </a:graphic>
+      </p:graphicFrame>
+      <p:pic>
+        <p:nvPicPr>
+          <p:cNvPr id="6" name="Picture 2">
+            <a:extLst>
+              <a:ext uri="{FF2B5EF4-FFF2-40B4-BE49-F238E27FC236}">
+                <a16:creationId xmlns:a16="http://schemas.microsoft.com/office/drawing/2014/main" id="{112BDAEE-C155-C4A2-3095-E0C404B2CB40}"/>
+              </a:ext>
+            </a:extLst>
+          </p:cNvPr>
+          <p:cNvPicPr>
+            <a:picLocks noChangeAspect="1" noChangeArrowheads="1"/>
+          </p:cNvPicPr>
+          <p:nvPr/>
+        </p:nvPicPr>
+        <p:blipFill>
+          <a:blip r:embed="rId2">
+            <a:extLst>
+              <a:ext uri="{28A0092B-C50C-407E-A947-70E740481C1C}">
+                <a14:useLocalDpi xmlns:a14="http://schemas.microsoft.com/office/drawing/2010/main" val="0"/>
+              </a:ext>
+            </a:extLst>
+          </a:blip>
+          <a:srcRect/>
+          <a:stretch/>
+        </p:blipFill>
+        <p:spPr bwMode="auto">
+          <a:xfrm>
+            <a:off x="3446428" y="1259214"/>
+            <a:ext cx="5637814" cy="4461226"/>
+          </a:xfrm>
+          <a:prstGeom prst="rect">
+            <a:avLst/>
+          </a:prstGeom>
+          <a:noFill/>
+          <a:extLst>
+            <a:ext uri="{909E8E84-426E-40DD-AFC4-6F175D3DCCD1}">
+              <a14:hiddenFill xmlns:a14="http://schemas.microsoft.com/office/drawing/2010/main">
+                <a:solidFill>
+                  <a:srgbClr val="FFFFFF"/>
+                </a:solidFill>
+              </a14:hiddenFill>
+            </a:ext>
+          </a:extLst>
+        </p:spPr>
+      </p:pic>
+    </p:spTree>
+    <p:extLst>
+      <p:ext uri="{BB962C8B-B14F-4D97-AF65-F5344CB8AC3E}">
+        <p14:creationId xmlns:p14="http://schemas.microsoft.com/office/powerpoint/2010/main" val="3593658928"/>
+      </p:ext>
+    </p:extLst>
+  </p:cSld>
+  <p:clrMapOvr>
+    <a:masterClrMapping/>
+  </p:clrMapOvr>
+</p:sld>
+</file>
+
+<file path=ppt/slides/slide17.xml><?xml version="1.0" encoding="utf-8"?>
+<p:sld xmlns:a="http://schemas.openxmlformats.org/drawingml/2006/main" xmlns:r="http://schemas.openxmlformats.org/officeDocument/2006/relationships" xmlns:p="http://schemas.openxmlformats.org/presentationml/2006/main">
+  <p:cSld>
+    <p:spTree>
+      <p:nvGrpSpPr>
+        <p:cNvPr id="1" name=""/>
+        <p:cNvGrpSpPr/>
+        <p:nvPr/>
+      </p:nvGrpSpPr>
+      <p:grpSpPr>
+        <a:xfrm>
+          <a:off x="0" y="0"/>
+          <a:ext cx="0" cy="0"/>
+          <a:chOff x="0" y="0"/>
+          <a:chExt cx="0" cy="0"/>
+        </a:xfrm>
+      </p:grpSpPr>
+      <p:sp>
+        <p:nvSpPr>
+          <p:cNvPr id="2" name="Title 1">
+            <a:extLst>
+              <a:ext uri="{FF2B5EF4-FFF2-40B4-BE49-F238E27FC236}">
+                <a16:creationId xmlns:a16="http://schemas.microsoft.com/office/drawing/2014/main" id="{F0AF2F40-74DF-8225-2203-7B418F73536B}"/>
+              </a:ext>
+            </a:extLst>
+          </p:cNvPr>
+          <p:cNvSpPr>
+            <a:spLocks noGrp="1"/>
+          </p:cNvSpPr>
+          <p:nvPr>
+            <p:ph type="title"/>
+          </p:nvPr>
+        </p:nvSpPr>
+        <p:spPr>
+          <a:xfrm>
+            <a:off x="537368" y="3001963"/>
+            <a:ext cx="7993063" cy="646112"/>
+          </a:xfrm>
+        </p:spPr>
+        <p:txBody>
+          <a:bodyPr/>
+          <a:lstStyle/>
+          <a:p>
+            <a:r>
+              <a:rPr lang="en-GB" sz="3600" dirty="0">
+                <a:effectLst/>
+                <a:latin typeface="Helvetica Neue" panose="02000503000000020004" pitchFamily="2" charset="0"/>
+              </a:rPr>
+              <a:t>Covid 19</a:t>
+            </a:r>
+            <a:endParaRPr lang="en-DE" sz="3200" dirty="0">
+              <a:solidFill>
+                <a:schemeClr val="tx1"/>
+              </a:solidFill>
+            </a:endParaRPr>
+          </a:p>
+        </p:txBody>
+      </p:sp>
+      <p:sp>
+        <p:nvSpPr>
+          <p:cNvPr id="4" name="Slide Number Placeholder 3">
+            <a:extLst>
+              <a:ext uri="{FF2B5EF4-FFF2-40B4-BE49-F238E27FC236}">
+                <a16:creationId xmlns:a16="http://schemas.microsoft.com/office/drawing/2014/main" id="{8C6FCBB5-7890-72A3-866E-9E65AC5BBF69}"/>
+              </a:ext>
+            </a:extLst>
+          </p:cNvPr>
+          <p:cNvSpPr>
+            <a:spLocks noGrp="1"/>
+          </p:cNvSpPr>
+          <p:nvPr>
+            <p:ph type="sldNum" sz="quarter" idx="10"/>
+          </p:nvPr>
+        </p:nvSpPr>
+        <p:spPr/>
+        <p:txBody>
+          <a:bodyPr/>
+          <a:lstStyle/>
+          <a:p>
+            <a:pPr>
+              <a:defRPr/>
+            </a:pPr>
+            <a:fld id="{13FD7AA2-DC10-7C40-BE93-1CFAEDE49800}" type="slidenum">
+              <a:rPr lang="en-US" altLang="de-DE" smtClean="0"/>
+              <a:pPr>
+                <a:defRPr/>
+              </a:pPr>
+              <a:t>17</a:t>
+            </a:fld>
+            <a:endParaRPr lang="en-US" altLang="de-DE"/>
+          </a:p>
+        </p:txBody>
+      </p:sp>
+    </p:spTree>
+    <p:extLst>
+      <p:ext uri="{BB962C8B-B14F-4D97-AF65-F5344CB8AC3E}">
+        <p14:creationId xmlns:p14="http://schemas.microsoft.com/office/powerpoint/2010/main" val="4213311484"/>
+      </p:ext>
+    </p:extLst>
+  </p:cSld>
+  <p:clrMapOvr>
+    <a:masterClrMapping/>
+  </p:clrMapOvr>
+</p:sld>
+</file>
+
+<file path=ppt/slides/slide18.xml><?xml version="1.0" encoding="utf-8"?>
+<p:sld xmlns:a="http://schemas.openxmlformats.org/drawingml/2006/main" xmlns:r="http://schemas.openxmlformats.org/officeDocument/2006/relationships" xmlns:p="http://schemas.openxmlformats.org/presentationml/2006/main">
+  <p:cSld>
+    <p:spTree>
+      <p:nvGrpSpPr>
+        <p:cNvPr id="1" name=""/>
+        <p:cNvGrpSpPr/>
+        <p:nvPr/>
+      </p:nvGrpSpPr>
+      <p:grpSpPr>
+        <a:xfrm>
+          <a:off x="0" y="0"/>
+          <a:ext cx="0" cy="0"/>
+          <a:chOff x="0" y="0"/>
+          <a:chExt cx="0" cy="0"/>
+        </a:xfrm>
+      </p:grpSpPr>
+      <p:sp>
+        <p:nvSpPr>
+          <p:cNvPr id="2" name="Title 1">
+            <a:extLst>
+              <a:ext uri="{FF2B5EF4-FFF2-40B4-BE49-F238E27FC236}">
+                <a16:creationId xmlns:a16="http://schemas.microsoft.com/office/drawing/2014/main" id="{EF7DDAD6-BA6B-7011-E30F-D96F005A9DEE}"/>
+              </a:ext>
+            </a:extLst>
+          </p:cNvPr>
+          <p:cNvSpPr>
+            <a:spLocks noGrp="1"/>
+          </p:cNvSpPr>
+          <p:nvPr>
+            <p:ph type="title"/>
+          </p:nvPr>
+        </p:nvSpPr>
+        <p:spPr/>
+        <p:txBody>
+          <a:bodyPr/>
+          <a:lstStyle/>
+          <a:p>
+            <a:r>
+              <a:rPr lang="en-DE" dirty="0"/>
+              <a:t>Coloring</a:t>
+            </a:r>
+          </a:p>
+        </p:txBody>
+      </p:sp>
+      <p:sp>
+        <p:nvSpPr>
+          <p:cNvPr id="4" name="Slide Number Placeholder 3">
+            <a:extLst>
+              <a:ext uri="{FF2B5EF4-FFF2-40B4-BE49-F238E27FC236}">
+                <a16:creationId xmlns:a16="http://schemas.microsoft.com/office/drawing/2014/main" id="{4F219DC0-1F59-1FEB-B34D-2DF824384DAE}"/>
+              </a:ext>
+            </a:extLst>
+          </p:cNvPr>
+          <p:cNvSpPr>
+            <a:spLocks noGrp="1"/>
+          </p:cNvSpPr>
+          <p:nvPr>
+            <p:ph type="sldNum" sz="quarter" idx="10"/>
+          </p:nvPr>
+        </p:nvSpPr>
+        <p:spPr/>
+        <p:txBody>
+          <a:bodyPr/>
+          <a:lstStyle/>
+          <a:p>
+            <a:pPr>
+              <a:defRPr/>
+            </a:pPr>
+            <a:fld id="{13FD7AA2-DC10-7C40-BE93-1CFAEDE49800}" type="slidenum">
+              <a:rPr lang="en-US" altLang="de-DE" smtClean="0"/>
+              <a:pPr>
+                <a:defRPr/>
+              </a:pPr>
+              <a:t>18</a:t>
+            </a:fld>
+            <a:endParaRPr lang="en-US" altLang="de-DE"/>
+          </a:p>
+        </p:txBody>
+      </p:sp>
+      <p:pic>
+        <p:nvPicPr>
+          <p:cNvPr id="1026" name="Picture 2">
+            <a:extLst>
+              <a:ext uri="{FF2B5EF4-FFF2-40B4-BE49-F238E27FC236}">
+                <a16:creationId xmlns:a16="http://schemas.microsoft.com/office/drawing/2014/main" id="{74362443-D56E-4958-2172-7C6949B2C813}"/>
+              </a:ext>
+            </a:extLst>
+          </p:cNvPr>
+          <p:cNvPicPr>
+            <a:picLocks noGrp="1" noChangeAspect="1" noChangeArrowheads="1"/>
+          </p:cNvPicPr>
+          <p:nvPr>
+            <p:ph idx="1"/>
+          </p:nvPr>
+        </p:nvPicPr>
+        <p:blipFill>
+          <a:blip r:embed="rId2">
+            <a:extLst>
+              <a:ext uri="{28A0092B-C50C-407E-A947-70E740481C1C}">
+                <a14:useLocalDpi xmlns:a14="http://schemas.microsoft.com/office/drawing/2010/main" val="0"/>
+              </a:ext>
+            </a:extLst>
+          </a:blip>
+          <a:srcRect/>
+          <a:stretch/>
+        </p:blipFill>
+        <p:spPr bwMode="auto">
+          <a:xfrm>
+            <a:off x="637182" y="916012"/>
+            <a:ext cx="7793435" cy="5102176"/>
+          </a:xfrm>
+          <a:prstGeom prst="rect">
+            <a:avLst/>
+          </a:prstGeom>
+          <a:noFill/>
+          <a:extLst>
+            <a:ext uri="{909E8E84-426E-40DD-AFC4-6F175D3DCCD1}">
+              <a14:hiddenFill xmlns:a14="http://schemas.microsoft.com/office/drawing/2010/main">
+                <a:solidFill>
+                  <a:srgbClr val="FFFFFF"/>
+                </a:solidFill>
+              </a14:hiddenFill>
+            </a:ext>
+          </a:extLst>
+        </p:spPr>
+      </p:pic>
+    </p:spTree>
+    <p:extLst>
+      <p:ext uri="{BB962C8B-B14F-4D97-AF65-F5344CB8AC3E}">
+        <p14:creationId xmlns:p14="http://schemas.microsoft.com/office/powerpoint/2010/main" val="1382872304"/>
+      </p:ext>
+    </p:extLst>
+  </p:cSld>
+  <p:clrMapOvr>
+    <a:masterClrMapping/>
+  </p:clrMapOvr>
+</p:sld>
+</file>
+
+<file path=ppt/slides/slide19.xml><?xml version="1.0" encoding="utf-8"?>
+<p:sld xmlns:a="http://schemas.openxmlformats.org/drawingml/2006/main" xmlns:r="http://schemas.openxmlformats.org/officeDocument/2006/relationships" xmlns:p="http://schemas.openxmlformats.org/presentationml/2006/main">
+  <p:cSld>
+    <p:spTree>
+      <p:nvGrpSpPr>
+        <p:cNvPr id="1" name=""/>
+        <p:cNvGrpSpPr/>
+        <p:nvPr/>
+      </p:nvGrpSpPr>
+      <p:grpSpPr>
+        <a:xfrm>
+          <a:off x="0" y="0"/>
+          <a:ext cx="0" cy="0"/>
+          <a:chOff x="0" y="0"/>
+          <a:chExt cx="0" cy="0"/>
+        </a:xfrm>
+      </p:grpSpPr>
+      <p:sp>
+        <p:nvSpPr>
+          <p:cNvPr id="2" name="Title 1">
+            <a:extLst>
+              <a:ext uri="{FF2B5EF4-FFF2-40B4-BE49-F238E27FC236}">
+                <a16:creationId xmlns:a16="http://schemas.microsoft.com/office/drawing/2014/main" id="{EF7DDAD6-BA6B-7011-E30F-D96F005A9DEE}"/>
+              </a:ext>
+            </a:extLst>
+          </p:cNvPr>
+          <p:cNvSpPr>
+            <a:spLocks noGrp="1"/>
+          </p:cNvSpPr>
+          <p:nvPr>
+            <p:ph type="title"/>
+          </p:nvPr>
+        </p:nvSpPr>
+        <p:spPr/>
+        <p:txBody>
+          <a:bodyPr/>
+          <a:lstStyle/>
+          <a:p>
+            <a:r>
+              <a:rPr lang="en-DE" dirty="0"/>
+              <a:t>Coloring</a:t>
+            </a:r>
+          </a:p>
+        </p:txBody>
+      </p:sp>
+      <p:sp>
+        <p:nvSpPr>
+          <p:cNvPr id="4" name="Slide Number Placeholder 3">
+            <a:extLst>
+              <a:ext uri="{FF2B5EF4-FFF2-40B4-BE49-F238E27FC236}">
+                <a16:creationId xmlns:a16="http://schemas.microsoft.com/office/drawing/2014/main" id="{4F219DC0-1F59-1FEB-B34D-2DF824384DAE}"/>
+              </a:ext>
+            </a:extLst>
+          </p:cNvPr>
+          <p:cNvSpPr>
+            <a:spLocks noGrp="1"/>
+          </p:cNvSpPr>
+          <p:nvPr>
+            <p:ph type="sldNum" sz="quarter" idx="10"/>
+          </p:nvPr>
+        </p:nvSpPr>
+        <p:spPr/>
+        <p:txBody>
+          <a:bodyPr/>
+          <a:lstStyle/>
+          <a:p>
+            <a:pPr>
+              <a:defRPr/>
+            </a:pPr>
+            <a:fld id="{13FD7AA2-DC10-7C40-BE93-1CFAEDE49800}" type="slidenum">
+              <a:rPr lang="en-US" altLang="de-DE" smtClean="0"/>
+              <a:pPr>
+                <a:defRPr/>
+              </a:pPr>
+              <a:t>19</a:t>
+            </a:fld>
+            <a:endParaRPr lang="en-US" altLang="de-DE"/>
+          </a:p>
+        </p:txBody>
+      </p:sp>
+      <p:pic>
+        <p:nvPicPr>
+          <p:cNvPr id="1026" name="Picture 2">
+            <a:extLst>
+              <a:ext uri="{FF2B5EF4-FFF2-40B4-BE49-F238E27FC236}">
+                <a16:creationId xmlns:a16="http://schemas.microsoft.com/office/drawing/2014/main" id="{74362443-D56E-4958-2172-7C6949B2C813}"/>
+              </a:ext>
+            </a:extLst>
+          </p:cNvPr>
+          <p:cNvPicPr>
+            <a:picLocks noGrp="1" noChangeAspect="1" noChangeArrowheads="1"/>
+          </p:cNvPicPr>
+          <p:nvPr>
+            <p:ph idx="1"/>
+          </p:nvPr>
+        </p:nvPicPr>
+        <p:blipFill>
+          <a:blip r:embed="rId2">
+            <a:extLst>
+              <a:ext uri="{28A0092B-C50C-407E-A947-70E740481C1C}">
+                <a14:useLocalDpi xmlns:a14="http://schemas.microsoft.com/office/drawing/2010/main" val="0"/>
+              </a:ext>
+            </a:extLst>
+          </a:blip>
+          <a:srcRect/>
+          <a:stretch/>
+        </p:blipFill>
+        <p:spPr bwMode="auto">
+          <a:xfrm>
+            <a:off x="765628" y="914400"/>
+            <a:ext cx="7536542" cy="5105400"/>
+          </a:xfrm>
+          <a:prstGeom prst="rect">
+            <a:avLst/>
+          </a:prstGeom>
+          <a:noFill/>
+          <a:extLst>
+            <a:ext uri="{909E8E84-426E-40DD-AFC4-6F175D3DCCD1}">
+              <a14:hiddenFill xmlns:a14="http://schemas.microsoft.com/office/drawing/2010/main">
+                <a:solidFill>
+                  <a:srgbClr val="FFFFFF"/>
+                </a:solidFill>
+              </a14:hiddenFill>
+            </a:ext>
+          </a:extLst>
+        </p:spPr>
+      </p:pic>
+    </p:spTree>
+    <p:extLst>
+      <p:ext uri="{BB962C8B-B14F-4D97-AF65-F5344CB8AC3E}">
+        <p14:creationId xmlns:p14="http://schemas.microsoft.com/office/powerpoint/2010/main" val="1003047855"/>
       </p:ext>
     </p:extLst>
   </p:cSld>
@@ -2957,7 +7028,7 @@
         <p:spPr bwMode="auto">
           <a:xfrm>
             <a:off x="4564341" y="1814958"/>
-            <a:ext cx="4450877" cy="3521998"/>
+            <a:ext cx="4450876" cy="3521998"/>
           </a:xfrm>
           <a:prstGeom prst="rect">
             <a:avLst/>
@@ -3002,7 +7073,7 @@
         <p:spPr bwMode="auto">
           <a:xfrm>
             <a:off x="109086" y="1815041"/>
-            <a:ext cx="4450877" cy="3521998"/>
+            <a:ext cx="4450876" cy="3521998"/>
           </a:xfrm>
           <a:prstGeom prst="rect">
             <a:avLst/>
@@ -6923,8 +10994,8 @@
           <a:lstStyle/>
           <a:p>
             <a:r>
-              <a:rPr lang="en-DE" dirty="0"/>
-              <a:t>Modelling-Bike in Nhts17</a:t>
+              <a:rPr lang="en-DE" sz="2000" dirty="0"/>
+              <a:t>Modelling-Short Range in Nhts17-New Params Selected</a:t>
             </a:r>
           </a:p>
         </p:txBody>
@@ -6947,8 +11018,8 @@
         </p:nvSpPr>
         <p:spPr>
           <a:xfrm>
-            <a:off x="533400" y="914400"/>
-            <a:ext cx="4198257" cy="5105400"/>
+            <a:off x="533401" y="914399"/>
+            <a:ext cx="3719286" cy="5441953"/>
           </a:xfrm>
         </p:spPr>
         <p:txBody>
@@ -6959,7 +11030,7 @@
           <a:p>
             <a:r>
               <a:rPr lang="en-DE" dirty="0"/>
-              <a:t>Short Range Public in Nhts17</a:t>
+              <a:t>Auto Driver in Nhts17</a:t>
             </a:r>
           </a:p>
           <a:p>
@@ -6981,54 +11052,90 @@
             <a:endParaRPr lang="en-DE" dirty="0"/>
           </a:p>
           <a:p>
-            <a:endParaRPr lang="en-DE" dirty="0"/>
-          </a:p>
-          <a:p>
-            <a:r>
-              <a:rPr lang="en-DE" dirty="0"/>
+            <a:endParaRPr lang="en-DE" sz="1800" dirty="0"/>
+          </a:p>
+          <a:p>
+            <a:r>
+              <a:rPr lang="en-DE" sz="1800" dirty="0"/>
               <a:t>Best fit error:</a:t>
             </a:r>
           </a:p>
           <a:p>
             <a:pPr lvl="1"/>
             <a:r>
-              <a:rPr lang="en-DE" dirty="0"/>
-              <a:t>3.08572583406345</a:t>
-            </a:r>
-          </a:p>
-          <a:p>
-            <a:r>
-              <a:rPr lang="en-DE" dirty="0"/>
+              <a:rPr lang="en-DE" sz="1600" dirty="0"/>
+              <a:t>7.13150404698985</a:t>
+            </a:r>
+          </a:p>
+          <a:p>
+            <a:r>
+              <a:rPr lang="en-DE" sz="1800" dirty="0"/>
               <a:t>Worst fit error</a:t>
             </a:r>
           </a:p>
           <a:p>
             <a:pPr lvl="1"/>
             <a:r>
-              <a:rPr lang="en-DE" dirty="0"/>
-              <a:t>547.2482490075568</a:t>
+              <a:rPr lang="en-DE" sz="1600" dirty="0"/>
+              <a:t>8828.427163972436</a:t>
             </a:r>
           </a:p>
           <a:p>
             <a:pPr lvl="1"/>
-            <a:endParaRPr lang="en-DE" dirty="0"/>
-          </a:p>
-          <a:p>
-            <a:r>
-              <a:rPr lang="en-GB" dirty="0" err="1"/>
-              <a:t>messpt</a:t>
-            </a:r>
-            <a:r>
-              <a:rPr lang="en-GB" dirty="0"/>
-              <a:t>[ 1,3,5,7,10,30,55,70,100,200]</a:t>
-            </a:r>
-          </a:p>
-          <a:p>
-            <a:r>
-              <a:rPr lang="en-GB" dirty="0"/>
-              <a:t>Largest distance=200</a:t>
-            </a:r>
-            <a:endParaRPr lang="en-DE" dirty="0"/>
+            <a:endParaRPr lang="en-DE" sz="1600" dirty="0"/>
+          </a:p>
+          <a:p>
+            <a:r>
+              <a:rPr lang="en-GB" sz="1600" dirty="0" err="1"/>
+              <a:t>p_range</a:t>
+            </a:r>
+            <a:r>
+              <a:rPr lang="en-GB" sz="1600" dirty="0"/>
+              <a:t>=</a:t>
+            </a:r>
+            <a:r>
+              <a:rPr lang="en-GB" sz="1600" dirty="0" err="1"/>
+              <a:t>np.arange</a:t>
+            </a:r>
+            <a:r>
+              <a:rPr lang="en-GB" sz="1600" dirty="0"/>
+              <a:t>(0.01, 0.95, 0.03)</a:t>
+            </a:r>
+          </a:p>
+          <a:p>
+            <a:r>
+              <a:rPr lang="en-GB" sz="1600" dirty="0" err="1"/>
+              <a:t>eps_range</a:t>
+            </a:r>
+            <a:r>
+              <a:rPr lang="en-GB" sz="1600" dirty="0"/>
+              <a:t>=</a:t>
+            </a:r>
+            <a:r>
+              <a:rPr lang="en-GB" sz="1600" dirty="0" err="1"/>
+              <a:t>np.arange</a:t>
+            </a:r>
+            <a:r>
+              <a:rPr lang="en-GB" sz="1600" dirty="0"/>
+              <a:t>(0.1,2,0.03)</a:t>
+            </a:r>
+          </a:p>
+          <a:p>
+            <a:r>
+              <a:rPr lang="en-GB" sz="1600" dirty="0" err="1"/>
+              <a:t>Messpt</a:t>
+            </a:r>
+            <a:r>
+              <a:rPr lang="en-GB" sz="1600" dirty="0"/>
+              <a:t>= [1,3,5,7,10, 30, 55, 70,100, 300,500,700,1000,5000,7000]</a:t>
+            </a:r>
+          </a:p>
+          <a:p>
+            <a:r>
+              <a:rPr lang="en-GB" sz="1600" dirty="0"/>
+              <a:t>Largest distance=10000</a:t>
+            </a:r>
+            <a:endParaRPr lang="en-DE" sz="1600" dirty="0"/>
           </a:p>
           <a:p>
             <a:pPr lvl="1"/>
@@ -7092,13 +11199,13 @@
           <p:nvPr>
             <p:extLst>
               <p:ext uri="{D42A27DB-BD31-4B8C-83A1-F6EECF244321}">
-                <p14:modId xmlns:p14="http://schemas.microsoft.com/office/powerpoint/2010/main" val="3757154474"/>
+                <p14:modId xmlns:p14="http://schemas.microsoft.com/office/powerpoint/2010/main" val="2567438029"/>
               </p:ext>
             </p:extLst>
           </p:nvPr>
         </p:nvGraphicFramePr>
         <p:xfrm>
-          <a:off x="609600" y="1353457"/>
+          <a:off x="685800" y="1259214"/>
           <a:ext cx="2760628" cy="2092776"/>
         </p:xfrm>
         <a:graphic>
@@ -7361,45 +11468,45 @@
                           <a:latin typeface="Times New Roman" panose="02020603050405020304" pitchFamily="18" charset="0"/>
                           <a:cs typeface="Times New Roman" panose="02020603050405020304" pitchFamily="18" charset="0"/>
                         </a:rPr>
-                        <a:t>0.65</a:t>
-                      </a:r>
-                    </a:p>
-                  </a:txBody>
-                  <a:tcPr marL="85045" marR="85045" marT="42522" marB="42522"/>
-                </a:tc>
-                <a:tc>
-                  <a:txBody>
-                    <a:bodyPr/>
-                    <a:lstStyle/>
-                    <a:p>
-                      <a:r>
-                        <a:rPr lang="en-DE" sz="1700" b="0" dirty="0">
-                          <a:solidFill>
-                            <a:schemeClr val="tx1"/>
-                          </a:solidFill>
-                          <a:latin typeface="Times New Roman" panose="02020603050405020304" pitchFamily="18" charset="0"/>
-                          <a:cs typeface="Times New Roman" panose="02020603050405020304" pitchFamily="18" charset="0"/>
-                        </a:rPr>
-                        <a:t>0.25</a:t>
-                      </a:r>
-                    </a:p>
-                  </a:txBody>
-                  <a:tcPr marL="85045" marR="85045" marT="42522" marB="42522"/>
-                </a:tc>
-                <a:tc>
-                  <a:txBody>
-                    <a:bodyPr/>
-                    <a:lstStyle/>
-                    <a:p>
-                      <a:r>
-                        <a:rPr lang="en-DE" sz="1700" b="0" dirty="0">
-                          <a:solidFill>
-                            <a:schemeClr val="tx1"/>
-                          </a:solidFill>
-                          <a:latin typeface="Times New Roman" panose="02020603050405020304" pitchFamily="18" charset="0"/>
-                          <a:cs typeface="Times New Roman" panose="02020603050405020304" pitchFamily="18" charset="0"/>
-                        </a:rPr>
-                        <a:t>2.1</a:t>
+                        <a:t>1.6</a:t>
+                      </a:r>
+                    </a:p>
+                  </a:txBody>
+                  <a:tcPr marL="85045" marR="85045" marT="42522" marB="42522"/>
+                </a:tc>
+                <a:tc>
+                  <a:txBody>
+                    <a:bodyPr/>
+                    <a:lstStyle/>
+                    <a:p>
+                      <a:r>
+                        <a:rPr lang="en-DE" sz="1700" b="0" dirty="0">
+                          <a:solidFill>
+                            <a:schemeClr val="tx1"/>
+                          </a:solidFill>
+                          <a:latin typeface="Times New Roman" panose="02020603050405020304" pitchFamily="18" charset="0"/>
+                          <a:cs typeface="Times New Roman" panose="02020603050405020304" pitchFamily="18" charset="0"/>
+                        </a:rPr>
+                        <a:t>0.46</a:t>
+                      </a:r>
+                    </a:p>
+                  </a:txBody>
+                  <a:tcPr marL="85045" marR="85045" marT="42522" marB="42522"/>
+                </a:tc>
+                <a:tc>
+                  <a:txBody>
+                    <a:bodyPr/>
+                    <a:lstStyle/>
+                    <a:p>
+                      <a:r>
+                        <a:rPr lang="en-DE" sz="1700" b="0" dirty="0">
+                          <a:solidFill>
+                            <a:schemeClr val="tx1"/>
+                          </a:solidFill>
+                          <a:latin typeface="Times New Roman" panose="02020603050405020304" pitchFamily="18" charset="0"/>
+                          <a:cs typeface="Times New Roman" panose="02020603050405020304" pitchFamily="18" charset="0"/>
+                        </a:rPr>
+                        <a:t>2.25</a:t>
                       </a:r>
                     </a:p>
                   </a:txBody>
@@ -7444,45 +11551,45 @@
                           <a:latin typeface="Times New Roman" panose="02020603050405020304" pitchFamily="18" charset="0"/>
                           <a:cs typeface="Times New Roman" panose="02020603050405020304" pitchFamily="18" charset="0"/>
                         </a:rPr>
-                        <a:t>1.9</a:t>
-                      </a:r>
-                    </a:p>
-                  </a:txBody>
-                  <a:tcPr marL="85045" marR="85045" marT="42522" marB="42522"/>
-                </a:tc>
-                <a:tc>
-                  <a:txBody>
-                    <a:bodyPr/>
-                    <a:lstStyle/>
-                    <a:p>
-                      <a:r>
-                        <a:rPr lang="en-DE" sz="1700" b="0" dirty="0">
-                          <a:solidFill>
-                            <a:schemeClr val="tx1"/>
-                          </a:solidFill>
-                          <a:latin typeface="Times New Roman" panose="02020603050405020304" pitchFamily="18" charset="0"/>
-                          <a:cs typeface="Times New Roman" panose="02020603050405020304" pitchFamily="18" charset="0"/>
-                        </a:rPr>
-                        <a:t>0.9</a:t>
-                      </a:r>
-                    </a:p>
-                  </a:txBody>
-                  <a:tcPr marL="85045" marR="85045" marT="42522" marB="42522"/>
-                </a:tc>
-                <a:tc>
-                  <a:txBody>
-                    <a:bodyPr/>
-                    <a:lstStyle/>
-                    <a:p>
-                      <a:r>
-                        <a:rPr lang="en-DE" sz="1700" b="0" dirty="0">
-                          <a:solidFill>
-                            <a:schemeClr val="tx1"/>
-                          </a:solidFill>
-                          <a:latin typeface="Times New Roman" panose="02020603050405020304" pitchFamily="18" charset="0"/>
-                          <a:cs typeface="Times New Roman" panose="02020603050405020304" pitchFamily="18" charset="0"/>
-                        </a:rPr>
-                        <a:t>1.1</a:t>
+                        <a:t>0.85</a:t>
+                      </a:r>
+                    </a:p>
+                  </a:txBody>
+                  <a:tcPr marL="85045" marR="85045" marT="42522" marB="42522"/>
+                </a:tc>
+                <a:tc>
+                  <a:txBody>
+                    <a:bodyPr/>
+                    <a:lstStyle/>
+                    <a:p>
+                      <a:r>
+                        <a:rPr lang="en-DE" sz="1700" b="0" dirty="0">
+                          <a:solidFill>
+                            <a:schemeClr val="tx1"/>
+                          </a:solidFill>
+                          <a:latin typeface="Times New Roman" panose="02020603050405020304" pitchFamily="18" charset="0"/>
+                          <a:cs typeface="Times New Roman" panose="02020603050405020304" pitchFamily="18" charset="0"/>
+                        </a:rPr>
+                        <a:t>0.94</a:t>
+                      </a:r>
+                    </a:p>
+                  </a:txBody>
+                  <a:tcPr marL="85045" marR="85045" marT="42522" marB="42522"/>
+                </a:tc>
+                <a:tc>
+                  <a:txBody>
+                    <a:bodyPr/>
+                    <a:lstStyle/>
+                    <a:p>
+                      <a:r>
+                        <a:rPr lang="en-DE" sz="1700" b="0" dirty="0">
+                          <a:solidFill>
+                            <a:schemeClr val="tx1"/>
+                          </a:solidFill>
+                          <a:latin typeface="Times New Roman" panose="02020603050405020304" pitchFamily="18" charset="0"/>
+                          <a:cs typeface="Times New Roman" panose="02020603050405020304" pitchFamily="18" charset="0"/>
+                        </a:rPr>
+                        <a:t>1.15</a:t>
                       </a:r>
                     </a:p>
                   </a:txBody>
@@ -7500,10 +11607,10 @@
       </p:graphicFrame>
       <p:pic>
         <p:nvPicPr>
-          <p:cNvPr id="3074" name="Picture 2">
+          <p:cNvPr id="6" name="Picture 2">
             <a:extLst>
               <a:ext uri="{FF2B5EF4-FFF2-40B4-BE49-F238E27FC236}">
-                <a16:creationId xmlns:a16="http://schemas.microsoft.com/office/drawing/2014/main" id="{162A4276-EBFE-6543-65E9-8813747CA589}"/>
+                <a16:creationId xmlns:a16="http://schemas.microsoft.com/office/drawing/2014/main" id="{112BDAEE-C155-C4A2-3095-E0C404B2CB40}"/>
               </a:ext>
             </a:extLst>
           </p:cNvPr>
@@ -7525,8 +11632,8 @@
         </p:blipFill>
         <p:spPr bwMode="auto">
           <a:xfrm>
-            <a:off x="3370228" y="1453743"/>
-            <a:ext cx="5637816" cy="4461229"/>
+            <a:off x="3446428" y="1259214"/>
+            <a:ext cx="5637816" cy="4461228"/>
           </a:xfrm>
           <a:prstGeom prst="rect">
             <a:avLst/>
@@ -7546,7 +11653,7 @@
     </p:spTree>
     <p:extLst>
       <p:ext uri="{BB962C8B-B14F-4D97-AF65-F5344CB8AC3E}">
-        <p14:creationId xmlns:p14="http://schemas.microsoft.com/office/powerpoint/2010/main" val="1075039795"/>
+        <p14:creationId xmlns:p14="http://schemas.microsoft.com/office/powerpoint/2010/main" val="1558665417"/>
       </p:ext>
     </p:extLst>
   </p:cSld>

</xml_diff>

<commit_message>
model updated and coloring corrected
</commit_message>
<xml_diff>
--- a/Mobility_Levy.pptx
+++ b/Mobility_Levy.pptx
@@ -21,10 +21,14 @@
     <p:sldId id="299" r:id="rId15"/>
     <p:sldId id="302" r:id="rId16"/>
     <p:sldId id="303" r:id="rId17"/>
-    <p:sldId id="304" r:id="rId18"/>
-    <p:sldId id="307" r:id="rId19"/>
-    <p:sldId id="308" r:id="rId20"/>
-    <p:sldId id="305" r:id="rId21"/>
+    <p:sldId id="309" r:id="rId18"/>
+    <p:sldId id="310" r:id="rId19"/>
+    <p:sldId id="311" r:id="rId20"/>
+    <p:sldId id="312" r:id="rId21"/>
+    <p:sldId id="304" r:id="rId22"/>
+    <p:sldId id="307" r:id="rId23"/>
+    <p:sldId id="308" r:id="rId24"/>
+    <p:sldId id="305" r:id="rId25"/>
   </p:sldIdLst>
   <p:sldSz cx="9144000" cy="6858000" type="screen4x3"/>
   <p:notesSz cx="6858000" cy="9144000"/>
@@ -6265,6 +6269,3281 @@
           <p:cNvPr id="2" name="Title 1">
             <a:extLst>
               <a:ext uri="{FF2B5EF4-FFF2-40B4-BE49-F238E27FC236}">
+                <a16:creationId xmlns:a16="http://schemas.microsoft.com/office/drawing/2014/main" id="{FD5F5B2C-D6F2-BF7E-E8D7-813995702D15}"/>
+              </a:ext>
+            </a:extLst>
+          </p:cNvPr>
+          <p:cNvSpPr>
+            <a:spLocks noGrp="1"/>
+          </p:cNvSpPr>
+          <p:nvPr>
+            <p:ph type="title"/>
+          </p:nvPr>
+        </p:nvSpPr>
+        <p:spPr/>
+        <p:txBody>
+          <a:bodyPr/>
+          <a:lstStyle/>
+          <a:p>
+            <a:r>
+              <a:rPr lang="en-DE" sz="2000" dirty="0"/>
+              <a:t>Modelling-Short Range in Nhts17-New Params Selected-New Error function- p can be 0-modelling over 10km</a:t>
+            </a:r>
+          </a:p>
+        </p:txBody>
+      </p:sp>
+      <p:sp>
+        <p:nvSpPr>
+          <p:cNvPr id="3" name="Content Placeholder 2">
+            <a:extLst>
+              <a:ext uri="{FF2B5EF4-FFF2-40B4-BE49-F238E27FC236}">
+                <a16:creationId xmlns:a16="http://schemas.microsoft.com/office/drawing/2014/main" id="{7E6EDD97-98F3-F2B7-2E47-B6E3553CF328}"/>
+              </a:ext>
+            </a:extLst>
+          </p:cNvPr>
+          <p:cNvSpPr>
+            <a:spLocks noGrp="1"/>
+          </p:cNvSpPr>
+          <p:nvPr>
+            <p:ph idx="1"/>
+          </p:nvPr>
+        </p:nvSpPr>
+        <p:spPr>
+          <a:xfrm>
+            <a:off x="533401" y="914399"/>
+            <a:ext cx="3719286" cy="5441953"/>
+          </a:xfrm>
+        </p:spPr>
+        <p:txBody>
+          <a:bodyPr>
+            <a:normAutofit lnSpcReduction="10000"/>
+          </a:bodyPr>
+          <a:lstStyle/>
+          <a:p>
+            <a:r>
+              <a:rPr lang="en-DE" sz="1400" dirty="0"/>
+              <a:t>Auto Driver in Nhts17 </a:t>
+            </a:r>
+          </a:p>
+          <a:p>
+            <a:pPr lvl="1"/>
+            <a:r>
+              <a:rPr lang="en-GB" sz="1200" dirty="0"/>
+              <a:t>D</a:t>
+            </a:r>
+            <a:r>
+              <a:rPr lang="en-DE" sz="1200" dirty="0"/>
+              <a:t>atasize=10240</a:t>
+            </a:r>
+          </a:p>
+          <a:p>
+            <a:endParaRPr lang="en-DE" sz="1600" dirty="0"/>
+          </a:p>
+          <a:p>
+            <a:endParaRPr lang="en-DE" sz="1600" dirty="0"/>
+          </a:p>
+          <a:p>
+            <a:endParaRPr lang="en-DE" sz="1600" dirty="0"/>
+          </a:p>
+          <a:p>
+            <a:endParaRPr lang="en-DE" sz="1600" dirty="0"/>
+          </a:p>
+          <a:p>
+            <a:endParaRPr lang="en-DE" sz="1600" dirty="0"/>
+          </a:p>
+          <a:p>
+            <a:endParaRPr lang="en-DE" sz="1600" dirty="0"/>
+          </a:p>
+          <a:p>
+            <a:endParaRPr lang="en-DE" sz="1400" dirty="0"/>
+          </a:p>
+          <a:p>
+            <a:endParaRPr lang="en-DE" sz="1400" dirty="0"/>
+          </a:p>
+          <a:p>
+            <a:r>
+              <a:rPr lang="en-DE" sz="1400" dirty="0"/>
+              <a:t>Best fit error:</a:t>
+            </a:r>
+          </a:p>
+          <a:p>
+            <a:pPr lvl="1"/>
+            <a:r>
+              <a:rPr lang="en-DE" sz="1200" dirty="0"/>
+              <a:t>4.688603224779429</a:t>
+            </a:r>
+          </a:p>
+          <a:p>
+            <a:r>
+              <a:rPr lang="en-DE" sz="1400" dirty="0"/>
+              <a:t>Worst fit error</a:t>
+            </a:r>
+          </a:p>
+          <a:p>
+            <a:pPr lvl="1"/>
+            <a:r>
+              <a:rPr lang="en-DE" sz="1200" dirty="0"/>
+              <a:t>1923.568854148891</a:t>
+            </a:r>
+          </a:p>
+          <a:p>
+            <a:pPr lvl="1"/>
+            <a:endParaRPr lang="en-DE" sz="1200" dirty="0"/>
+          </a:p>
+          <a:p>
+            <a:r>
+              <a:rPr lang="en-GB" sz="1200" dirty="0" err="1"/>
+              <a:t>p_range</a:t>
+            </a:r>
+            <a:r>
+              <a:rPr lang="en-GB" sz="1200" dirty="0"/>
+              <a:t>=</a:t>
+            </a:r>
+            <a:r>
+              <a:rPr lang="en-GB" sz="1200" dirty="0" err="1"/>
+              <a:t>np.arange</a:t>
+            </a:r>
+            <a:r>
+              <a:rPr lang="en-GB" sz="1200" dirty="0"/>
+              <a:t>(0, 0.95, 0.03)</a:t>
+            </a:r>
+          </a:p>
+          <a:p>
+            <a:r>
+              <a:rPr lang="en-GB" sz="1200" dirty="0" err="1"/>
+              <a:t>eps_range</a:t>
+            </a:r>
+            <a:r>
+              <a:rPr lang="en-GB" sz="1200" dirty="0"/>
+              <a:t>=</a:t>
+            </a:r>
+            <a:r>
+              <a:rPr lang="en-GB" sz="1200" dirty="0" err="1"/>
+              <a:t>np.arange</a:t>
+            </a:r>
+            <a:r>
+              <a:rPr lang="en-GB" sz="1200" dirty="0"/>
+              <a:t>(0.1,2,0.03)</a:t>
+            </a:r>
+          </a:p>
+          <a:p>
+            <a:r>
+              <a:rPr lang="en-GB" sz="1200" dirty="0" err="1"/>
+              <a:t>alp_range</a:t>
+            </a:r>
+            <a:r>
+              <a:rPr lang="en-GB" sz="1200" dirty="0"/>
+              <a:t>=</a:t>
+            </a:r>
+            <a:r>
+              <a:rPr lang="en-GB" sz="1200" dirty="0" err="1"/>
+              <a:t>np.arange</a:t>
+            </a:r>
+            <a:r>
+              <a:rPr lang="en-GB" sz="1200" dirty="0"/>
+              <a:t>(1.1, 2.5,0.05)</a:t>
+            </a:r>
+          </a:p>
+          <a:p>
+            <a:r>
+              <a:rPr lang="en-GB" sz="1200" dirty="0"/>
+              <a:t>Error: Wasserstein distance (the earth mover’s distance,)</a:t>
+            </a:r>
+          </a:p>
+          <a:p>
+            <a:r>
+              <a:rPr lang="en-GB" sz="1200" dirty="0"/>
+              <a:t>Largest distance=10000 and shortest&gt;10</a:t>
+            </a:r>
+          </a:p>
+          <a:p>
+            <a:r>
+              <a:rPr lang="en-DE" sz="1200" dirty="0"/>
+              <a:t>#Samples: 400 Visualization:10000</a:t>
+            </a:r>
+          </a:p>
+          <a:p>
+            <a:pPr lvl="1"/>
+            <a:endParaRPr lang="en-DE" sz="1400" dirty="0"/>
+          </a:p>
+          <a:p>
+            <a:pPr marL="0" indent="0">
+              <a:buNone/>
+            </a:pPr>
+            <a:endParaRPr lang="en-DE" sz="1600" dirty="0"/>
+          </a:p>
+        </p:txBody>
+      </p:sp>
+      <p:sp>
+        <p:nvSpPr>
+          <p:cNvPr id="4" name="Slide Number Placeholder 3">
+            <a:extLst>
+              <a:ext uri="{FF2B5EF4-FFF2-40B4-BE49-F238E27FC236}">
+                <a16:creationId xmlns:a16="http://schemas.microsoft.com/office/drawing/2014/main" id="{A28BE308-F095-782F-B448-59B534A262BE}"/>
+              </a:ext>
+            </a:extLst>
+          </p:cNvPr>
+          <p:cNvSpPr>
+            <a:spLocks noGrp="1"/>
+          </p:cNvSpPr>
+          <p:nvPr>
+            <p:ph type="sldNum" sz="quarter" idx="10"/>
+          </p:nvPr>
+        </p:nvSpPr>
+        <p:spPr/>
+        <p:txBody>
+          <a:bodyPr/>
+          <a:lstStyle/>
+          <a:p>
+            <a:pPr>
+              <a:defRPr/>
+            </a:pPr>
+            <a:fld id="{13FD7AA2-DC10-7C40-BE93-1CFAEDE49800}" type="slidenum">
+              <a:rPr lang="en-US" altLang="de-DE" smtClean="0"/>
+              <a:pPr>
+                <a:defRPr/>
+              </a:pPr>
+              <a:t>17</a:t>
+            </a:fld>
+            <a:endParaRPr lang="en-US" altLang="de-DE"/>
+          </a:p>
+        </p:txBody>
+      </p:sp>
+      <p:graphicFrame>
+        <p:nvGraphicFramePr>
+          <p:cNvPr id="5" name="Table 5">
+            <a:extLst>
+              <a:ext uri="{FF2B5EF4-FFF2-40B4-BE49-F238E27FC236}">
+                <a16:creationId xmlns:a16="http://schemas.microsoft.com/office/drawing/2014/main" id="{DA0984B5-5203-3327-58A7-79289C37D231}"/>
+              </a:ext>
+            </a:extLst>
+          </p:cNvPr>
+          <p:cNvGraphicFramePr>
+            <a:graphicFrameLocks noGrp="1"/>
+          </p:cNvGraphicFramePr>
+          <p:nvPr>
+            <p:extLst>
+              <p:ext uri="{D42A27DB-BD31-4B8C-83A1-F6EECF244321}">
+                <p14:modId xmlns:p14="http://schemas.microsoft.com/office/powerpoint/2010/main" val="1383585302"/>
+              </p:ext>
+            </p:extLst>
+          </p:nvPr>
+        </p:nvGraphicFramePr>
+        <p:xfrm>
+          <a:off x="609601" y="1336224"/>
+          <a:ext cx="2760628" cy="2092776"/>
+        </p:xfrm>
+        <a:graphic>
+          <a:graphicData uri="http://schemas.openxmlformats.org/drawingml/2006/table">
+            <a:tbl>
+              <a:tblPr firstRow="1" bandRow="1">
+                <a:tableStyleId>{21E4AEA4-8DFA-4A89-87EB-49C32662AFE0}</a:tableStyleId>
+              </a:tblPr>
+              <a:tblGrid>
+                <a:gridCol w="690157">
+                  <a:extLst>
+                    <a:ext uri="{9D8B030D-6E8A-4147-A177-3AD203B41FA5}">
+                      <a16:colId xmlns:a16="http://schemas.microsoft.com/office/drawing/2014/main" val="2015579830"/>
+                    </a:ext>
+                  </a:extLst>
+                </a:gridCol>
+                <a:gridCol w="690157">
+                  <a:extLst>
+                    <a:ext uri="{9D8B030D-6E8A-4147-A177-3AD203B41FA5}">
+                      <a16:colId xmlns:a16="http://schemas.microsoft.com/office/drawing/2014/main" val="831545333"/>
+                    </a:ext>
+                  </a:extLst>
+                </a:gridCol>
+                <a:gridCol w="690157">
+                  <a:extLst>
+                    <a:ext uri="{9D8B030D-6E8A-4147-A177-3AD203B41FA5}">
+                      <a16:colId xmlns:a16="http://schemas.microsoft.com/office/drawing/2014/main" val="3982934071"/>
+                    </a:ext>
+                  </a:extLst>
+                </a:gridCol>
+                <a:gridCol w="690157">
+                  <a:extLst>
+                    <a:ext uri="{9D8B030D-6E8A-4147-A177-3AD203B41FA5}">
+                      <a16:colId xmlns:a16="http://schemas.microsoft.com/office/drawing/2014/main" val="2370268705"/>
+                    </a:ext>
+                  </a:extLst>
+                </a:gridCol>
+              </a:tblGrid>
+              <a:tr h="0">
+                <a:tc>
+                  <a:txBody>
+                    <a:bodyPr/>
+                    <a:lstStyle/>
+                    <a:p>
+                      <a:endParaRPr lang="en-DE" sz="1700" b="0" dirty="0">
+                        <a:solidFill>
+                          <a:schemeClr val="tx1"/>
+                        </a:solidFill>
+                        <a:latin typeface="Times New Roman" panose="02020603050405020304" pitchFamily="18" charset="0"/>
+                        <a:cs typeface="Times New Roman" panose="02020603050405020304" pitchFamily="18" charset="0"/>
+                      </a:endParaRPr>
+                    </a:p>
+                  </a:txBody>
+                  <a:tcPr marL="85045" marR="85045" marT="42522" marB="42522"/>
+                </a:tc>
+                <a:tc>
+                  <a:txBody>
+                    <a:bodyPr/>
+                    <a:lstStyle/>
+                    <a:p>
+                      <a:r>
+                        <a:rPr lang="en-DE" sz="1700" b="0" dirty="0">
+                          <a:solidFill>
+                            <a:schemeClr val="tx1"/>
+                          </a:solidFill>
+                          <a:latin typeface="Times New Roman" panose="02020603050405020304" pitchFamily="18" charset="0"/>
+                          <a:cs typeface="Times New Roman" panose="02020603050405020304" pitchFamily="18" charset="0"/>
+                        </a:rPr>
+                        <a:t>eps</a:t>
+                      </a:r>
+                    </a:p>
+                  </a:txBody>
+                  <a:tcPr marL="85045" marR="85045" marT="42522" marB="42522"/>
+                </a:tc>
+                <a:tc>
+                  <a:txBody>
+                    <a:bodyPr/>
+                    <a:lstStyle/>
+                    <a:p>
+                      <a:r>
+                        <a:rPr lang="en-DE" sz="1700" b="0" dirty="0">
+                          <a:solidFill>
+                            <a:schemeClr val="tx1"/>
+                          </a:solidFill>
+                          <a:latin typeface="Times New Roman" panose="02020603050405020304" pitchFamily="18" charset="0"/>
+                          <a:cs typeface="Times New Roman" panose="02020603050405020304" pitchFamily="18" charset="0"/>
+                        </a:rPr>
+                        <a:t>p</a:t>
+                      </a:r>
+                    </a:p>
+                  </a:txBody>
+                  <a:tcPr marL="85045" marR="85045" marT="42522" marB="42522"/>
+                </a:tc>
+                <a:tc>
+                  <a:txBody>
+                    <a:bodyPr/>
+                    <a:lstStyle/>
+                    <a:p>
+                      <a:r>
+                        <a:rPr lang="en-DE" sz="1700" b="0" dirty="0">
+                          <a:solidFill>
+                            <a:schemeClr val="tx1"/>
+                          </a:solidFill>
+                          <a:latin typeface="Times New Roman" panose="02020603050405020304" pitchFamily="18" charset="0"/>
+                          <a:cs typeface="Times New Roman" panose="02020603050405020304" pitchFamily="18" charset="0"/>
+                        </a:rPr>
+                        <a:t>alpha</a:t>
+                      </a:r>
+                    </a:p>
+                  </a:txBody>
+                  <a:tcPr marL="85045" marR="85045" marT="42522" marB="42522"/>
+                </a:tc>
+                <a:extLst>
+                  <a:ext uri="{0D108BD9-81ED-4DB2-BD59-A6C34878D82A}">
+                    <a16:rowId xmlns:a16="http://schemas.microsoft.com/office/drawing/2014/main" val="2603681906"/>
+                  </a:ext>
+                </a:extLst>
+              </a:tr>
+              <a:tr h="0">
+                <a:tc>
+                  <a:txBody>
+                    <a:bodyPr/>
+                    <a:lstStyle/>
+                    <a:p>
+                      <a:pPr marL="0" marR="0" lvl="0" indent="0" algn="l" defTabSz="685800" rtl="0" eaLnBrk="1" fontAlgn="auto" latinLnBrk="0" hangingPunct="1">
+                        <a:lnSpc>
+                          <a:spcPct val="100000"/>
+                        </a:lnSpc>
+                        <a:spcBef>
+                          <a:spcPts val="0"/>
+                        </a:spcBef>
+                        <a:spcAft>
+                          <a:spcPts val="0"/>
+                        </a:spcAft>
+                        <a:buClrTx/>
+                        <a:buSzTx/>
+                        <a:buFontTx/>
+                        <a:buNone/>
+                        <a:tabLst/>
+                        <a:defRPr/>
+                      </a:pPr>
+                      <a:r>
+                        <a:rPr lang="en-DE" sz="1500" dirty="0">
+                          <a:latin typeface="Times New Roman" panose="02020603050405020304" pitchFamily="18" charset="0"/>
+                          <a:cs typeface="Times New Roman" panose="02020603050405020304" pitchFamily="18" charset="0"/>
+                        </a:rPr>
+                        <a:t>Hand picked</a:t>
+                      </a:r>
+                      <a:endParaRPr lang="en-DE" sz="1700" dirty="0">
+                        <a:latin typeface="Times New Roman" panose="02020603050405020304" pitchFamily="18" charset="0"/>
+                        <a:cs typeface="Times New Roman" panose="02020603050405020304" pitchFamily="18" charset="0"/>
+                      </a:endParaRPr>
+                    </a:p>
+                  </a:txBody>
+                  <a:tcPr marL="85045" marR="85045" marT="42522" marB="42522"/>
+                </a:tc>
+                <a:tc>
+                  <a:txBody>
+                    <a:bodyPr/>
+                    <a:lstStyle/>
+                    <a:p>
+                      <a:r>
+                        <a:rPr lang="en-DE" sz="1700" b="0" dirty="0">
+                          <a:solidFill>
+                            <a:schemeClr val="tx1"/>
+                          </a:solidFill>
+                          <a:latin typeface="Times New Roman" panose="02020603050405020304" pitchFamily="18" charset="0"/>
+                          <a:cs typeface="Times New Roman" panose="02020603050405020304" pitchFamily="18" charset="0"/>
+                        </a:rPr>
+                        <a:t>2</a:t>
+                      </a:r>
+                    </a:p>
+                  </a:txBody>
+                  <a:tcPr marL="85045" marR="85045" marT="42522" marB="42522"/>
+                </a:tc>
+                <a:tc>
+                  <a:txBody>
+                    <a:bodyPr/>
+                    <a:lstStyle/>
+                    <a:p>
+                      <a:r>
+                        <a:rPr lang="en-DE" sz="1700" b="0" dirty="0">
+                          <a:solidFill>
+                            <a:schemeClr val="tx1"/>
+                          </a:solidFill>
+                          <a:latin typeface="Times New Roman" panose="02020603050405020304" pitchFamily="18" charset="0"/>
+                          <a:cs typeface="Times New Roman" panose="02020603050405020304" pitchFamily="18" charset="0"/>
+                        </a:rPr>
+                        <a:t>0.7</a:t>
+                      </a:r>
+                    </a:p>
+                  </a:txBody>
+                  <a:tcPr marL="85045" marR="85045" marT="42522" marB="42522"/>
+                </a:tc>
+                <a:tc>
+                  <a:txBody>
+                    <a:bodyPr/>
+                    <a:lstStyle/>
+                    <a:p>
+                      <a:r>
+                        <a:rPr lang="en-DE" sz="1700" b="0" dirty="0">
+                          <a:solidFill>
+                            <a:schemeClr val="tx1"/>
+                          </a:solidFill>
+                          <a:latin typeface="Times New Roman" panose="02020603050405020304" pitchFamily="18" charset="0"/>
+                          <a:cs typeface="Times New Roman" panose="02020603050405020304" pitchFamily="18" charset="0"/>
+                        </a:rPr>
+                        <a:t>1.1</a:t>
+                      </a:r>
+                    </a:p>
+                  </a:txBody>
+                  <a:tcPr marL="85045" marR="85045" marT="42522" marB="42522"/>
+                </a:tc>
+                <a:extLst>
+                  <a:ext uri="{0D108BD9-81ED-4DB2-BD59-A6C34878D82A}">
+                    <a16:rowId xmlns:a16="http://schemas.microsoft.com/office/drawing/2014/main" val="1143183472"/>
+                  </a:ext>
+                </a:extLst>
+              </a:tr>
+              <a:tr h="0">
+                <a:tc>
+                  <a:txBody>
+                    <a:bodyPr/>
+                    <a:lstStyle/>
+                    <a:p>
+                      <a:r>
+                        <a:rPr lang="en-GB" sz="1700" b="0" dirty="0">
+                          <a:solidFill>
+                            <a:schemeClr val="tx1"/>
+                          </a:solidFill>
+                          <a:latin typeface="Times New Roman" panose="02020603050405020304" pitchFamily="18" charset="0"/>
+                          <a:cs typeface="Times New Roman" panose="02020603050405020304" pitchFamily="18" charset="0"/>
+                        </a:rPr>
+                        <a:t>B</a:t>
+                      </a:r>
+                      <a:r>
+                        <a:rPr lang="en-DE" sz="1700" b="0" dirty="0">
+                          <a:solidFill>
+                            <a:schemeClr val="tx1"/>
+                          </a:solidFill>
+                          <a:latin typeface="Times New Roman" panose="02020603050405020304" pitchFamily="18" charset="0"/>
+                          <a:cs typeface="Times New Roman" panose="02020603050405020304" pitchFamily="18" charset="0"/>
+                        </a:rPr>
+                        <a:t>est fit</a:t>
+                      </a:r>
+                    </a:p>
+                  </a:txBody>
+                  <a:tcPr marL="85045" marR="85045" marT="42522" marB="42522"/>
+                </a:tc>
+                <a:tc>
+                  <a:txBody>
+                    <a:bodyPr/>
+                    <a:lstStyle/>
+                    <a:p>
+                      <a:r>
+                        <a:rPr lang="en-DE" sz="1700" b="0" dirty="0">
+                          <a:solidFill>
+                            <a:schemeClr val="tx1"/>
+                          </a:solidFill>
+                          <a:latin typeface="Times New Roman" panose="02020603050405020304" pitchFamily="18" charset="0"/>
+                          <a:cs typeface="Times New Roman" panose="02020603050405020304" pitchFamily="18" charset="0"/>
+                        </a:rPr>
+                        <a:t>0.91</a:t>
+                      </a:r>
+                    </a:p>
+                  </a:txBody>
+                  <a:tcPr marL="85045" marR="85045" marT="42522" marB="42522"/>
+                </a:tc>
+                <a:tc>
+                  <a:txBody>
+                    <a:bodyPr/>
+                    <a:lstStyle/>
+                    <a:p>
+                      <a:r>
+                        <a:rPr lang="en-DE" sz="1700" b="0" dirty="0">
+                          <a:solidFill>
+                            <a:schemeClr val="tx1"/>
+                          </a:solidFill>
+                          <a:latin typeface="Times New Roman" panose="02020603050405020304" pitchFamily="18" charset="0"/>
+                          <a:cs typeface="Times New Roman" panose="02020603050405020304" pitchFamily="18" charset="0"/>
+                        </a:rPr>
+                        <a:t>0.42</a:t>
+                      </a:r>
+                    </a:p>
+                  </a:txBody>
+                  <a:tcPr marL="85045" marR="85045" marT="42522" marB="42522"/>
+                </a:tc>
+                <a:tc>
+                  <a:txBody>
+                    <a:bodyPr/>
+                    <a:lstStyle/>
+                    <a:p>
+                      <a:r>
+                        <a:rPr lang="en-DE" sz="1700" b="0" dirty="0">
+                          <a:solidFill>
+                            <a:schemeClr val="tx1"/>
+                          </a:solidFill>
+                          <a:latin typeface="Times New Roman" panose="02020603050405020304" pitchFamily="18" charset="0"/>
+                          <a:cs typeface="Times New Roman" panose="02020603050405020304" pitchFamily="18" charset="0"/>
+                        </a:rPr>
+                        <a:t>2.4</a:t>
+                      </a:r>
+                    </a:p>
+                  </a:txBody>
+                  <a:tcPr marL="85045" marR="85045" marT="42522" marB="42522"/>
+                </a:tc>
+                <a:extLst>
+                  <a:ext uri="{0D108BD9-81ED-4DB2-BD59-A6C34878D82A}">
+                    <a16:rowId xmlns:a16="http://schemas.microsoft.com/office/drawing/2014/main" val="3031271706"/>
+                  </a:ext>
+                </a:extLst>
+              </a:tr>
+              <a:tr h="0">
+                <a:tc>
+                  <a:txBody>
+                    <a:bodyPr/>
+                    <a:lstStyle/>
+                    <a:p>
+                      <a:r>
+                        <a:rPr lang="en-DE" sz="1700" b="0" dirty="0">
+                          <a:solidFill>
+                            <a:schemeClr val="tx1"/>
+                          </a:solidFill>
+                          <a:latin typeface="Times New Roman" panose="02020603050405020304" pitchFamily="18" charset="0"/>
+                          <a:cs typeface="Times New Roman" panose="02020603050405020304" pitchFamily="18" charset="0"/>
+                        </a:rPr>
+                        <a:t>Worst fit</a:t>
+                      </a:r>
+                    </a:p>
+                  </a:txBody>
+                  <a:tcPr marL="85045" marR="85045" marT="42522" marB="42522"/>
+                </a:tc>
+                <a:tc>
+                  <a:txBody>
+                    <a:bodyPr/>
+                    <a:lstStyle/>
+                    <a:p>
+                      <a:r>
+                        <a:rPr lang="en-DE" sz="1700" b="0" dirty="0">
+                          <a:solidFill>
+                            <a:schemeClr val="tx1"/>
+                          </a:solidFill>
+                          <a:latin typeface="Times New Roman" panose="02020603050405020304" pitchFamily="18" charset="0"/>
+                          <a:cs typeface="Times New Roman" panose="02020603050405020304" pitchFamily="18" charset="0"/>
+                        </a:rPr>
+                        <a:t>1.93</a:t>
+                      </a:r>
+                    </a:p>
+                  </a:txBody>
+                  <a:tcPr marL="85045" marR="85045" marT="42522" marB="42522"/>
+                </a:tc>
+                <a:tc>
+                  <a:txBody>
+                    <a:bodyPr/>
+                    <a:lstStyle/>
+                    <a:p>
+                      <a:r>
+                        <a:rPr lang="en-DE" sz="1700" b="0" dirty="0">
+                          <a:solidFill>
+                            <a:schemeClr val="tx1"/>
+                          </a:solidFill>
+                          <a:latin typeface="Times New Roman" panose="02020603050405020304" pitchFamily="18" charset="0"/>
+                          <a:cs typeface="Times New Roman" panose="02020603050405020304" pitchFamily="18" charset="0"/>
+                        </a:rPr>
+                        <a:t>0.93</a:t>
+                      </a:r>
+                    </a:p>
+                  </a:txBody>
+                  <a:tcPr marL="85045" marR="85045" marT="42522" marB="42522"/>
+                </a:tc>
+                <a:tc>
+                  <a:txBody>
+                    <a:bodyPr/>
+                    <a:lstStyle/>
+                    <a:p>
+                      <a:r>
+                        <a:rPr lang="en-DE" sz="1700" b="0" dirty="0">
+                          <a:solidFill>
+                            <a:schemeClr val="tx1"/>
+                          </a:solidFill>
+                          <a:latin typeface="Times New Roman" panose="02020603050405020304" pitchFamily="18" charset="0"/>
+                          <a:cs typeface="Times New Roman" panose="02020603050405020304" pitchFamily="18" charset="0"/>
+                        </a:rPr>
+                        <a:t>1.1</a:t>
+                      </a:r>
+                    </a:p>
+                  </a:txBody>
+                  <a:tcPr marL="85045" marR="85045" marT="42522" marB="42522"/>
+                </a:tc>
+                <a:extLst>
+                  <a:ext uri="{0D108BD9-81ED-4DB2-BD59-A6C34878D82A}">
+                    <a16:rowId xmlns:a16="http://schemas.microsoft.com/office/drawing/2014/main" val="612192117"/>
+                  </a:ext>
+                </a:extLst>
+              </a:tr>
+            </a:tbl>
+          </a:graphicData>
+        </a:graphic>
+      </p:graphicFrame>
+      <p:pic>
+        <p:nvPicPr>
+          <p:cNvPr id="6" name="Picture 2">
+            <a:extLst>
+              <a:ext uri="{FF2B5EF4-FFF2-40B4-BE49-F238E27FC236}">
+                <a16:creationId xmlns:a16="http://schemas.microsoft.com/office/drawing/2014/main" id="{112BDAEE-C155-C4A2-3095-E0C404B2CB40}"/>
+              </a:ext>
+            </a:extLst>
+          </p:cNvPr>
+          <p:cNvPicPr>
+            <a:picLocks noChangeAspect="1" noChangeArrowheads="1"/>
+          </p:cNvPicPr>
+          <p:nvPr/>
+        </p:nvPicPr>
+        <p:blipFill>
+          <a:blip r:embed="rId2">
+            <a:extLst>
+              <a:ext uri="{28A0092B-C50C-407E-A947-70E740481C1C}">
+                <a14:useLocalDpi xmlns:a14="http://schemas.microsoft.com/office/drawing/2010/main" val="0"/>
+              </a:ext>
+            </a:extLst>
+          </a:blip>
+          <a:srcRect/>
+          <a:stretch/>
+        </p:blipFill>
+        <p:spPr bwMode="auto">
+          <a:xfrm>
+            <a:off x="3446428" y="1259214"/>
+            <a:ext cx="5637813" cy="4461226"/>
+          </a:xfrm>
+          <a:prstGeom prst="rect">
+            <a:avLst/>
+          </a:prstGeom>
+          <a:noFill/>
+          <a:extLst>
+            <a:ext uri="{909E8E84-426E-40DD-AFC4-6F175D3DCCD1}">
+              <a14:hiddenFill xmlns:a14="http://schemas.microsoft.com/office/drawing/2010/main">
+                <a:solidFill>
+                  <a:srgbClr val="FFFFFF"/>
+                </a:solidFill>
+              </a14:hiddenFill>
+            </a:ext>
+          </a:extLst>
+        </p:spPr>
+      </p:pic>
+    </p:spTree>
+    <p:extLst>
+      <p:ext uri="{BB962C8B-B14F-4D97-AF65-F5344CB8AC3E}">
+        <p14:creationId xmlns:p14="http://schemas.microsoft.com/office/powerpoint/2010/main" val="838370535"/>
+      </p:ext>
+    </p:extLst>
+  </p:cSld>
+  <p:clrMapOvr>
+    <a:masterClrMapping/>
+  </p:clrMapOvr>
+</p:sld>
+</file>
+
+<file path=ppt/slides/slide18.xml><?xml version="1.0" encoding="utf-8"?>
+<p:sld xmlns:a="http://schemas.openxmlformats.org/drawingml/2006/main" xmlns:r="http://schemas.openxmlformats.org/officeDocument/2006/relationships" xmlns:p="http://schemas.openxmlformats.org/presentationml/2006/main">
+  <p:cSld>
+    <p:spTree>
+      <p:nvGrpSpPr>
+        <p:cNvPr id="1" name=""/>
+        <p:cNvGrpSpPr/>
+        <p:nvPr/>
+      </p:nvGrpSpPr>
+      <p:grpSpPr>
+        <a:xfrm>
+          <a:off x="0" y="0"/>
+          <a:ext cx="0" cy="0"/>
+          <a:chOff x="0" y="0"/>
+          <a:chExt cx="0" cy="0"/>
+        </a:xfrm>
+      </p:grpSpPr>
+      <p:sp>
+        <p:nvSpPr>
+          <p:cNvPr id="2" name="Title 1">
+            <a:extLst>
+              <a:ext uri="{FF2B5EF4-FFF2-40B4-BE49-F238E27FC236}">
+                <a16:creationId xmlns:a16="http://schemas.microsoft.com/office/drawing/2014/main" id="{FD5F5B2C-D6F2-BF7E-E8D7-813995702D15}"/>
+              </a:ext>
+            </a:extLst>
+          </p:cNvPr>
+          <p:cNvSpPr>
+            <a:spLocks noGrp="1"/>
+          </p:cNvSpPr>
+          <p:nvPr>
+            <p:ph type="title"/>
+          </p:nvPr>
+        </p:nvSpPr>
+        <p:spPr/>
+        <p:txBody>
+          <a:bodyPr/>
+          <a:lstStyle/>
+          <a:p>
+            <a:r>
+              <a:rPr lang="en-DE" sz="2000" dirty="0"/>
+              <a:t>Refine Best Fit-Short Range in Nhts17-modelling between 10~1000km</a:t>
+            </a:r>
+          </a:p>
+        </p:txBody>
+      </p:sp>
+      <p:sp>
+        <p:nvSpPr>
+          <p:cNvPr id="3" name="Content Placeholder 2">
+            <a:extLst>
+              <a:ext uri="{FF2B5EF4-FFF2-40B4-BE49-F238E27FC236}">
+                <a16:creationId xmlns:a16="http://schemas.microsoft.com/office/drawing/2014/main" id="{7E6EDD97-98F3-F2B7-2E47-B6E3553CF328}"/>
+              </a:ext>
+            </a:extLst>
+          </p:cNvPr>
+          <p:cNvSpPr>
+            <a:spLocks noGrp="1"/>
+          </p:cNvSpPr>
+          <p:nvPr>
+            <p:ph idx="1"/>
+          </p:nvPr>
+        </p:nvSpPr>
+        <p:spPr>
+          <a:xfrm>
+            <a:off x="533401" y="914399"/>
+            <a:ext cx="3719286" cy="5441953"/>
+          </a:xfrm>
+        </p:spPr>
+        <p:txBody>
+          <a:bodyPr>
+            <a:normAutofit lnSpcReduction="10000"/>
+          </a:bodyPr>
+          <a:lstStyle/>
+          <a:p>
+            <a:r>
+              <a:rPr lang="en-DE" sz="1400" dirty="0"/>
+              <a:t>Auto Driver in Nhts17 </a:t>
+            </a:r>
+          </a:p>
+          <a:p>
+            <a:pPr lvl="1"/>
+            <a:r>
+              <a:rPr lang="en-GB" sz="1200" dirty="0"/>
+              <a:t>D</a:t>
+            </a:r>
+            <a:r>
+              <a:rPr lang="en-DE" sz="1200" dirty="0"/>
+              <a:t>atasize=10223</a:t>
+            </a:r>
+          </a:p>
+          <a:p>
+            <a:endParaRPr lang="en-DE" sz="1600" dirty="0"/>
+          </a:p>
+          <a:p>
+            <a:endParaRPr lang="en-DE" sz="1600" dirty="0"/>
+          </a:p>
+          <a:p>
+            <a:endParaRPr lang="en-DE" sz="1600" dirty="0"/>
+          </a:p>
+          <a:p>
+            <a:endParaRPr lang="en-DE" sz="1600" dirty="0"/>
+          </a:p>
+          <a:p>
+            <a:endParaRPr lang="en-DE" sz="1600" dirty="0"/>
+          </a:p>
+          <a:p>
+            <a:endParaRPr lang="en-DE" sz="1600" dirty="0"/>
+          </a:p>
+          <a:p>
+            <a:endParaRPr lang="en-DE" sz="1400" dirty="0"/>
+          </a:p>
+          <a:p>
+            <a:endParaRPr lang="en-DE" sz="1400" dirty="0"/>
+          </a:p>
+          <a:p>
+            <a:r>
+              <a:rPr lang="en-DE" sz="1400" dirty="0"/>
+              <a:t>Best fit error:</a:t>
+            </a:r>
+          </a:p>
+          <a:p>
+            <a:pPr lvl="1"/>
+            <a:r>
+              <a:rPr lang="en-DE" sz="1200" dirty="0"/>
+              <a:t>2.1135655984394757</a:t>
+            </a:r>
+          </a:p>
+          <a:p>
+            <a:r>
+              <a:rPr lang="en-DE" sz="1400" dirty="0"/>
+              <a:t>Worst fit error</a:t>
+            </a:r>
+          </a:p>
+          <a:p>
+            <a:pPr lvl="1"/>
+            <a:r>
+              <a:rPr lang="en-DE" sz="1200" dirty="0"/>
+              <a:t>9.724983552616898</a:t>
+            </a:r>
+          </a:p>
+          <a:p>
+            <a:pPr lvl="1"/>
+            <a:endParaRPr lang="en-DE" sz="1200" dirty="0"/>
+          </a:p>
+          <a:p>
+            <a:r>
+              <a:rPr lang="en-GB" sz="1200" dirty="0" err="1"/>
+              <a:t>eps_range</a:t>
+            </a:r>
+            <a:r>
+              <a:rPr lang="en-GB" sz="1200" dirty="0"/>
+              <a:t>=</a:t>
+            </a:r>
+            <a:r>
+              <a:rPr lang="en-GB" sz="1200" dirty="0" err="1"/>
+              <a:t>np.arange</a:t>
+            </a:r>
+            <a:r>
+              <a:rPr lang="en-GB" sz="1200" dirty="0"/>
+              <a:t>(0.85,0.95,0.01)</a:t>
+            </a:r>
+          </a:p>
+          <a:p>
+            <a:r>
+              <a:rPr lang="en-GB" sz="1200" dirty="0" err="1"/>
+              <a:t>p_range</a:t>
+            </a:r>
+            <a:r>
+              <a:rPr lang="en-GB" sz="1200" dirty="0"/>
+              <a:t>=</a:t>
+            </a:r>
+            <a:r>
+              <a:rPr lang="en-GB" sz="1200" dirty="0" err="1"/>
+              <a:t>np.arange</a:t>
+            </a:r>
+            <a:r>
+              <a:rPr lang="en-GB" sz="1200" dirty="0"/>
+              <a:t>(0.35, 0.45, 0.01)</a:t>
+            </a:r>
+          </a:p>
+          <a:p>
+            <a:r>
+              <a:rPr lang="en-GB" sz="1200" dirty="0" err="1"/>
+              <a:t>alp_range</a:t>
+            </a:r>
+            <a:r>
+              <a:rPr lang="en-GB" sz="1200" dirty="0"/>
+              <a:t>=</a:t>
+            </a:r>
+            <a:r>
+              <a:rPr lang="en-GB" sz="1200" dirty="0" err="1"/>
+              <a:t>np.arange</a:t>
+            </a:r>
+            <a:r>
+              <a:rPr lang="en-GB" sz="1200" dirty="0"/>
+              <a:t>(2.4, 2.7,0.05)</a:t>
+            </a:r>
+          </a:p>
+          <a:p>
+            <a:r>
+              <a:rPr lang="en-GB" sz="1200" dirty="0"/>
+              <a:t>Error: Wasserstein distance (the earth mover’s distance,)</a:t>
+            </a:r>
+          </a:p>
+          <a:p>
+            <a:r>
+              <a:rPr lang="en-GB" sz="1200" dirty="0"/>
+              <a:t>Largest distance=1000 and shortest&gt;=10</a:t>
+            </a:r>
+          </a:p>
+          <a:p>
+            <a:r>
+              <a:rPr lang="en-DE" sz="1400" dirty="0"/>
+              <a:t># Samples:</a:t>
+            </a:r>
+          </a:p>
+          <a:p>
+            <a:pPr lvl="1"/>
+            <a:r>
+              <a:rPr lang="en-GB" sz="1200" dirty="0"/>
+              <a:t>M</a:t>
+            </a:r>
+            <a:r>
+              <a:rPr lang="en-DE" sz="1200" dirty="0"/>
+              <a:t>odelling(2000), Visualization(10000)</a:t>
+            </a:r>
+          </a:p>
+          <a:p>
+            <a:pPr marL="0" indent="0">
+              <a:buNone/>
+            </a:pPr>
+            <a:endParaRPr lang="en-DE" sz="1600" dirty="0"/>
+          </a:p>
+        </p:txBody>
+      </p:sp>
+      <p:sp>
+        <p:nvSpPr>
+          <p:cNvPr id="4" name="Slide Number Placeholder 3">
+            <a:extLst>
+              <a:ext uri="{FF2B5EF4-FFF2-40B4-BE49-F238E27FC236}">
+                <a16:creationId xmlns:a16="http://schemas.microsoft.com/office/drawing/2014/main" id="{A28BE308-F095-782F-B448-59B534A262BE}"/>
+              </a:ext>
+            </a:extLst>
+          </p:cNvPr>
+          <p:cNvSpPr>
+            <a:spLocks noGrp="1"/>
+          </p:cNvSpPr>
+          <p:nvPr>
+            <p:ph type="sldNum" sz="quarter" idx="10"/>
+          </p:nvPr>
+        </p:nvSpPr>
+        <p:spPr/>
+        <p:txBody>
+          <a:bodyPr/>
+          <a:lstStyle/>
+          <a:p>
+            <a:pPr>
+              <a:defRPr/>
+            </a:pPr>
+            <a:fld id="{13FD7AA2-DC10-7C40-BE93-1CFAEDE49800}" type="slidenum">
+              <a:rPr lang="en-US" altLang="de-DE" smtClean="0"/>
+              <a:pPr>
+                <a:defRPr/>
+              </a:pPr>
+              <a:t>18</a:t>
+            </a:fld>
+            <a:endParaRPr lang="en-US" altLang="de-DE"/>
+          </a:p>
+        </p:txBody>
+      </p:sp>
+      <p:graphicFrame>
+        <p:nvGraphicFramePr>
+          <p:cNvPr id="5" name="Table 5">
+            <a:extLst>
+              <a:ext uri="{FF2B5EF4-FFF2-40B4-BE49-F238E27FC236}">
+                <a16:creationId xmlns:a16="http://schemas.microsoft.com/office/drawing/2014/main" id="{DA0984B5-5203-3327-58A7-79289C37D231}"/>
+              </a:ext>
+            </a:extLst>
+          </p:cNvPr>
+          <p:cNvGraphicFramePr>
+            <a:graphicFrameLocks noGrp="1"/>
+          </p:cNvGraphicFramePr>
+          <p:nvPr>
+            <p:extLst>
+              <p:ext uri="{D42A27DB-BD31-4B8C-83A1-F6EECF244321}">
+                <p14:modId xmlns:p14="http://schemas.microsoft.com/office/powerpoint/2010/main" val="2811373333"/>
+              </p:ext>
+            </p:extLst>
+          </p:nvPr>
+        </p:nvGraphicFramePr>
+        <p:xfrm>
+          <a:off x="609601" y="1334361"/>
+          <a:ext cx="2760628" cy="2092776"/>
+        </p:xfrm>
+        <a:graphic>
+          <a:graphicData uri="http://schemas.openxmlformats.org/drawingml/2006/table">
+            <a:tbl>
+              <a:tblPr firstRow="1" bandRow="1">
+                <a:tableStyleId>{21E4AEA4-8DFA-4A89-87EB-49C32662AFE0}</a:tableStyleId>
+              </a:tblPr>
+              <a:tblGrid>
+                <a:gridCol w="690157">
+                  <a:extLst>
+                    <a:ext uri="{9D8B030D-6E8A-4147-A177-3AD203B41FA5}">
+                      <a16:colId xmlns:a16="http://schemas.microsoft.com/office/drawing/2014/main" val="2015579830"/>
+                    </a:ext>
+                  </a:extLst>
+                </a:gridCol>
+                <a:gridCol w="690157">
+                  <a:extLst>
+                    <a:ext uri="{9D8B030D-6E8A-4147-A177-3AD203B41FA5}">
+                      <a16:colId xmlns:a16="http://schemas.microsoft.com/office/drawing/2014/main" val="831545333"/>
+                    </a:ext>
+                  </a:extLst>
+                </a:gridCol>
+                <a:gridCol w="690157">
+                  <a:extLst>
+                    <a:ext uri="{9D8B030D-6E8A-4147-A177-3AD203B41FA5}">
+                      <a16:colId xmlns:a16="http://schemas.microsoft.com/office/drawing/2014/main" val="3982934071"/>
+                    </a:ext>
+                  </a:extLst>
+                </a:gridCol>
+                <a:gridCol w="690157">
+                  <a:extLst>
+                    <a:ext uri="{9D8B030D-6E8A-4147-A177-3AD203B41FA5}">
+                      <a16:colId xmlns:a16="http://schemas.microsoft.com/office/drawing/2014/main" val="2370268705"/>
+                    </a:ext>
+                  </a:extLst>
+                </a:gridCol>
+              </a:tblGrid>
+              <a:tr h="0">
+                <a:tc>
+                  <a:txBody>
+                    <a:bodyPr/>
+                    <a:lstStyle/>
+                    <a:p>
+                      <a:endParaRPr lang="en-DE" sz="1700" b="0" dirty="0">
+                        <a:solidFill>
+                          <a:schemeClr val="tx1"/>
+                        </a:solidFill>
+                        <a:latin typeface="Times New Roman" panose="02020603050405020304" pitchFamily="18" charset="0"/>
+                        <a:cs typeface="Times New Roman" panose="02020603050405020304" pitchFamily="18" charset="0"/>
+                      </a:endParaRPr>
+                    </a:p>
+                  </a:txBody>
+                  <a:tcPr marL="85045" marR="85045" marT="42522" marB="42522"/>
+                </a:tc>
+                <a:tc>
+                  <a:txBody>
+                    <a:bodyPr/>
+                    <a:lstStyle/>
+                    <a:p>
+                      <a:r>
+                        <a:rPr lang="en-DE" sz="1700" b="0" dirty="0">
+                          <a:solidFill>
+                            <a:schemeClr val="tx1"/>
+                          </a:solidFill>
+                          <a:latin typeface="Times New Roman" panose="02020603050405020304" pitchFamily="18" charset="0"/>
+                          <a:cs typeface="Times New Roman" panose="02020603050405020304" pitchFamily="18" charset="0"/>
+                        </a:rPr>
+                        <a:t>eps</a:t>
+                      </a:r>
+                    </a:p>
+                  </a:txBody>
+                  <a:tcPr marL="85045" marR="85045" marT="42522" marB="42522"/>
+                </a:tc>
+                <a:tc>
+                  <a:txBody>
+                    <a:bodyPr/>
+                    <a:lstStyle/>
+                    <a:p>
+                      <a:r>
+                        <a:rPr lang="en-DE" sz="1700" b="0" dirty="0">
+                          <a:solidFill>
+                            <a:schemeClr val="tx1"/>
+                          </a:solidFill>
+                          <a:latin typeface="Times New Roman" panose="02020603050405020304" pitchFamily="18" charset="0"/>
+                          <a:cs typeface="Times New Roman" panose="02020603050405020304" pitchFamily="18" charset="0"/>
+                        </a:rPr>
+                        <a:t>p</a:t>
+                      </a:r>
+                    </a:p>
+                  </a:txBody>
+                  <a:tcPr marL="85045" marR="85045" marT="42522" marB="42522"/>
+                </a:tc>
+                <a:tc>
+                  <a:txBody>
+                    <a:bodyPr/>
+                    <a:lstStyle/>
+                    <a:p>
+                      <a:r>
+                        <a:rPr lang="en-DE" sz="1700" b="0" dirty="0">
+                          <a:solidFill>
+                            <a:schemeClr val="tx1"/>
+                          </a:solidFill>
+                          <a:latin typeface="Times New Roman" panose="02020603050405020304" pitchFamily="18" charset="0"/>
+                          <a:cs typeface="Times New Roman" panose="02020603050405020304" pitchFamily="18" charset="0"/>
+                        </a:rPr>
+                        <a:t>alpha</a:t>
+                      </a:r>
+                    </a:p>
+                  </a:txBody>
+                  <a:tcPr marL="85045" marR="85045" marT="42522" marB="42522"/>
+                </a:tc>
+                <a:extLst>
+                  <a:ext uri="{0D108BD9-81ED-4DB2-BD59-A6C34878D82A}">
+                    <a16:rowId xmlns:a16="http://schemas.microsoft.com/office/drawing/2014/main" val="2603681906"/>
+                  </a:ext>
+                </a:extLst>
+              </a:tr>
+              <a:tr h="0">
+                <a:tc>
+                  <a:txBody>
+                    <a:bodyPr/>
+                    <a:lstStyle/>
+                    <a:p>
+                      <a:pPr marL="0" marR="0" lvl="0" indent="0" algn="l" defTabSz="685800" rtl="0" eaLnBrk="1" fontAlgn="auto" latinLnBrk="0" hangingPunct="1">
+                        <a:lnSpc>
+                          <a:spcPct val="100000"/>
+                        </a:lnSpc>
+                        <a:spcBef>
+                          <a:spcPts val="0"/>
+                        </a:spcBef>
+                        <a:spcAft>
+                          <a:spcPts val="0"/>
+                        </a:spcAft>
+                        <a:buClrTx/>
+                        <a:buSzTx/>
+                        <a:buFontTx/>
+                        <a:buNone/>
+                        <a:tabLst/>
+                        <a:defRPr/>
+                      </a:pPr>
+                      <a:r>
+                        <a:rPr lang="en-DE" sz="1500" dirty="0">
+                          <a:latin typeface="Times New Roman" panose="02020603050405020304" pitchFamily="18" charset="0"/>
+                          <a:cs typeface="Times New Roman" panose="02020603050405020304" pitchFamily="18" charset="0"/>
+                        </a:rPr>
+                        <a:t>Hand picked</a:t>
+                      </a:r>
+                      <a:endParaRPr lang="en-DE" sz="1700" dirty="0">
+                        <a:latin typeface="Times New Roman" panose="02020603050405020304" pitchFamily="18" charset="0"/>
+                        <a:cs typeface="Times New Roman" panose="02020603050405020304" pitchFamily="18" charset="0"/>
+                      </a:endParaRPr>
+                    </a:p>
+                  </a:txBody>
+                  <a:tcPr marL="85045" marR="85045" marT="42522" marB="42522"/>
+                </a:tc>
+                <a:tc>
+                  <a:txBody>
+                    <a:bodyPr/>
+                    <a:lstStyle/>
+                    <a:p>
+                      <a:r>
+                        <a:rPr lang="en-DE" sz="1700" b="0" dirty="0">
+                          <a:solidFill>
+                            <a:schemeClr val="tx1"/>
+                          </a:solidFill>
+                          <a:latin typeface="Times New Roman" panose="02020603050405020304" pitchFamily="18" charset="0"/>
+                          <a:cs typeface="Times New Roman" panose="02020603050405020304" pitchFamily="18" charset="0"/>
+                        </a:rPr>
+                        <a:t>2</a:t>
+                      </a:r>
+                    </a:p>
+                  </a:txBody>
+                  <a:tcPr marL="85045" marR="85045" marT="42522" marB="42522"/>
+                </a:tc>
+                <a:tc>
+                  <a:txBody>
+                    <a:bodyPr/>
+                    <a:lstStyle/>
+                    <a:p>
+                      <a:r>
+                        <a:rPr lang="en-DE" sz="1700" b="0" dirty="0">
+                          <a:solidFill>
+                            <a:schemeClr val="tx1"/>
+                          </a:solidFill>
+                          <a:latin typeface="Times New Roman" panose="02020603050405020304" pitchFamily="18" charset="0"/>
+                          <a:cs typeface="Times New Roman" panose="02020603050405020304" pitchFamily="18" charset="0"/>
+                        </a:rPr>
+                        <a:t>0.7</a:t>
+                      </a:r>
+                    </a:p>
+                  </a:txBody>
+                  <a:tcPr marL="85045" marR="85045" marT="42522" marB="42522"/>
+                </a:tc>
+                <a:tc>
+                  <a:txBody>
+                    <a:bodyPr/>
+                    <a:lstStyle/>
+                    <a:p>
+                      <a:r>
+                        <a:rPr lang="en-DE" sz="1700" b="0" dirty="0">
+                          <a:solidFill>
+                            <a:schemeClr val="tx1"/>
+                          </a:solidFill>
+                          <a:latin typeface="Times New Roman" panose="02020603050405020304" pitchFamily="18" charset="0"/>
+                          <a:cs typeface="Times New Roman" panose="02020603050405020304" pitchFamily="18" charset="0"/>
+                        </a:rPr>
+                        <a:t>1.1</a:t>
+                      </a:r>
+                    </a:p>
+                  </a:txBody>
+                  <a:tcPr marL="85045" marR="85045" marT="42522" marB="42522"/>
+                </a:tc>
+                <a:extLst>
+                  <a:ext uri="{0D108BD9-81ED-4DB2-BD59-A6C34878D82A}">
+                    <a16:rowId xmlns:a16="http://schemas.microsoft.com/office/drawing/2014/main" val="1143183472"/>
+                  </a:ext>
+                </a:extLst>
+              </a:tr>
+              <a:tr h="0">
+                <a:tc>
+                  <a:txBody>
+                    <a:bodyPr/>
+                    <a:lstStyle/>
+                    <a:p>
+                      <a:r>
+                        <a:rPr lang="en-GB" sz="1700" b="0" dirty="0">
+                          <a:solidFill>
+                            <a:schemeClr val="tx1"/>
+                          </a:solidFill>
+                          <a:latin typeface="Times New Roman" panose="02020603050405020304" pitchFamily="18" charset="0"/>
+                          <a:cs typeface="Times New Roman" panose="02020603050405020304" pitchFamily="18" charset="0"/>
+                        </a:rPr>
+                        <a:t>B</a:t>
+                      </a:r>
+                      <a:r>
+                        <a:rPr lang="en-DE" sz="1700" b="0" dirty="0">
+                          <a:solidFill>
+                            <a:schemeClr val="tx1"/>
+                          </a:solidFill>
+                          <a:latin typeface="Times New Roman" panose="02020603050405020304" pitchFamily="18" charset="0"/>
+                          <a:cs typeface="Times New Roman" panose="02020603050405020304" pitchFamily="18" charset="0"/>
+                        </a:rPr>
+                        <a:t>est fit</a:t>
+                      </a:r>
+                    </a:p>
+                  </a:txBody>
+                  <a:tcPr marL="85045" marR="85045" marT="42522" marB="42522"/>
+                </a:tc>
+                <a:tc>
+                  <a:txBody>
+                    <a:bodyPr/>
+                    <a:lstStyle/>
+                    <a:p>
+                      <a:r>
+                        <a:rPr lang="en-DE" sz="1700" b="0" dirty="0">
+                          <a:solidFill>
+                            <a:schemeClr val="tx1"/>
+                          </a:solidFill>
+                          <a:latin typeface="Times New Roman" panose="02020603050405020304" pitchFamily="18" charset="0"/>
+                          <a:cs typeface="Times New Roman" panose="02020603050405020304" pitchFamily="18" charset="0"/>
+                        </a:rPr>
+                        <a:t>0.89</a:t>
+                      </a:r>
+                    </a:p>
+                  </a:txBody>
+                  <a:tcPr marL="85045" marR="85045" marT="42522" marB="42522"/>
+                </a:tc>
+                <a:tc>
+                  <a:txBody>
+                    <a:bodyPr/>
+                    <a:lstStyle/>
+                    <a:p>
+                      <a:r>
+                        <a:rPr lang="en-DE" sz="1700" b="0" dirty="0">
+                          <a:solidFill>
+                            <a:schemeClr val="tx1"/>
+                          </a:solidFill>
+                          <a:latin typeface="Times New Roman" panose="02020603050405020304" pitchFamily="18" charset="0"/>
+                          <a:cs typeface="Times New Roman" panose="02020603050405020304" pitchFamily="18" charset="0"/>
+                        </a:rPr>
+                        <a:t>0.4</a:t>
+                      </a:r>
+                    </a:p>
+                  </a:txBody>
+                  <a:tcPr marL="85045" marR="85045" marT="42522" marB="42522"/>
+                </a:tc>
+                <a:tc>
+                  <a:txBody>
+                    <a:bodyPr/>
+                    <a:lstStyle/>
+                    <a:p>
+                      <a:r>
+                        <a:rPr lang="en-DE" sz="1700" b="0" dirty="0">
+                          <a:solidFill>
+                            <a:schemeClr val="tx1"/>
+                          </a:solidFill>
+                          <a:latin typeface="Times New Roman" panose="02020603050405020304" pitchFamily="18" charset="0"/>
+                          <a:cs typeface="Times New Roman" panose="02020603050405020304" pitchFamily="18" charset="0"/>
+                        </a:rPr>
+                        <a:t>2.45</a:t>
+                      </a:r>
+                    </a:p>
+                  </a:txBody>
+                  <a:tcPr marL="85045" marR="85045" marT="42522" marB="42522"/>
+                </a:tc>
+                <a:extLst>
+                  <a:ext uri="{0D108BD9-81ED-4DB2-BD59-A6C34878D82A}">
+                    <a16:rowId xmlns:a16="http://schemas.microsoft.com/office/drawing/2014/main" val="3031271706"/>
+                  </a:ext>
+                </a:extLst>
+              </a:tr>
+              <a:tr h="0">
+                <a:tc>
+                  <a:txBody>
+                    <a:bodyPr/>
+                    <a:lstStyle/>
+                    <a:p>
+                      <a:r>
+                        <a:rPr lang="en-DE" sz="1700" b="0" dirty="0">
+                          <a:solidFill>
+                            <a:schemeClr val="tx1"/>
+                          </a:solidFill>
+                          <a:latin typeface="Times New Roman" panose="02020603050405020304" pitchFamily="18" charset="0"/>
+                          <a:cs typeface="Times New Roman" panose="02020603050405020304" pitchFamily="18" charset="0"/>
+                        </a:rPr>
+                        <a:t>Worst fit</a:t>
+                      </a:r>
+                    </a:p>
+                  </a:txBody>
+                  <a:tcPr marL="85045" marR="85045" marT="42522" marB="42522"/>
+                </a:tc>
+                <a:tc>
+                  <a:txBody>
+                    <a:bodyPr/>
+                    <a:lstStyle/>
+                    <a:p>
+                      <a:r>
+                        <a:rPr lang="en-DE" sz="1700" b="0" dirty="0">
+                          <a:solidFill>
+                            <a:schemeClr val="tx1"/>
+                          </a:solidFill>
+                          <a:latin typeface="Times New Roman" panose="02020603050405020304" pitchFamily="18" charset="0"/>
+                          <a:cs typeface="Times New Roman" panose="02020603050405020304" pitchFamily="18" charset="0"/>
+                        </a:rPr>
+                        <a:t>0.86</a:t>
+                      </a:r>
+                    </a:p>
+                  </a:txBody>
+                  <a:tcPr marL="85045" marR="85045" marT="42522" marB="42522"/>
+                </a:tc>
+                <a:tc>
+                  <a:txBody>
+                    <a:bodyPr/>
+                    <a:lstStyle/>
+                    <a:p>
+                      <a:r>
+                        <a:rPr lang="en-DE" sz="1700" b="0" dirty="0">
+                          <a:solidFill>
+                            <a:schemeClr val="tx1"/>
+                          </a:solidFill>
+                          <a:latin typeface="Times New Roman" panose="02020603050405020304" pitchFamily="18" charset="0"/>
+                          <a:cs typeface="Times New Roman" panose="02020603050405020304" pitchFamily="18" charset="0"/>
+                        </a:rPr>
+                        <a:t>0.36</a:t>
+                      </a:r>
+                    </a:p>
+                  </a:txBody>
+                  <a:tcPr marL="85045" marR="85045" marT="42522" marB="42522"/>
+                </a:tc>
+                <a:tc>
+                  <a:txBody>
+                    <a:bodyPr/>
+                    <a:lstStyle/>
+                    <a:p>
+                      <a:r>
+                        <a:rPr lang="en-DE" sz="1700" b="0" dirty="0">
+                          <a:solidFill>
+                            <a:schemeClr val="tx1"/>
+                          </a:solidFill>
+                          <a:latin typeface="Times New Roman" panose="02020603050405020304" pitchFamily="18" charset="0"/>
+                          <a:cs typeface="Times New Roman" panose="02020603050405020304" pitchFamily="18" charset="0"/>
+                        </a:rPr>
+                        <a:t>2.7</a:t>
+                      </a:r>
+                    </a:p>
+                  </a:txBody>
+                  <a:tcPr marL="85045" marR="85045" marT="42522" marB="42522"/>
+                </a:tc>
+                <a:extLst>
+                  <a:ext uri="{0D108BD9-81ED-4DB2-BD59-A6C34878D82A}">
+                    <a16:rowId xmlns:a16="http://schemas.microsoft.com/office/drawing/2014/main" val="612192117"/>
+                  </a:ext>
+                </a:extLst>
+              </a:tr>
+            </a:tbl>
+          </a:graphicData>
+        </a:graphic>
+      </p:graphicFrame>
+      <p:pic>
+        <p:nvPicPr>
+          <p:cNvPr id="6" name="Picture 2">
+            <a:extLst>
+              <a:ext uri="{FF2B5EF4-FFF2-40B4-BE49-F238E27FC236}">
+                <a16:creationId xmlns:a16="http://schemas.microsoft.com/office/drawing/2014/main" id="{112BDAEE-C155-C4A2-3095-E0C404B2CB40}"/>
+              </a:ext>
+            </a:extLst>
+          </p:cNvPr>
+          <p:cNvPicPr>
+            <a:picLocks noChangeAspect="1" noChangeArrowheads="1"/>
+          </p:cNvPicPr>
+          <p:nvPr/>
+        </p:nvPicPr>
+        <p:blipFill>
+          <a:blip r:embed="rId2">
+            <a:extLst>
+              <a:ext uri="{28A0092B-C50C-407E-A947-70E740481C1C}">
+                <a14:useLocalDpi xmlns:a14="http://schemas.microsoft.com/office/drawing/2010/main" val="0"/>
+              </a:ext>
+            </a:extLst>
+          </a:blip>
+          <a:srcRect/>
+          <a:stretch/>
+        </p:blipFill>
+        <p:spPr bwMode="auto">
+          <a:xfrm>
+            <a:off x="3446428" y="1259214"/>
+            <a:ext cx="5637813" cy="4461225"/>
+          </a:xfrm>
+          <a:prstGeom prst="rect">
+            <a:avLst/>
+          </a:prstGeom>
+          <a:noFill/>
+          <a:extLst>
+            <a:ext uri="{909E8E84-426E-40DD-AFC4-6F175D3DCCD1}">
+              <a14:hiddenFill xmlns:a14="http://schemas.microsoft.com/office/drawing/2010/main">
+                <a:solidFill>
+                  <a:srgbClr val="FFFFFF"/>
+                </a:solidFill>
+              </a14:hiddenFill>
+            </a:ext>
+          </a:extLst>
+        </p:spPr>
+      </p:pic>
+    </p:spTree>
+    <p:extLst>
+      <p:ext uri="{BB962C8B-B14F-4D97-AF65-F5344CB8AC3E}">
+        <p14:creationId xmlns:p14="http://schemas.microsoft.com/office/powerpoint/2010/main" val="2178049178"/>
+      </p:ext>
+    </p:extLst>
+  </p:cSld>
+  <p:clrMapOvr>
+    <a:masterClrMapping/>
+  </p:clrMapOvr>
+</p:sld>
+</file>
+
+<file path=ppt/slides/slide19.xml><?xml version="1.0" encoding="utf-8"?>
+<p:sld xmlns:a="http://schemas.openxmlformats.org/drawingml/2006/main" xmlns:r="http://schemas.openxmlformats.org/officeDocument/2006/relationships" xmlns:p="http://schemas.openxmlformats.org/presentationml/2006/main">
+  <p:cSld>
+    <p:spTree>
+      <p:nvGrpSpPr>
+        <p:cNvPr id="1" name=""/>
+        <p:cNvGrpSpPr/>
+        <p:nvPr/>
+      </p:nvGrpSpPr>
+      <p:grpSpPr>
+        <a:xfrm>
+          <a:off x="0" y="0"/>
+          <a:ext cx="0" cy="0"/>
+          <a:chOff x="0" y="0"/>
+          <a:chExt cx="0" cy="0"/>
+        </a:xfrm>
+      </p:grpSpPr>
+      <p:sp>
+        <p:nvSpPr>
+          <p:cNvPr id="2" name="Title 1">
+            <a:extLst>
+              <a:ext uri="{FF2B5EF4-FFF2-40B4-BE49-F238E27FC236}">
+                <a16:creationId xmlns:a16="http://schemas.microsoft.com/office/drawing/2014/main" id="{FD5F5B2C-D6F2-BF7E-E8D7-813995702D15}"/>
+              </a:ext>
+            </a:extLst>
+          </p:cNvPr>
+          <p:cNvSpPr>
+            <a:spLocks noGrp="1"/>
+          </p:cNvSpPr>
+          <p:nvPr>
+            <p:ph type="title"/>
+          </p:nvPr>
+        </p:nvSpPr>
+        <p:spPr/>
+        <p:txBody>
+          <a:bodyPr/>
+          <a:lstStyle/>
+          <a:p>
+            <a:r>
+              <a:rPr lang="en-DE" sz="2000" dirty="0"/>
+              <a:t>Refine Best Fit-Short Range in Nhts17-modelling between 10~1000km</a:t>
+            </a:r>
+          </a:p>
+        </p:txBody>
+      </p:sp>
+      <p:sp>
+        <p:nvSpPr>
+          <p:cNvPr id="3" name="Content Placeholder 2">
+            <a:extLst>
+              <a:ext uri="{FF2B5EF4-FFF2-40B4-BE49-F238E27FC236}">
+                <a16:creationId xmlns:a16="http://schemas.microsoft.com/office/drawing/2014/main" id="{7E6EDD97-98F3-F2B7-2E47-B6E3553CF328}"/>
+              </a:ext>
+            </a:extLst>
+          </p:cNvPr>
+          <p:cNvSpPr>
+            <a:spLocks noGrp="1"/>
+          </p:cNvSpPr>
+          <p:nvPr>
+            <p:ph idx="1"/>
+          </p:nvPr>
+        </p:nvSpPr>
+        <p:spPr>
+          <a:xfrm>
+            <a:off x="533401" y="914399"/>
+            <a:ext cx="3719286" cy="5441953"/>
+          </a:xfrm>
+        </p:spPr>
+        <p:txBody>
+          <a:bodyPr>
+            <a:normAutofit lnSpcReduction="10000"/>
+          </a:bodyPr>
+          <a:lstStyle/>
+          <a:p>
+            <a:r>
+              <a:rPr lang="en-DE" sz="1400" dirty="0"/>
+              <a:t>Auto Driver in Nhts17 </a:t>
+            </a:r>
+          </a:p>
+          <a:p>
+            <a:pPr lvl="1"/>
+            <a:r>
+              <a:rPr lang="en-GB" sz="1200" dirty="0"/>
+              <a:t>D</a:t>
+            </a:r>
+            <a:r>
+              <a:rPr lang="en-DE" sz="1200" dirty="0"/>
+              <a:t>atasize=10223</a:t>
+            </a:r>
+          </a:p>
+          <a:p>
+            <a:endParaRPr lang="en-DE" sz="1600" dirty="0"/>
+          </a:p>
+          <a:p>
+            <a:endParaRPr lang="en-DE" sz="1600" dirty="0"/>
+          </a:p>
+          <a:p>
+            <a:endParaRPr lang="en-DE" sz="1600" dirty="0"/>
+          </a:p>
+          <a:p>
+            <a:endParaRPr lang="en-DE" sz="1600" dirty="0"/>
+          </a:p>
+          <a:p>
+            <a:endParaRPr lang="en-DE" sz="1600" dirty="0"/>
+          </a:p>
+          <a:p>
+            <a:endParaRPr lang="en-DE" sz="1600" dirty="0"/>
+          </a:p>
+          <a:p>
+            <a:endParaRPr lang="en-DE" sz="1400" dirty="0"/>
+          </a:p>
+          <a:p>
+            <a:endParaRPr lang="en-DE" sz="1400" dirty="0"/>
+          </a:p>
+          <a:p>
+            <a:r>
+              <a:rPr lang="en-DE" sz="1400" dirty="0"/>
+              <a:t>Best fit error:</a:t>
+            </a:r>
+          </a:p>
+          <a:p>
+            <a:pPr lvl="1"/>
+            <a:r>
+              <a:rPr lang="en-DE" sz="1200" dirty="0"/>
+              <a:t>2.5846170337106087</a:t>
+            </a:r>
+          </a:p>
+          <a:p>
+            <a:r>
+              <a:rPr lang="en-DE" sz="1400" dirty="0"/>
+              <a:t>Worst fit error</a:t>
+            </a:r>
+          </a:p>
+          <a:p>
+            <a:pPr lvl="1"/>
+            <a:r>
+              <a:rPr lang="en-DE" sz="1200" dirty="0"/>
+              <a:t>8.766310430297988</a:t>
+            </a:r>
+          </a:p>
+          <a:p>
+            <a:pPr lvl="1"/>
+            <a:endParaRPr lang="en-DE" sz="1200" dirty="0"/>
+          </a:p>
+          <a:p>
+            <a:r>
+              <a:rPr lang="en-GB" sz="1200" dirty="0" err="1"/>
+              <a:t>eps_range</a:t>
+            </a:r>
+            <a:r>
+              <a:rPr lang="en-GB" sz="1200" dirty="0"/>
+              <a:t>=</a:t>
+            </a:r>
+            <a:r>
+              <a:rPr lang="en-GB" sz="1200" dirty="0" err="1"/>
+              <a:t>np.arange</a:t>
+            </a:r>
+            <a:r>
+              <a:rPr lang="en-GB" sz="1200" dirty="0"/>
+              <a:t>(0.85,0.95,0.01)</a:t>
+            </a:r>
+          </a:p>
+          <a:p>
+            <a:r>
+              <a:rPr lang="en-GB" sz="1200" dirty="0" err="1"/>
+              <a:t>p_range</a:t>
+            </a:r>
+            <a:r>
+              <a:rPr lang="en-GB" sz="1200" dirty="0"/>
+              <a:t>=</a:t>
+            </a:r>
+            <a:r>
+              <a:rPr lang="en-GB" sz="1200" dirty="0" err="1"/>
+              <a:t>np.arange</a:t>
+            </a:r>
+            <a:r>
+              <a:rPr lang="en-GB" sz="1200" dirty="0"/>
+              <a:t>(0.35, 0.45, 0.01)</a:t>
+            </a:r>
+          </a:p>
+          <a:p>
+            <a:r>
+              <a:rPr lang="en-GB" sz="1200" dirty="0" err="1"/>
+              <a:t>alp_range</a:t>
+            </a:r>
+            <a:r>
+              <a:rPr lang="en-GB" sz="1200" dirty="0"/>
+              <a:t>=</a:t>
+            </a:r>
+            <a:r>
+              <a:rPr lang="en-GB" sz="1200" dirty="0" err="1"/>
+              <a:t>np.arange</a:t>
+            </a:r>
+            <a:r>
+              <a:rPr lang="en-GB" sz="1200" dirty="0"/>
+              <a:t>(2.4, 2.7,0.05)</a:t>
+            </a:r>
+          </a:p>
+          <a:p>
+            <a:r>
+              <a:rPr lang="en-GB" sz="1200" dirty="0"/>
+              <a:t>Error: Wasserstein distance (the earth mover’s distance,)</a:t>
+            </a:r>
+          </a:p>
+          <a:p>
+            <a:r>
+              <a:rPr lang="en-GB" sz="1200" dirty="0"/>
+              <a:t>Largest distance=1000 and shortest&gt;=10</a:t>
+            </a:r>
+          </a:p>
+          <a:p>
+            <a:r>
+              <a:rPr lang="en-DE" sz="1400" dirty="0"/>
+              <a:t># Samples:</a:t>
+            </a:r>
+          </a:p>
+          <a:p>
+            <a:pPr lvl="1"/>
+            <a:r>
+              <a:rPr lang="en-GB" sz="1200" dirty="0"/>
+              <a:t>M</a:t>
+            </a:r>
+            <a:r>
+              <a:rPr lang="en-DE" sz="1200" dirty="0"/>
+              <a:t>odelling(10000), Visualization(10000)</a:t>
+            </a:r>
+          </a:p>
+          <a:p>
+            <a:pPr marL="0" indent="0">
+              <a:buNone/>
+            </a:pPr>
+            <a:endParaRPr lang="en-DE" sz="1600" dirty="0"/>
+          </a:p>
+        </p:txBody>
+      </p:sp>
+      <p:sp>
+        <p:nvSpPr>
+          <p:cNvPr id="4" name="Slide Number Placeholder 3">
+            <a:extLst>
+              <a:ext uri="{FF2B5EF4-FFF2-40B4-BE49-F238E27FC236}">
+                <a16:creationId xmlns:a16="http://schemas.microsoft.com/office/drawing/2014/main" id="{A28BE308-F095-782F-B448-59B534A262BE}"/>
+              </a:ext>
+            </a:extLst>
+          </p:cNvPr>
+          <p:cNvSpPr>
+            <a:spLocks noGrp="1"/>
+          </p:cNvSpPr>
+          <p:nvPr>
+            <p:ph type="sldNum" sz="quarter" idx="10"/>
+          </p:nvPr>
+        </p:nvSpPr>
+        <p:spPr/>
+        <p:txBody>
+          <a:bodyPr/>
+          <a:lstStyle/>
+          <a:p>
+            <a:pPr>
+              <a:defRPr/>
+            </a:pPr>
+            <a:fld id="{13FD7AA2-DC10-7C40-BE93-1CFAEDE49800}" type="slidenum">
+              <a:rPr lang="en-US" altLang="de-DE" smtClean="0"/>
+              <a:pPr>
+                <a:defRPr/>
+              </a:pPr>
+              <a:t>19</a:t>
+            </a:fld>
+            <a:endParaRPr lang="en-US" altLang="de-DE"/>
+          </a:p>
+        </p:txBody>
+      </p:sp>
+      <p:graphicFrame>
+        <p:nvGraphicFramePr>
+          <p:cNvPr id="5" name="Table 5">
+            <a:extLst>
+              <a:ext uri="{FF2B5EF4-FFF2-40B4-BE49-F238E27FC236}">
+                <a16:creationId xmlns:a16="http://schemas.microsoft.com/office/drawing/2014/main" id="{DA0984B5-5203-3327-58A7-79289C37D231}"/>
+              </a:ext>
+            </a:extLst>
+          </p:cNvPr>
+          <p:cNvGraphicFramePr>
+            <a:graphicFrameLocks noGrp="1"/>
+          </p:cNvGraphicFramePr>
+          <p:nvPr>
+            <p:extLst>
+              <p:ext uri="{D42A27DB-BD31-4B8C-83A1-F6EECF244321}">
+                <p14:modId xmlns:p14="http://schemas.microsoft.com/office/powerpoint/2010/main" val="2745655228"/>
+              </p:ext>
+            </p:extLst>
+          </p:nvPr>
+        </p:nvGraphicFramePr>
+        <p:xfrm>
+          <a:off x="609601" y="1334361"/>
+          <a:ext cx="2760628" cy="2092776"/>
+        </p:xfrm>
+        <a:graphic>
+          <a:graphicData uri="http://schemas.openxmlformats.org/drawingml/2006/table">
+            <a:tbl>
+              <a:tblPr firstRow="1" bandRow="1">
+                <a:tableStyleId>{21E4AEA4-8DFA-4A89-87EB-49C32662AFE0}</a:tableStyleId>
+              </a:tblPr>
+              <a:tblGrid>
+                <a:gridCol w="690157">
+                  <a:extLst>
+                    <a:ext uri="{9D8B030D-6E8A-4147-A177-3AD203B41FA5}">
+                      <a16:colId xmlns:a16="http://schemas.microsoft.com/office/drawing/2014/main" val="2015579830"/>
+                    </a:ext>
+                  </a:extLst>
+                </a:gridCol>
+                <a:gridCol w="690157">
+                  <a:extLst>
+                    <a:ext uri="{9D8B030D-6E8A-4147-A177-3AD203B41FA5}">
+                      <a16:colId xmlns:a16="http://schemas.microsoft.com/office/drawing/2014/main" val="831545333"/>
+                    </a:ext>
+                  </a:extLst>
+                </a:gridCol>
+                <a:gridCol w="690157">
+                  <a:extLst>
+                    <a:ext uri="{9D8B030D-6E8A-4147-A177-3AD203B41FA5}">
+                      <a16:colId xmlns:a16="http://schemas.microsoft.com/office/drawing/2014/main" val="3982934071"/>
+                    </a:ext>
+                  </a:extLst>
+                </a:gridCol>
+                <a:gridCol w="690157">
+                  <a:extLst>
+                    <a:ext uri="{9D8B030D-6E8A-4147-A177-3AD203B41FA5}">
+                      <a16:colId xmlns:a16="http://schemas.microsoft.com/office/drawing/2014/main" val="2370268705"/>
+                    </a:ext>
+                  </a:extLst>
+                </a:gridCol>
+              </a:tblGrid>
+              <a:tr h="0">
+                <a:tc>
+                  <a:txBody>
+                    <a:bodyPr/>
+                    <a:lstStyle/>
+                    <a:p>
+                      <a:endParaRPr lang="en-DE" sz="1700" b="0" dirty="0">
+                        <a:solidFill>
+                          <a:schemeClr val="tx1"/>
+                        </a:solidFill>
+                        <a:latin typeface="Times New Roman" panose="02020603050405020304" pitchFamily="18" charset="0"/>
+                        <a:cs typeface="Times New Roman" panose="02020603050405020304" pitchFamily="18" charset="0"/>
+                      </a:endParaRPr>
+                    </a:p>
+                  </a:txBody>
+                  <a:tcPr marL="85045" marR="85045" marT="42522" marB="42522"/>
+                </a:tc>
+                <a:tc>
+                  <a:txBody>
+                    <a:bodyPr/>
+                    <a:lstStyle/>
+                    <a:p>
+                      <a:r>
+                        <a:rPr lang="en-DE" sz="1700" b="0" dirty="0">
+                          <a:solidFill>
+                            <a:schemeClr val="tx1"/>
+                          </a:solidFill>
+                          <a:latin typeface="Times New Roman" panose="02020603050405020304" pitchFamily="18" charset="0"/>
+                          <a:cs typeface="Times New Roman" panose="02020603050405020304" pitchFamily="18" charset="0"/>
+                        </a:rPr>
+                        <a:t>eps</a:t>
+                      </a:r>
+                    </a:p>
+                  </a:txBody>
+                  <a:tcPr marL="85045" marR="85045" marT="42522" marB="42522"/>
+                </a:tc>
+                <a:tc>
+                  <a:txBody>
+                    <a:bodyPr/>
+                    <a:lstStyle/>
+                    <a:p>
+                      <a:r>
+                        <a:rPr lang="en-DE" sz="1700" b="0" dirty="0">
+                          <a:solidFill>
+                            <a:schemeClr val="tx1"/>
+                          </a:solidFill>
+                          <a:latin typeface="Times New Roman" panose="02020603050405020304" pitchFamily="18" charset="0"/>
+                          <a:cs typeface="Times New Roman" panose="02020603050405020304" pitchFamily="18" charset="0"/>
+                        </a:rPr>
+                        <a:t>p</a:t>
+                      </a:r>
+                    </a:p>
+                  </a:txBody>
+                  <a:tcPr marL="85045" marR="85045" marT="42522" marB="42522"/>
+                </a:tc>
+                <a:tc>
+                  <a:txBody>
+                    <a:bodyPr/>
+                    <a:lstStyle/>
+                    <a:p>
+                      <a:r>
+                        <a:rPr lang="en-DE" sz="1700" b="0" dirty="0">
+                          <a:solidFill>
+                            <a:schemeClr val="tx1"/>
+                          </a:solidFill>
+                          <a:latin typeface="Times New Roman" panose="02020603050405020304" pitchFamily="18" charset="0"/>
+                          <a:cs typeface="Times New Roman" panose="02020603050405020304" pitchFamily="18" charset="0"/>
+                        </a:rPr>
+                        <a:t>alpha</a:t>
+                      </a:r>
+                    </a:p>
+                  </a:txBody>
+                  <a:tcPr marL="85045" marR="85045" marT="42522" marB="42522"/>
+                </a:tc>
+                <a:extLst>
+                  <a:ext uri="{0D108BD9-81ED-4DB2-BD59-A6C34878D82A}">
+                    <a16:rowId xmlns:a16="http://schemas.microsoft.com/office/drawing/2014/main" val="2603681906"/>
+                  </a:ext>
+                </a:extLst>
+              </a:tr>
+              <a:tr h="0">
+                <a:tc>
+                  <a:txBody>
+                    <a:bodyPr/>
+                    <a:lstStyle/>
+                    <a:p>
+                      <a:pPr marL="0" marR="0" lvl="0" indent="0" algn="l" defTabSz="685800" rtl="0" eaLnBrk="1" fontAlgn="auto" latinLnBrk="0" hangingPunct="1">
+                        <a:lnSpc>
+                          <a:spcPct val="100000"/>
+                        </a:lnSpc>
+                        <a:spcBef>
+                          <a:spcPts val="0"/>
+                        </a:spcBef>
+                        <a:spcAft>
+                          <a:spcPts val="0"/>
+                        </a:spcAft>
+                        <a:buClrTx/>
+                        <a:buSzTx/>
+                        <a:buFontTx/>
+                        <a:buNone/>
+                        <a:tabLst/>
+                        <a:defRPr/>
+                      </a:pPr>
+                      <a:r>
+                        <a:rPr lang="en-DE" sz="1500" dirty="0">
+                          <a:latin typeface="Times New Roman" panose="02020603050405020304" pitchFamily="18" charset="0"/>
+                          <a:cs typeface="Times New Roman" panose="02020603050405020304" pitchFamily="18" charset="0"/>
+                        </a:rPr>
+                        <a:t>Hand picked</a:t>
+                      </a:r>
+                      <a:endParaRPr lang="en-DE" sz="1700" dirty="0">
+                        <a:latin typeface="Times New Roman" panose="02020603050405020304" pitchFamily="18" charset="0"/>
+                        <a:cs typeface="Times New Roman" panose="02020603050405020304" pitchFamily="18" charset="0"/>
+                      </a:endParaRPr>
+                    </a:p>
+                  </a:txBody>
+                  <a:tcPr marL="85045" marR="85045" marT="42522" marB="42522"/>
+                </a:tc>
+                <a:tc>
+                  <a:txBody>
+                    <a:bodyPr/>
+                    <a:lstStyle/>
+                    <a:p>
+                      <a:r>
+                        <a:rPr lang="en-DE" sz="1700" b="0" dirty="0">
+                          <a:solidFill>
+                            <a:schemeClr val="tx1"/>
+                          </a:solidFill>
+                          <a:latin typeface="Times New Roman" panose="02020603050405020304" pitchFamily="18" charset="0"/>
+                          <a:cs typeface="Times New Roman" panose="02020603050405020304" pitchFamily="18" charset="0"/>
+                        </a:rPr>
+                        <a:t>2</a:t>
+                      </a:r>
+                    </a:p>
+                  </a:txBody>
+                  <a:tcPr marL="85045" marR="85045" marT="42522" marB="42522"/>
+                </a:tc>
+                <a:tc>
+                  <a:txBody>
+                    <a:bodyPr/>
+                    <a:lstStyle/>
+                    <a:p>
+                      <a:r>
+                        <a:rPr lang="en-DE" sz="1700" b="0" dirty="0">
+                          <a:solidFill>
+                            <a:schemeClr val="tx1"/>
+                          </a:solidFill>
+                          <a:latin typeface="Times New Roman" panose="02020603050405020304" pitchFamily="18" charset="0"/>
+                          <a:cs typeface="Times New Roman" panose="02020603050405020304" pitchFamily="18" charset="0"/>
+                        </a:rPr>
+                        <a:t>0.7</a:t>
+                      </a:r>
+                    </a:p>
+                  </a:txBody>
+                  <a:tcPr marL="85045" marR="85045" marT="42522" marB="42522"/>
+                </a:tc>
+                <a:tc>
+                  <a:txBody>
+                    <a:bodyPr/>
+                    <a:lstStyle/>
+                    <a:p>
+                      <a:r>
+                        <a:rPr lang="en-DE" sz="1700" b="0" dirty="0">
+                          <a:solidFill>
+                            <a:schemeClr val="tx1"/>
+                          </a:solidFill>
+                          <a:latin typeface="Times New Roman" panose="02020603050405020304" pitchFamily="18" charset="0"/>
+                          <a:cs typeface="Times New Roman" panose="02020603050405020304" pitchFamily="18" charset="0"/>
+                        </a:rPr>
+                        <a:t>1.1</a:t>
+                      </a:r>
+                    </a:p>
+                  </a:txBody>
+                  <a:tcPr marL="85045" marR="85045" marT="42522" marB="42522"/>
+                </a:tc>
+                <a:extLst>
+                  <a:ext uri="{0D108BD9-81ED-4DB2-BD59-A6C34878D82A}">
+                    <a16:rowId xmlns:a16="http://schemas.microsoft.com/office/drawing/2014/main" val="1143183472"/>
+                  </a:ext>
+                </a:extLst>
+              </a:tr>
+              <a:tr h="0">
+                <a:tc>
+                  <a:txBody>
+                    <a:bodyPr/>
+                    <a:lstStyle/>
+                    <a:p>
+                      <a:r>
+                        <a:rPr lang="en-GB" sz="1700" b="0" dirty="0">
+                          <a:solidFill>
+                            <a:schemeClr val="tx1"/>
+                          </a:solidFill>
+                          <a:latin typeface="Times New Roman" panose="02020603050405020304" pitchFamily="18" charset="0"/>
+                          <a:cs typeface="Times New Roman" panose="02020603050405020304" pitchFamily="18" charset="0"/>
+                        </a:rPr>
+                        <a:t>B</a:t>
+                      </a:r>
+                      <a:r>
+                        <a:rPr lang="en-DE" sz="1700" b="0" dirty="0">
+                          <a:solidFill>
+                            <a:schemeClr val="tx1"/>
+                          </a:solidFill>
+                          <a:latin typeface="Times New Roman" panose="02020603050405020304" pitchFamily="18" charset="0"/>
+                          <a:cs typeface="Times New Roman" panose="02020603050405020304" pitchFamily="18" charset="0"/>
+                        </a:rPr>
+                        <a:t>est fit</a:t>
+                      </a:r>
+                    </a:p>
+                  </a:txBody>
+                  <a:tcPr marL="85045" marR="85045" marT="42522" marB="42522"/>
+                </a:tc>
+                <a:tc>
+                  <a:txBody>
+                    <a:bodyPr/>
+                    <a:lstStyle/>
+                    <a:p>
+                      <a:r>
+                        <a:rPr lang="en-DE" sz="1700" b="0" dirty="0">
+                          <a:solidFill>
+                            <a:schemeClr val="tx1"/>
+                          </a:solidFill>
+                          <a:latin typeface="Times New Roman" panose="02020603050405020304" pitchFamily="18" charset="0"/>
+                          <a:cs typeface="Times New Roman" panose="02020603050405020304" pitchFamily="18" charset="0"/>
+                        </a:rPr>
+                        <a:t>0.85</a:t>
+                      </a:r>
+                    </a:p>
+                  </a:txBody>
+                  <a:tcPr marL="85045" marR="85045" marT="42522" marB="42522"/>
+                </a:tc>
+                <a:tc>
+                  <a:txBody>
+                    <a:bodyPr/>
+                    <a:lstStyle/>
+                    <a:p>
+                      <a:r>
+                        <a:rPr lang="en-DE" sz="1700" b="0" dirty="0">
+                          <a:solidFill>
+                            <a:schemeClr val="tx1"/>
+                          </a:solidFill>
+                          <a:latin typeface="Times New Roman" panose="02020603050405020304" pitchFamily="18" charset="0"/>
+                          <a:cs typeface="Times New Roman" panose="02020603050405020304" pitchFamily="18" charset="0"/>
+                        </a:rPr>
+                        <a:t>0.4</a:t>
+                      </a:r>
+                    </a:p>
+                  </a:txBody>
+                  <a:tcPr marL="85045" marR="85045" marT="42522" marB="42522"/>
+                </a:tc>
+                <a:tc>
+                  <a:txBody>
+                    <a:bodyPr/>
+                    <a:lstStyle/>
+                    <a:p>
+                      <a:r>
+                        <a:rPr lang="en-DE" sz="1700" b="0" dirty="0">
+                          <a:solidFill>
+                            <a:schemeClr val="tx1"/>
+                          </a:solidFill>
+                          <a:latin typeface="Times New Roman" panose="02020603050405020304" pitchFamily="18" charset="0"/>
+                          <a:cs typeface="Times New Roman" panose="02020603050405020304" pitchFamily="18" charset="0"/>
+                        </a:rPr>
+                        <a:t>2.45</a:t>
+                      </a:r>
+                    </a:p>
+                  </a:txBody>
+                  <a:tcPr marL="85045" marR="85045" marT="42522" marB="42522"/>
+                </a:tc>
+                <a:extLst>
+                  <a:ext uri="{0D108BD9-81ED-4DB2-BD59-A6C34878D82A}">
+                    <a16:rowId xmlns:a16="http://schemas.microsoft.com/office/drawing/2014/main" val="3031271706"/>
+                  </a:ext>
+                </a:extLst>
+              </a:tr>
+              <a:tr h="0">
+                <a:tc>
+                  <a:txBody>
+                    <a:bodyPr/>
+                    <a:lstStyle/>
+                    <a:p>
+                      <a:r>
+                        <a:rPr lang="en-DE" sz="1700" b="0" dirty="0">
+                          <a:solidFill>
+                            <a:schemeClr val="tx1"/>
+                          </a:solidFill>
+                          <a:latin typeface="Times New Roman" panose="02020603050405020304" pitchFamily="18" charset="0"/>
+                          <a:cs typeface="Times New Roman" panose="02020603050405020304" pitchFamily="18" charset="0"/>
+                        </a:rPr>
+                        <a:t>Worst fit</a:t>
+                      </a:r>
+                    </a:p>
+                  </a:txBody>
+                  <a:tcPr marL="85045" marR="85045" marT="42522" marB="42522"/>
+                </a:tc>
+                <a:tc>
+                  <a:txBody>
+                    <a:bodyPr/>
+                    <a:lstStyle/>
+                    <a:p>
+                      <a:r>
+                        <a:rPr lang="en-DE" sz="1700" b="0" dirty="0">
+                          <a:solidFill>
+                            <a:schemeClr val="tx1"/>
+                          </a:solidFill>
+                          <a:latin typeface="Times New Roman" panose="02020603050405020304" pitchFamily="18" charset="0"/>
+                          <a:cs typeface="Times New Roman" panose="02020603050405020304" pitchFamily="18" charset="0"/>
+                        </a:rPr>
+                        <a:t>0.86</a:t>
+                      </a:r>
+                    </a:p>
+                  </a:txBody>
+                  <a:tcPr marL="85045" marR="85045" marT="42522" marB="42522"/>
+                </a:tc>
+                <a:tc>
+                  <a:txBody>
+                    <a:bodyPr/>
+                    <a:lstStyle/>
+                    <a:p>
+                      <a:r>
+                        <a:rPr lang="en-DE" sz="1700" b="0" dirty="0">
+                          <a:solidFill>
+                            <a:schemeClr val="tx1"/>
+                          </a:solidFill>
+                          <a:latin typeface="Times New Roman" panose="02020603050405020304" pitchFamily="18" charset="0"/>
+                          <a:cs typeface="Times New Roman" panose="02020603050405020304" pitchFamily="18" charset="0"/>
+                        </a:rPr>
+                        <a:t>0.35</a:t>
+                      </a:r>
+                    </a:p>
+                  </a:txBody>
+                  <a:tcPr marL="85045" marR="85045" marT="42522" marB="42522"/>
+                </a:tc>
+                <a:tc>
+                  <a:txBody>
+                    <a:bodyPr/>
+                    <a:lstStyle/>
+                    <a:p>
+                      <a:r>
+                        <a:rPr lang="en-DE" sz="1700" b="0" dirty="0">
+                          <a:solidFill>
+                            <a:schemeClr val="tx1"/>
+                          </a:solidFill>
+                          <a:latin typeface="Times New Roman" panose="02020603050405020304" pitchFamily="18" charset="0"/>
+                          <a:cs typeface="Times New Roman" panose="02020603050405020304" pitchFamily="18" charset="0"/>
+                        </a:rPr>
+                        <a:t>2.7</a:t>
+                      </a:r>
+                    </a:p>
+                  </a:txBody>
+                  <a:tcPr marL="85045" marR="85045" marT="42522" marB="42522"/>
+                </a:tc>
+                <a:extLst>
+                  <a:ext uri="{0D108BD9-81ED-4DB2-BD59-A6C34878D82A}">
+                    <a16:rowId xmlns:a16="http://schemas.microsoft.com/office/drawing/2014/main" val="612192117"/>
+                  </a:ext>
+                </a:extLst>
+              </a:tr>
+            </a:tbl>
+          </a:graphicData>
+        </a:graphic>
+      </p:graphicFrame>
+      <p:pic>
+        <p:nvPicPr>
+          <p:cNvPr id="6" name="Picture 2">
+            <a:extLst>
+              <a:ext uri="{FF2B5EF4-FFF2-40B4-BE49-F238E27FC236}">
+                <a16:creationId xmlns:a16="http://schemas.microsoft.com/office/drawing/2014/main" id="{112BDAEE-C155-C4A2-3095-E0C404B2CB40}"/>
+              </a:ext>
+            </a:extLst>
+          </p:cNvPr>
+          <p:cNvPicPr>
+            <a:picLocks noChangeAspect="1" noChangeArrowheads="1"/>
+          </p:cNvPicPr>
+          <p:nvPr/>
+        </p:nvPicPr>
+        <p:blipFill>
+          <a:blip r:embed="rId2">
+            <a:extLst>
+              <a:ext uri="{28A0092B-C50C-407E-A947-70E740481C1C}">
+                <a14:useLocalDpi xmlns:a14="http://schemas.microsoft.com/office/drawing/2010/main" val="0"/>
+              </a:ext>
+            </a:extLst>
+          </a:blip>
+          <a:srcRect/>
+          <a:stretch/>
+        </p:blipFill>
+        <p:spPr bwMode="auto">
+          <a:xfrm>
+            <a:off x="3446429" y="1259214"/>
+            <a:ext cx="5637811" cy="4461225"/>
+          </a:xfrm>
+          <a:prstGeom prst="rect">
+            <a:avLst/>
+          </a:prstGeom>
+          <a:noFill/>
+          <a:extLst>
+            <a:ext uri="{909E8E84-426E-40DD-AFC4-6F175D3DCCD1}">
+              <a14:hiddenFill xmlns:a14="http://schemas.microsoft.com/office/drawing/2010/main">
+                <a:solidFill>
+                  <a:srgbClr val="FFFFFF"/>
+                </a:solidFill>
+              </a14:hiddenFill>
+            </a:ext>
+          </a:extLst>
+        </p:spPr>
+      </p:pic>
+    </p:spTree>
+    <p:extLst>
+      <p:ext uri="{BB962C8B-B14F-4D97-AF65-F5344CB8AC3E}">
+        <p14:creationId xmlns:p14="http://schemas.microsoft.com/office/powerpoint/2010/main" val="3587463286"/>
+      </p:ext>
+    </p:extLst>
+  </p:cSld>
+  <p:clrMapOvr>
+    <a:masterClrMapping/>
+  </p:clrMapOvr>
+</p:sld>
+</file>
+
+<file path=ppt/slides/slide2.xml><?xml version="1.0" encoding="utf-8"?>
+<p:sld xmlns:a="http://schemas.openxmlformats.org/drawingml/2006/main" xmlns:r="http://schemas.openxmlformats.org/officeDocument/2006/relationships" xmlns:p="http://schemas.openxmlformats.org/presentationml/2006/main">
+  <p:cSld>
+    <p:spTree>
+      <p:nvGrpSpPr>
+        <p:cNvPr id="1" name=""/>
+        <p:cNvGrpSpPr/>
+        <p:nvPr/>
+      </p:nvGrpSpPr>
+      <p:grpSpPr>
+        <a:xfrm>
+          <a:off x="0" y="0"/>
+          <a:ext cx="0" cy="0"/>
+          <a:chOff x="0" y="0"/>
+          <a:chExt cx="0" cy="0"/>
+        </a:xfrm>
+      </p:grpSpPr>
+      <p:sp>
+        <p:nvSpPr>
+          <p:cNvPr id="2" name="Titel 1">
+            <a:extLst>
+              <a:ext uri="{FF2B5EF4-FFF2-40B4-BE49-F238E27FC236}">
+                <a16:creationId xmlns:a16="http://schemas.microsoft.com/office/drawing/2014/main" id="{FCB9D8D8-FAA2-4ACE-AD06-4672C9C5906B}"/>
+              </a:ext>
+            </a:extLst>
+          </p:cNvPr>
+          <p:cNvSpPr>
+            <a:spLocks noGrp="1"/>
+          </p:cNvSpPr>
+          <p:nvPr>
+            <p:ph type="title"/>
+          </p:nvPr>
+        </p:nvSpPr>
+        <p:spPr/>
+        <p:txBody>
+          <a:bodyPr/>
+          <a:lstStyle/>
+          <a:p>
+            <a:r>
+              <a:rPr lang="en-US" dirty="0"/>
+              <a:t>Dataset</a:t>
+            </a:r>
+            <a:endParaRPr lang="de-DE" dirty="0"/>
+          </a:p>
+        </p:txBody>
+      </p:sp>
+      <p:sp>
+        <p:nvSpPr>
+          <p:cNvPr id="3" name="Inhaltsplatzhalter 2">
+            <a:extLst>
+              <a:ext uri="{FF2B5EF4-FFF2-40B4-BE49-F238E27FC236}">
+                <a16:creationId xmlns:a16="http://schemas.microsoft.com/office/drawing/2014/main" id="{770E7CB4-F677-4F6C-94DF-C086DCE13A22}"/>
+              </a:ext>
+            </a:extLst>
+          </p:cNvPr>
+          <p:cNvSpPr>
+            <a:spLocks noGrp="1"/>
+          </p:cNvSpPr>
+          <p:nvPr>
+            <p:ph idx="1"/>
+          </p:nvPr>
+        </p:nvSpPr>
+        <p:spPr/>
+        <p:txBody>
+          <a:bodyPr/>
+          <a:lstStyle/>
+          <a:p>
+            <a:pPr algn="l"/>
+            <a:r>
+              <a:rPr lang="en-GB" b="1" i="0" dirty="0" err="1">
+                <a:solidFill>
+                  <a:srgbClr val="000000"/>
+                </a:solidFill>
+                <a:effectLst/>
+                <a:latin typeface="Helvetica Neue" panose="02000503000000020004" pitchFamily="2" charset="0"/>
+              </a:rPr>
+              <a:t>MiD</a:t>
+            </a:r>
+            <a:r>
+              <a:rPr lang="en-GB" b="1" i="0" dirty="0">
+                <a:solidFill>
+                  <a:srgbClr val="000000"/>
+                </a:solidFill>
+                <a:effectLst/>
+                <a:latin typeface="Helvetica Neue" panose="02000503000000020004" pitchFamily="2" charset="0"/>
+              </a:rPr>
+              <a:t> 2017 </a:t>
+            </a:r>
+            <a:r>
+              <a:rPr lang="en-GB" b="1" i="0" u="none" strike="noStrike" dirty="0">
+                <a:solidFill>
+                  <a:srgbClr val="296EAA"/>
+                </a:solidFill>
+                <a:effectLst/>
+                <a:latin typeface="Helvetica Neue" panose="02000503000000020004" pitchFamily="2" charset="0"/>
+                <a:hlinkClick r:id="rId2"/>
+              </a:rPr>
+              <a:t>¶</a:t>
+            </a:r>
+            <a:endParaRPr lang="en-GB" b="1" u="none" strike="noStrike" dirty="0">
+              <a:solidFill>
+                <a:srgbClr val="000000"/>
+              </a:solidFill>
+              <a:latin typeface="Helvetica Neue" panose="02000503000000020004" pitchFamily="2" charset="0"/>
+            </a:endParaRPr>
+          </a:p>
+          <a:p>
+            <a:pPr lvl="1"/>
+            <a:r>
+              <a:rPr lang="en-GB" dirty="0" err="1">
+                <a:solidFill>
+                  <a:srgbClr val="000000"/>
+                </a:solidFill>
+                <a:latin typeface="Helvetica Neue" panose="02000503000000020004" pitchFamily="2" charset="0"/>
+              </a:rPr>
+              <a:t>M</a:t>
+            </a:r>
+            <a:r>
+              <a:rPr lang="en-GB" b="0" i="0" dirty="0" err="1">
+                <a:solidFill>
+                  <a:srgbClr val="000000"/>
+                </a:solidFill>
+                <a:effectLst/>
+                <a:latin typeface="Helvetica Neue" panose="02000503000000020004" pitchFamily="2" charset="0"/>
+              </a:rPr>
+              <a:t>obilität</a:t>
+            </a:r>
+            <a:r>
+              <a:rPr lang="en-GB" b="0" i="0" dirty="0">
+                <a:solidFill>
+                  <a:srgbClr val="000000"/>
+                </a:solidFill>
+                <a:effectLst/>
+                <a:latin typeface="Helvetica Neue" panose="02000503000000020004" pitchFamily="2" charset="0"/>
+              </a:rPr>
+              <a:t> in Deutschland</a:t>
+            </a:r>
+          </a:p>
+          <a:p>
+            <a:pPr lvl="1"/>
+            <a:r>
+              <a:rPr lang="en-DE" b="0" i="0" dirty="0">
+                <a:solidFill>
+                  <a:srgbClr val="000000"/>
+                </a:solidFill>
+                <a:effectLst/>
+                <a:latin typeface="Helvetica Neue" panose="02000503000000020004" pitchFamily="2" charset="0"/>
+              </a:rPr>
+              <a:t>Size: 892627 data points( travel length)</a:t>
+            </a:r>
+            <a:endParaRPr lang="en-GB" dirty="0">
+              <a:solidFill>
+                <a:srgbClr val="000000"/>
+              </a:solidFill>
+              <a:latin typeface="Helvetica Neue" panose="02000503000000020004" pitchFamily="2" charset="0"/>
+            </a:endParaRPr>
+          </a:p>
+          <a:p>
+            <a:pPr lvl="1"/>
+            <a:endParaRPr lang="en-GB" b="0" i="0" dirty="0">
+              <a:solidFill>
+                <a:srgbClr val="000000"/>
+              </a:solidFill>
+              <a:effectLst/>
+              <a:latin typeface="Helvetica Neue" panose="02000503000000020004" pitchFamily="2" charset="0"/>
+            </a:endParaRPr>
+          </a:p>
+          <a:p>
+            <a:pPr lvl="1"/>
+            <a:endParaRPr lang="en-GB" b="0" i="0" dirty="0">
+              <a:solidFill>
+                <a:srgbClr val="000000"/>
+              </a:solidFill>
+              <a:effectLst/>
+              <a:latin typeface="Helvetica Neue" panose="02000503000000020004" pitchFamily="2" charset="0"/>
+            </a:endParaRPr>
+          </a:p>
+          <a:p>
+            <a:pPr algn="l"/>
+            <a:r>
+              <a:rPr lang="en-GB" b="1" i="0" dirty="0">
+                <a:solidFill>
+                  <a:srgbClr val="000000"/>
+                </a:solidFill>
+                <a:effectLst/>
+                <a:latin typeface="Helvetica Neue" panose="02000503000000020004" pitchFamily="2" charset="0"/>
+              </a:rPr>
+              <a:t>NHTS17</a:t>
+            </a:r>
+          </a:p>
+          <a:p>
+            <a:pPr lvl="1"/>
+            <a:r>
+              <a:rPr lang="en-GB" b="0" i="0" dirty="0">
+                <a:solidFill>
+                  <a:srgbClr val="000000"/>
+                </a:solidFill>
+                <a:effectLst/>
+                <a:latin typeface="Helvetica Neue" panose="02000503000000020004" pitchFamily="2" charset="0"/>
+              </a:rPr>
+              <a:t>Travel </a:t>
+            </a:r>
+            <a:r>
+              <a:rPr lang="en-GB" b="0" i="0" dirty="0" err="1">
+                <a:solidFill>
+                  <a:srgbClr val="000000"/>
+                </a:solidFill>
+                <a:effectLst/>
+                <a:latin typeface="Helvetica Neue" panose="02000503000000020004" pitchFamily="2" charset="0"/>
+              </a:rPr>
+              <a:t>behavior</a:t>
+            </a:r>
+            <a:r>
+              <a:rPr lang="en-GB" b="0" i="0" dirty="0">
+                <a:solidFill>
+                  <a:srgbClr val="000000"/>
+                </a:solidFill>
+                <a:effectLst/>
+                <a:latin typeface="Helvetica Neue" panose="02000503000000020004" pitchFamily="2" charset="0"/>
+              </a:rPr>
+              <a:t> of the American public</a:t>
+            </a:r>
+          </a:p>
+          <a:p>
+            <a:pPr lvl="1"/>
+            <a:r>
+              <a:rPr lang="en-DE" dirty="0"/>
+              <a:t>Size: 923572</a:t>
+            </a:r>
+            <a:r>
+              <a:rPr lang="en-GB" dirty="0">
+                <a:solidFill>
+                  <a:srgbClr val="000000"/>
+                </a:solidFill>
+                <a:latin typeface="Helvetica Neue" panose="02000503000000020004" pitchFamily="2" charset="0"/>
+              </a:rPr>
+              <a:t> data points</a:t>
+            </a:r>
+            <a:endParaRPr lang="en-US" dirty="0"/>
+          </a:p>
+        </p:txBody>
+      </p:sp>
+      <p:sp>
+        <p:nvSpPr>
+          <p:cNvPr id="4" name="Foliennummernplatzhalter 3">
+            <a:extLst>
+              <a:ext uri="{FF2B5EF4-FFF2-40B4-BE49-F238E27FC236}">
+                <a16:creationId xmlns:a16="http://schemas.microsoft.com/office/drawing/2014/main" id="{7D0708CE-48DF-41AD-8296-15D1B9A6C4FF}"/>
+              </a:ext>
+            </a:extLst>
+          </p:cNvPr>
+          <p:cNvSpPr>
+            <a:spLocks noGrp="1"/>
+          </p:cNvSpPr>
+          <p:nvPr>
+            <p:ph type="sldNum" sz="quarter" idx="10"/>
+          </p:nvPr>
+        </p:nvSpPr>
+        <p:spPr/>
+        <p:txBody>
+          <a:bodyPr/>
+          <a:lstStyle/>
+          <a:p>
+            <a:pPr>
+              <a:defRPr/>
+            </a:pPr>
+            <a:fld id="{13FD7AA2-DC10-7C40-BE93-1CFAEDE49800}" type="slidenum">
+              <a:rPr lang="en-US" altLang="de-DE" smtClean="0"/>
+              <a:pPr>
+                <a:defRPr/>
+              </a:pPr>
+              <a:t>2</a:t>
+            </a:fld>
+            <a:endParaRPr lang="en-US" altLang="de-DE"/>
+          </a:p>
+        </p:txBody>
+      </p:sp>
+    </p:spTree>
+    <p:extLst>
+      <p:ext uri="{BB962C8B-B14F-4D97-AF65-F5344CB8AC3E}">
+        <p14:creationId xmlns:p14="http://schemas.microsoft.com/office/powerpoint/2010/main" val="162251476"/>
+      </p:ext>
+    </p:extLst>
+  </p:cSld>
+  <p:clrMapOvr>
+    <a:masterClrMapping/>
+  </p:clrMapOvr>
+</p:sld>
+</file>
+
+<file path=ppt/slides/slide20.xml><?xml version="1.0" encoding="utf-8"?>
+<p:sld xmlns:a="http://schemas.openxmlformats.org/drawingml/2006/main" xmlns:r="http://schemas.openxmlformats.org/officeDocument/2006/relationships" xmlns:p="http://schemas.openxmlformats.org/presentationml/2006/main">
+  <p:cSld>
+    <p:spTree>
+      <p:nvGrpSpPr>
+        <p:cNvPr id="1" name=""/>
+        <p:cNvGrpSpPr/>
+        <p:nvPr/>
+      </p:nvGrpSpPr>
+      <p:grpSpPr>
+        <a:xfrm>
+          <a:off x="0" y="0"/>
+          <a:ext cx="0" cy="0"/>
+          <a:chOff x="0" y="0"/>
+          <a:chExt cx="0" cy="0"/>
+        </a:xfrm>
+      </p:grpSpPr>
+      <p:sp>
+        <p:nvSpPr>
+          <p:cNvPr id="2" name="Title 1">
+            <a:extLst>
+              <a:ext uri="{FF2B5EF4-FFF2-40B4-BE49-F238E27FC236}">
+                <a16:creationId xmlns:a16="http://schemas.microsoft.com/office/drawing/2014/main" id="{FD5F5B2C-D6F2-BF7E-E8D7-813995702D15}"/>
+              </a:ext>
+            </a:extLst>
+          </p:cNvPr>
+          <p:cNvSpPr>
+            <a:spLocks noGrp="1"/>
+          </p:cNvSpPr>
+          <p:nvPr>
+            <p:ph type="title"/>
+          </p:nvPr>
+        </p:nvSpPr>
+        <p:spPr/>
+        <p:txBody>
+          <a:bodyPr/>
+          <a:lstStyle/>
+          <a:p>
+            <a:r>
+              <a:rPr lang="en-DE" sz="2000" dirty="0"/>
+              <a:t>Refine Best Fit-Short Range in Nhts17-modelling between 10~1000km</a:t>
+            </a:r>
+          </a:p>
+        </p:txBody>
+      </p:sp>
+      <p:sp>
+        <p:nvSpPr>
+          <p:cNvPr id="3" name="Content Placeholder 2">
+            <a:extLst>
+              <a:ext uri="{FF2B5EF4-FFF2-40B4-BE49-F238E27FC236}">
+                <a16:creationId xmlns:a16="http://schemas.microsoft.com/office/drawing/2014/main" id="{7E6EDD97-98F3-F2B7-2E47-B6E3553CF328}"/>
+              </a:ext>
+            </a:extLst>
+          </p:cNvPr>
+          <p:cNvSpPr>
+            <a:spLocks noGrp="1"/>
+          </p:cNvSpPr>
+          <p:nvPr>
+            <p:ph idx="1"/>
+          </p:nvPr>
+        </p:nvSpPr>
+        <p:spPr>
+          <a:xfrm>
+            <a:off x="533401" y="914399"/>
+            <a:ext cx="3719286" cy="5441953"/>
+          </a:xfrm>
+        </p:spPr>
+        <p:txBody>
+          <a:bodyPr>
+            <a:normAutofit lnSpcReduction="10000"/>
+          </a:bodyPr>
+          <a:lstStyle/>
+          <a:p>
+            <a:r>
+              <a:rPr lang="en-DE" sz="1400" dirty="0"/>
+              <a:t>Auto Driver in Nhts17 </a:t>
+            </a:r>
+          </a:p>
+          <a:p>
+            <a:pPr lvl="1"/>
+            <a:r>
+              <a:rPr lang="en-GB" sz="1200" dirty="0"/>
+              <a:t>D</a:t>
+            </a:r>
+            <a:r>
+              <a:rPr lang="en-DE" sz="1200" dirty="0"/>
+              <a:t>atasize=10223</a:t>
+            </a:r>
+          </a:p>
+          <a:p>
+            <a:endParaRPr lang="en-DE" sz="1600" dirty="0"/>
+          </a:p>
+          <a:p>
+            <a:endParaRPr lang="en-DE" sz="1600" dirty="0"/>
+          </a:p>
+          <a:p>
+            <a:endParaRPr lang="en-DE" sz="1600" dirty="0"/>
+          </a:p>
+          <a:p>
+            <a:endParaRPr lang="en-DE" sz="1600" dirty="0"/>
+          </a:p>
+          <a:p>
+            <a:endParaRPr lang="en-DE" sz="1600" dirty="0"/>
+          </a:p>
+          <a:p>
+            <a:endParaRPr lang="en-DE" sz="1600" dirty="0"/>
+          </a:p>
+          <a:p>
+            <a:endParaRPr lang="en-DE" sz="1400" dirty="0"/>
+          </a:p>
+          <a:p>
+            <a:endParaRPr lang="en-DE" sz="1400" dirty="0"/>
+          </a:p>
+          <a:p>
+            <a:r>
+              <a:rPr lang="en-DE" sz="1400" dirty="0"/>
+              <a:t>Best fit error:</a:t>
+            </a:r>
+          </a:p>
+          <a:p>
+            <a:pPr lvl="1"/>
+            <a:r>
+              <a:rPr lang="en-DE" sz="1200" dirty="0"/>
+              <a:t>2.4541859191288786</a:t>
+            </a:r>
+          </a:p>
+          <a:p>
+            <a:r>
+              <a:rPr lang="en-DE" sz="1400" dirty="0"/>
+              <a:t>Worst fit error</a:t>
+            </a:r>
+          </a:p>
+          <a:p>
+            <a:pPr lvl="1"/>
+            <a:r>
+              <a:rPr lang="en-DE" sz="1200" dirty="0"/>
+              <a:t>10.456599131567252</a:t>
+            </a:r>
+          </a:p>
+          <a:p>
+            <a:pPr lvl="1"/>
+            <a:endParaRPr lang="en-DE" sz="1200" dirty="0"/>
+          </a:p>
+          <a:p>
+            <a:r>
+              <a:rPr lang="en-GB" sz="1200" dirty="0" err="1"/>
+              <a:t>eps_range</a:t>
+            </a:r>
+            <a:r>
+              <a:rPr lang="en-GB" sz="1200" dirty="0"/>
+              <a:t>=</a:t>
+            </a:r>
+            <a:r>
+              <a:rPr lang="en-GB" sz="1200" dirty="0" err="1"/>
+              <a:t>np.arange</a:t>
+            </a:r>
+            <a:r>
+              <a:rPr lang="en-GB" sz="1200" dirty="0"/>
+              <a:t>(0.75,0.95,0.01)</a:t>
+            </a:r>
+          </a:p>
+          <a:p>
+            <a:r>
+              <a:rPr lang="en-GB" sz="1200" dirty="0" err="1"/>
+              <a:t>p_range</a:t>
+            </a:r>
+            <a:r>
+              <a:rPr lang="en-GB" sz="1200" dirty="0"/>
+              <a:t>=</a:t>
+            </a:r>
+            <a:r>
+              <a:rPr lang="en-GB" sz="1200" dirty="0" err="1"/>
+              <a:t>np.arange</a:t>
+            </a:r>
+            <a:r>
+              <a:rPr lang="en-GB" sz="1200" dirty="0"/>
+              <a:t>(0.35, 0.45, 0.01)</a:t>
+            </a:r>
+          </a:p>
+          <a:p>
+            <a:r>
+              <a:rPr lang="en-GB" sz="1200" dirty="0" err="1"/>
+              <a:t>alp_range</a:t>
+            </a:r>
+            <a:r>
+              <a:rPr lang="en-GB" sz="1200" dirty="0"/>
+              <a:t>=</a:t>
+            </a:r>
+            <a:r>
+              <a:rPr lang="en-GB" sz="1200" dirty="0" err="1"/>
+              <a:t>np.arange</a:t>
+            </a:r>
+            <a:r>
+              <a:rPr lang="en-GB" sz="1200" dirty="0"/>
+              <a:t>(2.3, 2.7,0.05)</a:t>
+            </a:r>
+          </a:p>
+          <a:p>
+            <a:r>
+              <a:rPr lang="en-GB" sz="1200" dirty="0"/>
+              <a:t>Error: Wasserstein distance (the earth mover’s distance,)</a:t>
+            </a:r>
+          </a:p>
+          <a:p>
+            <a:r>
+              <a:rPr lang="en-GB" sz="1200" dirty="0"/>
+              <a:t>Largest distance=1000 and shortest&gt;=10</a:t>
+            </a:r>
+          </a:p>
+          <a:p>
+            <a:r>
+              <a:rPr lang="en-DE" sz="1400" dirty="0"/>
+              <a:t># Samples:</a:t>
+            </a:r>
+          </a:p>
+          <a:p>
+            <a:pPr lvl="1"/>
+            <a:r>
+              <a:rPr lang="en-GB" sz="1200" dirty="0"/>
+              <a:t>M</a:t>
+            </a:r>
+            <a:r>
+              <a:rPr lang="en-DE" sz="1200" dirty="0"/>
+              <a:t>odelling(10000), Visualization(10000)</a:t>
+            </a:r>
+          </a:p>
+          <a:p>
+            <a:pPr marL="0" indent="0">
+              <a:buNone/>
+            </a:pPr>
+            <a:endParaRPr lang="en-DE" sz="1600" dirty="0"/>
+          </a:p>
+        </p:txBody>
+      </p:sp>
+      <p:sp>
+        <p:nvSpPr>
+          <p:cNvPr id="4" name="Slide Number Placeholder 3">
+            <a:extLst>
+              <a:ext uri="{FF2B5EF4-FFF2-40B4-BE49-F238E27FC236}">
+                <a16:creationId xmlns:a16="http://schemas.microsoft.com/office/drawing/2014/main" id="{A28BE308-F095-782F-B448-59B534A262BE}"/>
+              </a:ext>
+            </a:extLst>
+          </p:cNvPr>
+          <p:cNvSpPr>
+            <a:spLocks noGrp="1"/>
+          </p:cNvSpPr>
+          <p:nvPr>
+            <p:ph type="sldNum" sz="quarter" idx="10"/>
+          </p:nvPr>
+        </p:nvSpPr>
+        <p:spPr/>
+        <p:txBody>
+          <a:bodyPr/>
+          <a:lstStyle/>
+          <a:p>
+            <a:pPr>
+              <a:defRPr/>
+            </a:pPr>
+            <a:fld id="{13FD7AA2-DC10-7C40-BE93-1CFAEDE49800}" type="slidenum">
+              <a:rPr lang="en-US" altLang="de-DE" smtClean="0"/>
+              <a:pPr>
+                <a:defRPr/>
+              </a:pPr>
+              <a:t>20</a:t>
+            </a:fld>
+            <a:endParaRPr lang="en-US" altLang="de-DE"/>
+          </a:p>
+        </p:txBody>
+      </p:sp>
+      <p:graphicFrame>
+        <p:nvGraphicFramePr>
+          <p:cNvPr id="5" name="Table 5">
+            <a:extLst>
+              <a:ext uri="{FF2B5EF4-FFF2-40B4-BE49-F238E27FC236}">
+                <a16:creationId xmlns:a16="http://schemas.microsoft.com/office/drawing/2014/main" id="{DA0984B5-5203-3327-58A7-79289C37D231}"/>
+              </a:ext>
+            </a:extLst>
+          </p:cNvPr>
+          <p:cNvGraphicFramePr>
+            <a:graphicFrameLocks noGrp="1"/>
+          </p:cNvGraphicFramePr>
+          <p:nvPr>
+            <p:extLst>
+              <p:ext uri="{D42A27DB-BD31-4B8C-83A1-F6EECF244321}">
+                <p14:modId xmlns:p14="http://schemas.microsoft.com/office/powerpoint/2010/main" val="935732728"/>
+              </p:ext>
+            </p:extLst>
+          </p:nvPr>
+        </p:nvGraphicFramePr>
+        <p:xfrm>
+          <a:off x="609601" y="1334361"/>
+          <a:ext cx="2760628" cy="2092776"/>
+        </p:xfrm>
+        <a:graphic>
+          <a:graphicData uri="http://schemas.openxmlformats.org/drawingml/2006/table">
+            <a:tbl>
+              <a:tblPr firstRow="1" bandRow="1">
+                <a:tableStyleId>{21E4AEA4-8DFA-4A89-87EB-49C32662AFE0}</a:tableStyleId>
+              </a:tblPr>
+              <a:tblGrid>
+                <a:gridCol w="690157">
+                  <a:extLst>
+                    <a:ext uri="{9D8B030D-6E8A-4147-A177-3AD203B41FA5}">
+                      <a16:colId xmlns:a16="http://schemas.microsoft.com/office/drawing/2014/main" val="2015579830"/>
+                    </a:ext>
+                  </a:extLst>
+                </a:gridCol>
+                <a:gridCol w="690157">
+                  <a:extLst>
+                    <a:ext uri="{9D8B030D-6E8A-4147-A177-3AD203B41FA5}">
+                      <a16:colId xmlns:a16="http://schemas.microsoft.com/office/drawing/2014/main" val="831545333"/>
+                    </a:ext>
+                  </a:extLst>
+                </a:gridCol>
+                <a:gridCol w="690157">
+                  <a:extLst>
+                    <a:ext uri="{9D8B030D-6E8A-4147-A177-3AD203B41FA5}">
+                      <a16:colId xmlns:a16="http://schemas.microsoft.com/office/drawing/2014/main" val="3982934071"/>
+                    </a:ext>
+                  </a:extLst>
+                </a:gridCol>
+                <a:gridCol w="690157">
+                  <a:extLst>
+                    <a:ext uri="{9D8B030D-6E8A-4147-A177-3AD203B41FA5}">
+                      <a16:colId xmlns:a16="http://schemas.microsoft.com/office/drawing/2014/main" val="2370268705"/>
+                    </a:ext>
+                  </a:extLst>
+                </a:gridCol>
+              </a:tblGrid>
+              <a:tr h="0">
+                <a:tc>
+                  <a:txBody>
+                    <a:bodyPr/>
+                    <a:lstStyle/>
+                    <a:p>
+                      <a:endParaRPr lang="en-DE" sz="1700" b="0" dirty="0">
+                        <a:solidFill>
+                          <a:schemeClr val="tx1"/>
+                        </a:solidFill>
+                        <a:latin typeface="Times New Roman" panose="02020603050405020304" pitchFamily="18" charset="0"/>
+                        <a:cs typeface="Times New Roman" panose="02020603050405020304" pitchFamily="18" charset="0"/>
+                      </a:endParaRPr>
+                    </a:p>
+                  </a:txBody>
+                  <a:tcPr marL="85045" marR="85045" marT="42522" marB="42522"/>
+                </a:tc>
+                <a:tc>
+                  <a:txBody>
+                    <a:bodyPr/>
+                    <a:lstStyle/>
+                    <a:p>
+                      <a:r>
+                        <a:rPr lang="en-DE" sz="1700" b="0" dirty="0">
+                          <a:solidFill>
+                            <a:schemeClr val="tx1"/>
+                          </a:solidFill>
+                          <a:latin typeface="Times New Roman" panose="02020603050405020304" pitchFamily="18" charset="0"/>
+                          <a:cs typeface="Times New Roman" panose="02020603050405020304" pitchFamily="18" charset="0"/>
+                        </a:rPr>
+                        <a:t>eps</a:t>
+                      </a:r>
+                    </a:p>
+                  </a:txBody>
+                  <a:tcPr marL="85045" marR="85045" marT="42522" marB="42522"/>
+                </a:tc>
+                <a:tc>
+                  <a:txBody>
+                    <a:bodyPr/>
+                    <a:lstStyle/>
+                    <a:p>
+                      <a:r>
+                        <a:rPr lang="en-DE" sz="1700" b="0" dirty="0">
+                          <a:solidFill>
+                            <a:schemeClr val="tx1"/>
+                          </a:solidFill>
+                          <a:latin typeface="Times New Roman" panose="02020603050405020304" pitchFamily="18" charset="0"/>
+                          <a:cs typeface="Times New Roman" panose="02020603050405020304" pitchFamily="18" charset="0"/>
+                        </a:rPr>
+                        <a:t>p</a:t>
+                      </a:r>
+                    </a:p>
+                  </a:txBody>
+                  <a:tcPr marL="85045" marR="85045" marT="42522" marB="42522"/>
+                </a:tc>
+                <a:tc>
+                  <a:txBody>
+                    <a:bodyPr/>
+                    <a:lstStyle/>
+                    <a:p>
+                      <a:r>
+                        <a:rPr lang="en-DE" sz="1700" b="0" dirty="0">
+                          <a:solidFill>
+                            <a:schemeClr val="tx1"/>
+                          </a:solidFill>
+                          <a:latin typeface="Times New Roman" panose="02020603050405020304" pitchFamily="18" charset="0"/>
+                          <a:cs typeface="Times New Roman" panose="02020603050405020304" pitchFamily="18" charset="0"/>
+                        </a:rPr>
+                        <a:t>alpha</a:t>
+                      </a:r>
+                    </a:p>
+                  </a:txBody>
+                  <a:tcPr marL="85045" marR="85045" marT="42522" marB="42522"/>
+                </a:tc>
+                <a:extLst>
+                  <a:ext uri="{0D108BD9-81ED-4DB2-BD59-A6C34878D82A}">
+                    <a16:rowId xmlns:a16="http://schemas.microsoft.com/office/drawing/2014/main" val="2603681906"/>
+                  </a:ext>
+                </a:extLst>
+              </a:tr>
+              <a:tr h="0">
+                <a:tc>
+                  <a:txBody>
+                    <a:bodyPr/>
+                    <a:lstStyle/>
+                    <a:p>
+                      <a:pPr marL="0" marR="0" lvl="0" indent="0" algn="l" defTabSz="685800" rtl="0" eaLnBrk="1" fontAlgn="auto" latinLnBrk="0" hangingPunct="1">
+                        <a:lnSpc>
+                          <a:spcPct val="100000"/>
+                        </a:lnSpc>
+                        <a:spcBef>
+                          <a:spcPts val="0"/>
+                        </a:spcBef>
+                        <a:spcAft>
+                          <a:spcPts val="0"/>
+                        </a:spcAft>
+                        <a:buClrTx/>
+                        <a:buSzTx/>
+                        <a:buFontTx/>
+                        <a:buNone/>
+                        <a:tabLst/>
+                        <a:defRPr/>
+                      </a:pPr>
+                      <a:r>
+                        <a:rPr lang="en-DE" sz="1500" dirty="0">
+                          <a:latin typeface="Times New Roman" panose="02020603050405020304" pitchFamily="18" charset="0"/>
+                          <a:cs typeface="Times New Roman" panose="02020603050405020304" pitchFamily="18" charset="0"/>
+                        </a:rPr>
+                        <a:t>Hand picked</a:t>
+                      </a:r>
+                      <a:endParaRPr lang="en-DE" sz="1700" dirty="0">
+                        <a:latin typeface="Times New Roman" panose="02020603050405020304" pitchFamily="18" charset="0"/>
+                        <a:cs typeface="Times New Roman" panose="02020603050405020304" pitchFamily="18" charset="0"/>
+                      </a:endParaRPr>
+                    </a:p>
+                  </a:txBody>
+                  <a:tcPr marL="85045" marR="85045" marT="42522" marB="42522"/>
+                </a:tc>
+                <a:tc>
+                  <a:txBody>
+                    <a:bodyPr/>
+                    <a:lstStyle/>
+                    <a:p>
+                      <a:r>
+                        <a:rPr lang="en-DE" sz="1700" b="0" dirty="0">
+                          <a:solidFill>
+                            <a:schemeClr val="tx1"/>
+                          </a:solidFill>
+                          <a:latin typeface="Times New Roman" panose="02020603050405020304" pitchFamily="18" charset="0"/>
+                          <a:cs typeface="Times New Roman" panose="02020603050405020304" pitchFamily="18" charset="0"/>
+                        </a:rPr>
+                        <a:t>2</a:t>
+                      </a:r>
+                    </a:p>
+                  </a:txBody>
+                  <a:tcPr marL="85045" marR="85045" marT="42522" marB="42522"/>
+                </a:tc>
+                <a:tc>
+                  <a:txBody>
+                    <a:bodyPr/>
+                    <a:lstStyle/>
+                    <a:p>
+                      <a:r>
+                        <a:rPr lang="en-DE" sz="1700" b="0" dirty="0">
+                          <a:solidFill>
+                            <a:schemeClr val="tx1"/>
+                          </a:solidFill>
+                          <a:latin typeface="Times New Roman" panose="02020603050405020304" pitchFamily="18" charset="0"/>
+                          <a:cs typeface="Times New Roman" panose="02020603050405020304" pitchFamily="18" charset="0"/>
+                        </a:rPr>
+                        <a:t>0.7</a:t>
+                      </a:r>
+                    </a:p>
+                  </a:txBody>
+                  <a:tcPr marL="85045" marR="85045" marT="42522" marB="42522"/>
+                </a:tc>
+                <a:tc>
+                  <a:txBody>
+                    <a:bodyPr/>
+                    <a:lstStyle/>
+                    <a:p>
+                      <a:r>
+                        <a:rPr lang="en-DE" sz="1700" b="0" dirty="0">
+                          <a:solidFill>
+                            <a:schemeClr val="tx1"/>
+                          </a:solidFill>
+                          <a:latin typeface="Times New Roman" panose="02020603050405020304" pitchFamily="18" charset="0"/>
+                          <a:cs typeface="Times New Roman" panose="02020603050405020304" pitchFamily="18" charset="0"/>
+                        </a:rPr>
+                        <a:t>1.1</a:t>
+                      </a:r>
+                    </a:p>
+                  </a:txBody>
+                  <a:tcPr marL="85045" marR="85045" marT="42522" marB="42522"/>
+                </a:tc>
+                <a:extLst>
+                  <a:ext uri="{0D108BD9-81ED-4DB2-BD59-A6C34878D82A}">
+                    <a16:rowId xmlns:a16="http://schemas.microsoft.com/office/drawing/2014/main" val="1143183472"/>
+                  </a:ext>
+                </a:extLst>
+              </a:tr>
+              <a:tr h="0">
+                <a:tc>
+                  <a:txBody>
+                    <a:bodyPr/>
+                    <a:lstStyle/>
+                    <a:p>
+                      <a:r>
+                        <a:rPr lang="en-GB" sz="1700" b="0" dirty="0">
+                          <a:solidFill>
+                            <a:schemeClr val="tx1"/>
+                          </a:solidFill>
+                          <a:latin typeface="Times New Roman" panose="02020603050405020304" pitchFamily="18" charset="0"/>
+                          <a:cs typeface="Times New Roman" panose="02020603050405020304" pitchFamily="18" charset="0"/>
+                        </a:rPr>
+                        <a:t>B</a:t>
+                      </a:r>
+                      <a:r>
+                        <a:rPr lang="en-DE" sz="1700" b="0" dirty="0">
+                          <a:solidFill>
+                            <a:schemeClr val="tx1"/>
+                          </a:solidFill>
+                          <a:latin typeface="Times New Roman" panose="02020603050405020304" pitchFamily="18" charset="0"/>
+                          <a:cs typeface="Times New Roman" panose="02020603050405020304" pitchFamily="18" charset="0"/>
+                        </a:rPr>
+                        <a:t>est fit</a:t>
+                      </a:r>
+                    </a:p>
+                  </a:txBody>
+                  <a:tcPr marL="85045" marR="85045" marT="42522" marB="42522"/>
+                </a:tc>
+                <a:tc>
+                  <a:txBody>
+                    <a:bodyPr/>
+                    <a:lstStyle/>
+                    <a:p>
+                      <a:r>
+                        <a:rPr lang="en-DE" sz="1700" b="0" dirty="0">
+                          <a:solidFill>
+                            <a:schemeClr val="tx1"/>
+                          </a:solidFill>
+                          <a:latin typeface="Times New Roman" panose="02020603050405020304" pitchFamily="18" charset="0"/>
+                          <a:cs typeface="Times New Roman" panose="02020603050405020304" pitchFamily="18" charset="0"/>
+                        </a:rPr>
+                        <a:t>0.88</a:t>
+                      </a:r>
+                    </a:p>
+                  </a:txBody>
+                  <a:tcPr marL="85045" marR="85045" marT="42522" marB="42522"/>
+                </a:tc>
+                <a:tc>
+                  <a:txBody>
+                    <a:bodyPr/>
+                    <a:lstStyle/>
+                    <a:p>
+                      <a:r>
+                        <a:rPr lang="en-DE" sz="1700" b="0" dirty="0">
+                          <a:solidFill>
+                            <a:schemeClr val="tx1"/>
+                          </a:solidFill>
+                          <a:latin typeface="Times New Roman" panose="02020603050405020304" pitchFamily="18" charset="0"/>
+                          <a:cs typeface="Times New Roman" panose="02020603050405020304" pitchFamily="18" charset="0"/>
+                        </a:rPr>
+                        <a:t>0.44</a:t>
+                      </a:r>
+                    </a:p>
+                  </a:txBody>
+                  <a:tcPr marL="85045" marR="85045" marT="42522" marB="42522"/>
+                </a:tc>
+                <a:tc>
+                  <a:txBody>
+                    <a:bodyPr/>
+                    <a:lstStyle/>
+                    <a:p>
+                      <a:r>
+                        <a:rPr lang="en-DE" sz="1700" b="0" dirty="0">
+                          <a:solidFill>
+                            <a:schemeClr val="tx1"/>
+                          </a:solidFill>
+                          <a:latin typeface="Times New Roman" panose="02020603050405020304" pitchFamily="18" charset="0"/>
+                          <a:cs typeface="Times New Roman" panose="02020603050405020304" pitchFamily="18" charset="0"/>
+                        </a:rPr>
+                        <a:t>2.7</a:t>
+                      </a:r>
+                    </a:p>
+                  </a:txBody>
+                  <a:tcPr marL="85045" marR="85045" marT="42522" marB="42522"/>
+                </a:tc>
+                <a:extLst>
+                  <a:ext uri="{0D108BD9-81ED-4DB2-BD59-A6C34878D82A}">
+                    <a16:rowId xmlns:a16="http://schemas.microsoft.com/office/drawing/2014/main" val="3031271706"/>
+                  </a:ext>
+                </a:extLst>
+              </a:tr>
+              <a:tr h="0">
+                <a:tc>
+                  <a:txBody>
+                    <a:bodyPr/>
+                    <a:lstStyle/>
+                    <a:p>
+                      <a:r>
+                        <a:rPr lang="en-DE" sz="1700" b="0" dirty="0">
+                          <a:solidFill>
+                            <a:schemeClr val="tx1"/>
+                          </a:solidFill>
+                          <a:latin typeface="Times New Roman" panose="02020603050405020304" pitchFamily="18" charset="0"/>
+                          <a:cs typeface="Times New Roman" panose="02020603050405020304" pitchFamily="18" charset="0"/>
+                        </a:rPr>
+                        <a:t>Worst fit</a:t>
+                      </a:r>
+                    </a:p>
+                  </a:txBody>
+                  <a:tcPr marL="85045" marR="85045" marT="42522" marB="42522"/>
+                </a:tc>
+                <a:tc>
+                  <a:txBody>
+                    <a:bodyPr/>
+                    <a:lstStyle/>
+                    <a:p>
+                      <a:r>
+                        <a:rPr lang="en-DE" sz="1700" b="0" dirty="0">
+                          <a:solidFill>
+                            <a:schemeClr val="tx1"/>
+                          </a:solidFill>
+                          <a:latin typeface="Times New Roman" panose="02020603050405020304" pitchFamily="18" charset="0"/>
+                          <a:cs typeface="Times New Roman" panose="02020603050405020304" pitchFamily="18" charset="0"/>
+                        </a:rPr>
+                        <a:t>0.75</a:t>
+                      </a:r>
+                    </a:p>
+                  </a:txBody>
+                  <a:tcPr marL="85045" marR="85045" marT="42522" marB="42522"/>
+                </a:tc>
+                <a:tc>
+                  <a:txBody>
+                    <a:bodyPr/>
+                    <a:lstStyle/>
+                    <a:p>
+                      <a:r>
+                        <a:rPr lang="en-DE" sz="1700" b="0" dirty="0">
+                          <a:solidFill>
+                            <a:schemeClr val="tx1"/>
+                          </a:solidFill>
+                          <a:latin typeface="Times New Roman" panose="02020603050405020304" pitchFamily="18" charset="0"/>
+                          <a:cs typeface="Times New Roman" panose="02020603050405020304" pitchFamily="18" charset="0"/>
+                        </a:rPr>
+                        <a:t>0.35</a:t>
+                      </a:r>
+                    </a:p>
+                  </a:txBody>
+                  <a:tcPr marL="85045" marR="85045" marT="42522" marB="42522"/>
+                </a:tc>
+                <a:tc>
+                  <a:txBody>
+                    <a:bodyPr/>
+                    <a:lstStyle/>
+                    <a:p>
+                      <a:r>
+                        <a:rPr lang="en-DE" sz="1700" b="0" dirty="0">
+                          <a:solidFill>
+                            <a:schemeClr val="tx1"/>
+                          </a:solidFill>
+                          <a:latin typeface="Times New Roman" panose="02020603050405020304" pitchFamily="18" charset="0"/>
+                          <a:cs typeface="Times New Roman" panose="02020603050405020304" pitchFamily="18" charset="0"/>
+                        </a:rPr>
+                        <a:t>2.7</a:t>
+                      </a:r>
+                    </a:p>
+                  </a:txBody>
+                  <a:tcPr marL="85045" marR="85045" marT="42522" marB="42522"/>
+                </a:tc>
+                <a:extLst>
+                  <a:ext uri="{0D108BD9-81ED-4DB2-BD59-A6C34878D82A}">
+                    <a16:rowId xmlns:a16="http://schemas.microsoft.com/office/drawing/2014/main" val="612192117"/>
+                  </a:ext>
+                </a:extLst>
+              </a:tr>
+            </a:tbl>
+          </a:graphicData>
+        </a:graphic>
+      </p:graphicFrame>
+      <p:pic>
+        <p:nvPicPr>
+          <p:cNvPr id="6" name="Picture 2">
+            <a:extLst>
+              <a:ext uri="{FF2B5EF4-FFF2-40B4-BE49-F238E27FC236}">
+                <a16:creationId xmlns:a16="http://schemas.microsoft.com/office/drawing/2014/main" id="{112BDAEE-C155-C4A2-3095-E0C404B2CB40}"/>
+              </a:ext>
+            </a:extLst>
+          </p:cNvPr>
+          <p:cNvPicPr>
+            <a:picLocks noChangeAspect="1" noChangeArrowheads="1"/>
+          </p:cNvPicPr>
+          <p:nvPr/>
+        </p:nvPicPr>
+        <p:blipFill>
+          <a:blip r:embed="rId2">
+            <a:extLst>
+              <a:ext uri="{28A0092B-C50C-407E-A947-70E740481C1C}">
+                <a14:useLocalDpi xmlns:a14="http://schemas.microsoft.com/office/drawing/2010/main" val="0"/>
+              </a:ext>
+            </a:extLst>
+          </a:blip>
+          <a:srcRect/>
+          <a:stretch/>
+        </p:blipFill>
+        <p:spPr bwMode="auto">
+          <a:xfrm>
+            <a:off x="3446429" y="1259214"/>
+            <a:ext cx="5637811" cy="4461224"/>
+          </a:xfrm>
+          <a:prstGeom prst="rect">
+            <a:avLst/>
+          </a:prstGeom>
+          <a:noFill/>
+          <a:extLst>
+            <a:ext uri="{909E8E84-426E-40DD-AFC4-6F175D3DCCD1}">
+              <a14:hiddenFill xmlns:a14="http://schemas.microsoft.com/office/drawing/2010/main">
+                <a:solidFill>
+                  <a:srgbClr val="FFFFFF"/>
+                </a:solidFill>
+              </a14:hiddenFill>
+            </a:ext>
+          </a:extLst>
+        </p:spPr>
+      </p:pic>
+    </p:spTree>
+    <p:extLst>
+      <p:ext uri="{BB962C8B-B14F-4D97-AF65-F5344CB8AC3E}">
+        <p14:creationId xmlns:p14="http://schemas.microsoft.com/office/powerpoint/2010/main" val="4245180975"/>
+      </p:ext>
+    </p:extLst>
+  </p:cSld>
+  <p:clrMapOvr>
+    <a:masterClrMapping/>
+  </p:clrMapOvr>
+</p:sld>
+</file>
+
+<file path=ppt/slides/slide21.xml><?xml version="1.0" encoding="utf-8"?>
+<p:sld xmlns:a="http://schemas.openxmlformats.org/drawingml/2006/main" xmlns:r="http://schemas.openxmlformats.org/officeDocument/2006/relationships" xmlns:p="http://schemas.openxmlformats.org/presentationml/2006/main">
+  <p:cSld>
+    <p:spTree>
+      <p:nvGrpSpPr>
+        <p:cNvPr id="1" name=""/>
+        <p:cNvGrpSpPr/>
+        <p:nvPr/>
+      </p:nvGrpSpPr>
+      <p:grpSpPr>
+        <a:xfrm>
+          <a:off x="0" y="0"/>
+          <a:ext cx="0" cy="0"/>
+          <a:chOff x="0" y="0"/>
+          <a:chExt cx="0" cy="0"/>
+        </a:xfrm>
+      </p:grpSpPr>
+      <p:sp>
+        <p:nvSpPr>
+          <p:cNvPr id="2" name="Title 1">
+            <a:extLst>
+              <a:ext uri="{FF2B5EF4-FFF2-40B4-BE49-F238E27FC236}">
                 <a16:creationId xmlns:a16="http://schemas.microsoft.com/office/drawing/2014/main" id="{F0AF2F40-74DF-8225-2203-7B418F73536B}"/>
               </a:ext>
             </a:extLst>
@@ -6330,7 +9609,7 @@
               <a:pPr>
                 <a:defRPr/>
               </a:pPr>
-              <a:t>17</a:t>
+              <a:t>21</a:t>
             </a:fld>
             <a:endParaRPr lang="en-US" altLang="de-DE"/>
           </a:p>
@@ -6349,7 +9628,7 @@
 </p:sld>
 </file>
 
-<file path=ppt/slides/slide18.xml><?xml version="1.0" encoding="utf-8"?>
+<file path=ppt/slides/slide22.xml><?xml version="1.0" encoding="utf-8"?>
 <p:sld xmlns:a="http://schemas.openxmlformats.org/drawingml/2006/main" xmlns:r="http://schemas.openxmlformats.org/officeDocument/2006/relationships" xmlns:p="http://schemas.openxmlformats.org/presentationml/2006/main">
   <p:cSld>
     <p:spTree>
@@ -6432,7 +9711,7 @@
               <a:pPr>
                 <a:defRPr/>
               </a:pPr>
-              <a:t>18</a:t>
+              <a:t>22</a:t>
             </a:fld>
             <a:endParaRPr lang="en-US" altLang="de-DE"/>
           </a:p>
@@ -6498,7 +9777,7 @@
 </p:sld>
 </file>
 
-<file path=ppt/slides/slide19.xml><?xml version="1.0" encoding="utf-8"?>
+<file path=ppt/slides/slide23.xml><?xml version="1.0" encoding="utf-8"?>
 <p:sld xmlns:a="http://schemas.openxmlformats.org/drawingml/2006/main" xmlns:r="http://schemas.openxmlformats.org/officeDocument/2006/relationships" xmlns:p="http://schemas.openxmlformats.org/presentationml/2006/main">
   <p:cSld>
     <p:spTree>
@@ -6581,7 +9860,7 @@
               <a:pPr>
                 <a:defRPr/>
               </a:pPr>
-              <a:t>19</a:t>
+              <a:t>23</a:t>
             </a:fld>
             <a:endParaRPr lang="en-US" altLang="de-DE"/>
           </a:p>
@@ -6647,297 +9926,7 @@
 </p:sld>
 </file>
 
-<file path=ppt/slides/slide2.xml><?xml version="1.0" encoding="utf-8"?>
-<p:sld xmlns:a="http://schemas.openxmlformats.org/drawingml/2006/main" xmlns:r="http://schemas.openxmlformats.org/officeDocument/2006/relationships" xmlns:p="http://schemas.openxmlformats.org/presentationml/2006/main">
-  <p:cSld>
-    <p:spTree>
-      <p:nvGrpSpPr>
-        <p:cNvPr id="1" name=""/>
-        <p:cNvGrpSpPr/>
-        <p:nvPr/>
-      </p:nvGrpSpPr>
-      <p:grpSpPr>
-        <a:xfrm>
-          <a:off x="0" y="0"/>
-          <a:ext cx="0" cy="0"/>
-          <a:chOff x="0" y="0"/>
-          <a:chExt cx="0" cy="0"/>
-        </a:xfrm>
-      </p:grpSpPr>
-      <p:sp>
-        <p:nvSpPr>
-          <p:cNvPr id="2" name="Titel 1">
-            <a:extLst>
-              <a:ext uri="{FF2B5EF4-FFF2-40B4-BE49-F238E27FC236}">
-                <a16:creationId xmlns:a16="http://schemas.microsoft.com/office/drawing/2014/main" id="{FCB9D8D8-FAA2-4ACE-AD06-4672C9C5906B}"/>
-              </a:ext>
-            </a:extLst>
-          </p:cNvPr>
-          <p:cNvSpPr>
-            <a:spLocks noGrp="1"/>
-          </p:cNvSpPr>
-          <p:nvPr>
-            <p:ph type="title"/>
-          </p:nvPr>
-        </p:nvSpPr>
-        <p:spPr/>
-        <p:txBody>
-          <a:bodyPr/>
-          <a:lstStyle/>
-          <a:p>
-            <a:r>
-              <a:rPr lang="en-US" dirty="0"/>
-              <a:t>Dataset</a:t>
-            </a:r>
-            <a:endParaRPr lang="de-DE" dirty="0"/>
-          </a:p>
-        </p:txBody>
-      </p:sp>
-      <p:sp>
-        <p:nvSpPr>
-          <p:cNvPr id="3" name="Inhaltsplatzhalter 2">
-            <a:extLst>
-              <a:ext uri="{FF2B5EF4-FFF2-40B4-BE49-F238E27FC236}">
-                <a16:creationId xmlns:a16="http://schemas.microsoft.com/office/drawing/2014/main" id="{770E7CB4-F677-4F6C-94DF-C086DCE13A22}"/>
-              </a:ext>
-            </a:extLst>
-          </p:cNvPr>
-          <p:cNvSpPr>
-            <a:spLocks noGrp="1"/>
-          </p:cNvSpPr>
-          <p:nvPr>
-            <p:ph idx="1"/>
-          </p:nvPr>
-        </p:nvSpPr>
-        <p:spPr/>
-        <p:txBody>
-          <a:bodyPr/>
-          <a:lstStyle/>
-          <a:p>
-            <a:pPr algn="l"/>
-            <a:r>
-              <a:rPr lang="en-GB" b="1" i="0" dirty="0" err="1">
-                <a:solidFill>
-                  <a:srgbClr val="000000"/>
-                </a:solidFill>
-                <a:effectLst/>
-                <a:latin typeface="Helvetica Neue" panose="02000503000000020004" pitchFamily="2" charset="0"/>
-              </a:rPr>
-              <a:t>MiD</a:t>
-            </a:r>
-            <a:r>
-              <a:rPr lang="en-GB" b="1" i="0" dirty="0">
-                <a:solidFill>
-                  <a:srgbClr val="000000"/>
-                </a:solidFill>
-                <a:effectLst/>
-                <a:latin typeface="Helvetica Neue" panose="02000503000000020004" pitchFamily="2" charset="0"/>
-              </a:rPr>
-              <a:t> 2017 </a:t>
-            </a:r>
-            <a:r>
-              <a:rPr lang="en-GB" b="1" i="0" u="none" strike="noStrike" dirty="0">
-                <a:solidFill>
-                  <a:srgbClr val="296EAA"/>
-                </a:solidFill>
-                <a:effectLst/>
-                <a:latin typeface="Helvetica Neue" panose="02000503000000020004" pitchFamily="2" charset="0"/>
-                <a:hlinkClick r:id="rId2"/>
-              </a:rPr>
-              <a:t>¶</a:t>
-            </a:r>
-            <a:endParaRPr lang="en-GB" b="1" u="none" strike="noStrike" dirty="0">
-              <a:solidFill>
-                <a:srgbClr val="000000"/>
-              </a:solidFill>
-              <a:latin typeface="Helvetica Neue" panose="02000503000000020004" pitchFamily="2" charset="0"/>
-            </a:endParaRPr>
-          </a:p>
-          <a:p>
-            <a:pPr lvl="1"/>
-            <a:r>
-              <a:rPr lang="en-GB" dirty="0" err="1">
-                <a:solidFill>
-                  <a:srgbClr val="000000"/>
-                </a:solidFill>
-                <a:latin typeface="Helvetica Neue" panose="02000503000000020004" pitchFamily="2" charset="0"/>
-              </a:rPr>
-              <a:t>M</a:t>
-            </a:r>
-            <a:r>
-              <a:rPr lang="en-GB" b="0" i="0" dirty="0" err="1">
-                <a:solidFill>
-                  <a:srgbClr val="000000"/>
-                </a:solidFill>
-                <a:effectLst/>
-                <a:latin typeface="Helvetica Neue" panose="02000503000000020004" pitchFamily="2" charset="0"/>
-              </a:rPr>
-              <a:t>obilität</a:t>
-            </a:r>
-            <a:r>
-              <a:rPr lang="en-GB" b="0" i="0" dirty="0">
-                <a:solidFill>
-                  <a:srgbClr val="000000"/>
-                </a:solidFill>
-                <a:effectLst/>
-                <a:latin typeface="Helvetica Neue" panose="02000503000000020004" pitchFamily="2" charset="0"/>
-              </a:rPr>
-              <a:t> in Deutschland</a:t>
-            </a:r>
-          </a:p>
-          <a:p>
-            <a:pPr lvl="1"/>
-            <a:r>
-              <a:rPr lang="en-DE" b="0" i="0" dirty="0">
-                <a:solidFill>
-                  <a:srgbClr val="000000"/>
-                </a:solidFill>
-                <a:effectLst/>
-                <a:latin typeface="Helvetica Neue" panose="02000503000000020004" pitchFamily="2" charset="0"/>
-              </a:rPr>
-              <a:t>Size: 892627 data points( travel length)</a:t>
-            </a:r>
-            <a:endParaRPr lang="en-GB" dirty="0">
-              <a:solidFill>
-                <a:srgbClr val="000000"/>
-              </a:solidFill>
-              <a:latin typeface="Helvetica Neue" panose="02000503000000020004" pitchFamily="2" charset="0"/>
-            </a:endParaRPr>
-          </a:p>
-          <a:p>
-            <a:pPr lvl="1"/>
-            <a:endParaRPr lang="en-GB" b="0" i="0" dirty="0">
-              <a:solidFill>
-                <a:srgbClr val="000000"/>
-              </a:solidFill>
-              <a:effectLst/>
-              <a:latin typeface="Helvetica Neue" panose="02000503000000020004" pitchFamily="2" charset="0"/>
-            </a:endParaRPr>
-          </a:p>
-          <a:p>
-            <a:pPr lvl="1"/>
-            <a:endParaRPr lang="en-GB" b="0" i="0" dirty="0">
-              <a:solidFill>
-                <a:srgbClr val="000000"/>
-              </a:solidFill>
-              <a:effectLst/>
-              <a:latin typeface="Helvetica Neue" panose="02000503000000020004" pitchFamily="2" charset="0"/>
-            </a:endParaRPr>
-          </a:p>
-          <a:p>
-            <a:pPr algn="l"/>
-            <a:r>
-              <a:rPr lang="en-GB" b="1" i="0" dirty="0">
-                <a:solidFill>
-                  <a:srgbClr val="000000"/>
-                </a:solidFill>
-                <a:effectLst/>
-                <a:latin typeface="Helvetica Neue" panose="02000503000000020004" pitchFamily="2" charset="0"/>
-              </a:rPr>
-              <a:t>NHTS17</a:t>
-            </a:r>
-          </a:p>
-          <a:p>
-            <a:pPr lvl="1"/>
-            <a:r>
-              <a:rPr lang="en-GB" b="0" i="0" dirty="0">
-                <a:solidFill>
-                  <a:srgbClr val="000000"/>
-                </a:solidFill>
-                <a:effectLst/>
-                <a:latin typeface="Helvetica Neue" panose="02000503000000020004" pitchFamily="2" charset="0"/>
-              </a:rPr>
-              <a:t>Travel </a:t>
-            </a:r>
-            <a:r>
-              <a:rPr lang="en-GB" b="0" i="0" dirty="0" err="1">
-                <a:solidFill>
-                  <a:srgbClr val="000000"/>
-                </a:solidFill>
-                <a:effectLst/>
-                <a:latin typeface="Helvetica Neue" panose="02000503000000020004" pitchFamily="2" charset="0"/>
-              </a:rPr>
-              <a:t>behavior</a:t>
-            </a:r>
-            <a:r>
-              <a:rPr lang="en-GB" b="0" i="0" dirty="0">
-                <a:solidFill>
-                  <a:srgbClr val="000000"/>
-                </a:solidFill>
-                <a:effectLst/>
-                <a:latin typeface="Helvetica Neue" panose="02000503000000020004" pitchFamily="2" charset="0"/>
-              </a:rPr>
-              <a:t> of the American public</a:t>
-            </a:r>
-          </a:p>
-          <a:p>
-            <a:pPr lvl="1"/>
-            <a:r>
-              <a:rPr lang="en-DE" dirty="0"/>
-              <a:t>Size: 923572</a:t>
-            </a:r>
-            <a:r>
-              <a:rPr lang="en-GB" dirty="0">
-                <a:solidFill>
-                  <a:srgbClr val="000000"/>
-                </a:solidFill>
-                <a:latin typeface="Helvetica Neue" panose="02000503000000020004" pitchFamily="2" charset="0"/>
-              </a:rPr>
-              <a:t> data points</a:t>
-            </a:r>
-            <a:endParaRPr lang="en-US" dirty="0"/>
-          </a:p>
-        </p:txBody>
-      </p:sp>
-      <p:sp>
-        <p:nvSpPr>
-          <p:cNvPr id="4" name="Foliennummernplatzhalter 3">
-            <a:extLst>
-              <a:ext uri="{FF2B5EF4-FFF2-40B4-BE49-F238E27FC236}">
-                <a16:creationId xmlns:a16="http://schemas.microsoft.com/office/drawing/2014/main" id="{7D0708CE-48DF-41AD-8296-15D1B9A6C4FF}"/>
-              </a:ext>
-            </a:extLst>
-          </p:cNvPr>
-          <p:cNvSpPr>
-            <a:spLocks noGrp="1"/>
-          </p:cNvSpPr>
-          <p:nvPr>
-            <p:ph type="sldNum" sz="quarter" idx="10"/>
-          </p:nvPr>
-        </p:nvSpPr>
-        <p:spPr/>
-        <p:txBody>
-          <a:bodyPr/>
-          <a:lstStyle/>
-          <a:p>
-            <a:pPr>
-              <a:defRPr/>
-            </a:pPr>
-            <a:fld id="{13FD7AA2-DC10-7C40-BE93-1CFAEDE49800}" type="slidenum">
-              <a:rPr lang="en-US" altLang="de-DE" smtClean="0"/>
-              <a:pPr>
-                <a:defRPr/>
-              </a:pPr>
-              <a:t>2</a:t>
-            </a:fld>
-            <a:endParaRPr lang="en-US" altLang="de-DE"/>
-          </a:p>
-        </p:txBody>
-      </p:sp>
-    </p:spTree>
-    <p:extLst>
-      <p:ext uri="{BB962C8B-B14F-4D97-AF65-F5344CB8AC3E}">
-        <p14:creationId xmlns:p14="http://schemas.microsoft.com/office/powerpoint/2010/main" val="162251476"/>
-      </p:ext>
-    </p:extLst>
-  </p:cSld>
-  <p:clrMapOvr>
-    <a:masterClrMapping/>
-  </p:clrMapOvr>
-</p:sld>
-</file>
-
-<file path=ppt/slides/slide20.xml><?xml version="1.0" encoding="utf-8"?>
+<file path=ppt/slides/slide24.xml><?xml version="1.0" encoding="utf-8"?>
 <p:sld xmlns:a="http://schemas.openxmlformats.org/drawingml/2006/main" xmlns:r="http://schemas.openxmlformats.org/officeDocument/2006/relationships" xmlns:p="http://schemas.openxmlformats.org/presentationml/2006/main">
   <p:cSld>
     <p:spTree>
@@ -7020,7 +10009,7 @@
               <a:pPr>
                 <a:defRPr/>
               </a:pPr>
-              <a:t>20</a:t>
+              <a:t>24</a:t>
             </a:fld>
             <a:endParaRPr lang="en-US" altLang="de-DE"/>
           </a:p>

</xml_diff>